<commit_message>
Adding "ZeligDemo" as a follow-along
</commit_message>
<xml_diff>
--- a/January-Class/Zelig_1_regressions.pptx
+++ b/January-Class/Zelig_1_regressions.pptx
@@ -5,7 +5,7 @@
     <p:sldMasterId id="2147483694" r:id="rId1"/>
   </p:sldMasterIdLst>
   <p:notesMasterIdLst>
-    <p:notesMasterId r:id="rId49"/>
+    <p:notesMasterId r:id="rId51"/>
   </p:notesMasterIdLst>
   <p:sldIdLst>
     <p:sldId id="256" r:id="rId2"/>
@@ -18,43 +18,45 @@
     <p:sldId id="306" r:id="rId9"/>
     <p:sldId id="346" r:id="rId10"/>
     <p:sldId id="347" r:id="rId11"/>
-    <p:sldId id="351" r:id="rId12"/>
-    <p:sldId id="352" r:id="rId13"/>
-    <p:sldId id="353" r:id="rId14"/>
-    <p:sldId id="354" r:id="rId15"/>
-    <p:sldId id="355" r:id="rId16"/>
-    <p:sldId id="356" r:id="rId17"/>
-    <p:sldId id="309" r:id="rId18"/>
-    <p:sldId id="339" r:id="rId19"/>
-    <p:sldId id="359" r:id="rId20"/>
-    <p:sldId id="358" r:id="rId21"/>
-    <p:sldId id="357" r:id="rId22"/>
-    <p:sldId id="334" r:id="rId23"/>
-    <p:sldId id="335" r:id="rId24"/>
-    <p:sldId id="336" r:id="rId25"/>
-    <p:sldId id="318" r:id="rId26"/>
-    <p:sldId id="341" r:id="rId27"/>
-    <p:sldId id="320" r:id="rId28"/>
-    <p:sldId id="323" r:id="rId29"/>
-    <p:sldId id="326" r:id="rId30"/>
-    <p:sldId id="324" r:id="rId31"/>
-    <p:sldId id="321" r:id="rId32"/>
-    <p:sldId id="322" r:id="rId33"/>
-    <p:sldId id="328" r:id="rId34"/>
-    <p:sldId id="330" r:id="rId35"/>
-    <p:sldId id="272" r:id="rId36"/>
-    <p:sldId id="331" r:id="rId37"/>
-    <p:sldId id="275" r:id="rId38"/>
-    <p:sldId id="342" r:id="rId39"/>
-    <p:sldId id="343" r:id="rId40"/>
-    <p:sldId id="344" r:id="rId41"/>
-    <p:sldId id="345" r:id="rId42"/>
-    <p:sldId id="273" r:id="rId43"/>
-    <p:sldId id="279" r:id="rId44"/>
-    <p:sldId id="337" r:id="rId45"/>
-    <p:sldId id="278" r:id="rId46"/>
-    <p:sldId id="316" r:id="rId47"/>
-    <p:sldId id="338" r:id="rId48"/>
+    <p:sldId id="360" r:id="rId12"/>
+    <p:sldId id="351" r:id="rId13"/>
+    <p:sldId id="361" r:id="rId14"/>
+    <p:sldId id="352" r:id="rId15"/>
+    <p:sldId id="353" r:id="rId16"/>
+    <p:sldId id="354" r:id="rId17"/>
+    <p:sldId id="355" r:id="rId18"/>
+    <p:sldId id="356" r:id="rId19"/>
+    <p:sldId id="309" r:id="rId20"/>
+    <p:sldId id="339" r:id="rId21"/>
+    <p:sldId id="359" r:id="rId22"/>
+    <p:sldId id="358" r:id="rId23"/>
+    <p:sldId id="357" r:id="rId24"/>
+    <p:sldId id="334" r:id="rId25"/>
+    <p:sldId id="335" r:id="rId26"/>
+    <p:sldId id="336" r:id="rId27"/>
+    <p:sldId id="318" r:id="rId28"/>
+    <p:sldId id="341" r:id="rId29"/>
+    <p:sldId id="320" r:id="rId30"/>
+    <p:sldId id="323" r:id="rId31"/>
+    <p:sldId id="326" r:id="rId32"/>
+    <p:sldId id="324" r:id="rId33"/>
+    <p:sldId id="321" r:id="rId34"/>
+    <p:sldId id="322" r:id="rId35"/>
+    <p:sldId id="328" r:id="rId36"/>
+    <p:sldId id="330" r:id="rId37"/>
+    <p:sldId id="272" r:id="rId38"/>
+    <p:sldId id="331" r:id="rId39"/>
+    <p:sldId id="275" r:id="rId40"/>
+    <p:sldId id="342" r:id="rId41"/>
+    <p:sldId id="343" r:id="rId42"/>
+    <p:sldId id="344" r:id="rId43"/>
+    <p:sldId id="345" r:id="rId44"/>
+    <p:sldId id="273" r:id="rId45"/>
+    <p:sldId id="279" r:id="rId46"/>
+    <p:sldId id="337" r:id="rId47"/>
+    <p:sldId id="278" r:id="rId48"/>
+    <p:sldId id="316" r:id="rId49"/>
+    <p:sldId id="338" r:id="rId50"/>
   </p:sldIdLst>
   <p:sldSz cx="9144000" cy="6858000" type="screen4x3"/>
   <p:notesSz cx="6858000" cy="9144000"/>
@@ -3759,7 +3761,7 @@
             <a:spLocks noGrp="1"/>
           </p:cNvSpPr>
           <p:nvPr>
-            <p:ph type="ctrTitle"/>
+            <p:ph type="title"/>
           </p:nvPr>
         </p:nvSpPr>
         <p:spPr/>
@@ -3769,19 +3771,19 @@
           <a:p>
             <a:r>
               <a:rPr lang="en-US"/>
-              <a:t>Structure of a Zelig Package</a:t>
-            </a:r>
-          </a:p>
-        </p:txBody>
-      </p:sp>
-      <p:sp>
-        <p:nvSpPr>
-          <p:cNvPr id="4" name="Subtitle 3"/>
-          <p:cNvSpPr>
-            <a:spLocks noGrp="1"/>
-          </p:cNvSpPr>
-          <p:nvPr>
-            <p:ph type="subTitle" idx="1"/>
+              <a:t>Example: ZeligLeastSquares</a:t>
+            </a:r>
+          </a:p>
+        </p:txBody>
+      </p:sp>
+      <p:sp>
+        <p:nvSpPr>
+          <p:cNvPr id="3" name="Content Placeholder 2"/>
+          <p:cNvSpPr>
+            <a:spLocks noGrp="1"/>
+          </p:cNvSpPr>
+          <p:nvPr>
+            <p:ph idx="1"/>
           </p:nvPr>
         </p:nvSpPr>
         <p:spPr/>
@@ -3789,7 +3791,16 @@
           <a:bodyPr/>
           <a:lstStyle/>
           <a:p>
-            <a:endParaRPr lang="en-US"/>
+            <a:r>
+              <a:rPr lang="en-US"/>
+              <a:t>Picture of directory structure</a:t>
+            </a:r>
+          </a:p>
+          <a:p>
+            <a:r>
+              <a:rPr lang="en-US"/>
+              <a:t>Highlight important areas</a:t>
+            </a:r>
           </a:p>
         </p:txBody>
       </p:sp>
@@ -3798,10 +3809,184 @@
   <p:clrMapOvr>
     <a:masterClrMapping/>
   </p:clrMapOvr>
+  <p:timing>
+    <p:tnLst>
+      <p:par>
+        <p:cTn id="1" dur="indefinite" restart="never" nodeType="tmRoot"/>
+      </p:par>
+    </p:tnLst>
+  </p:timing>
 </p:sld>
 </file>
 
 <file path=ppt/slides/slide12.xml><?xml version="1.0" encoding="utf-8"?>
+<p:sld xmlns:a="http://schemas.openxmlformats.org/drawingml/2006/main" xmlns:r="http://schemas.openxmlformats.org/officeDocument/2006/relationships" xmlns:mc="http://schemas.openxmlformats.org/markup-compatibility/2006" xmlns:mv="urn:schemas-microsoft-com:mac:vml" xmlns:p="http://schemas.openxmlformats.org/presentationml/2006/main" mc:Ignorable="mv" mc:PreserveAttributes="mv:*">
+  <p:cSld>
+    <p:spTree>
+      <p:nvGrpSpPr>
+        <p:cNvPr id="1" name=""/>
+        <p:cNvGrpSpPr/>
+        <p:nvPr/>
+      </p:nvGrpSpPr>
+      <p:grpSpPr>
+        <a:xfrm>
+          <a:off x="0" y="0"/>
+          <a:ext cx="0" cy="0"/>
+          <a:chOff x="0" y="0"/>
+          <a:chExt cx="0" cy="0"/>
+        </a:xfrm>
+      </p:grpSpPr>
+      <p:sp>
+        <p:nvSpPr>
+          <p:cNvPr id="2" name="Title 1"/>
+          <p:cNvSpPr>
+            <a:spLocks noGrp="1"/>
+          </p:cNvSpPr>
+          <p:nvPr>
+            <p:ph type="ctrTitle"/>
+          </p:nvPr>
+        </p:nvSpPr>
+        <p:spPr/>
+        <p:txBody>
+          <a:bodyPr/>
+          <a:lstStyle/>
+          <a:p>
+            <a:r>
+              <a:rPr lang="en-US"/>
+              <a:t>Structure of a Zelig Package</a:t>
+            </a:r>
+          </a:p>
+        </p:txBody>
+      </p:sp>
+      <p:sp>
+        <p:nvSpPr>
+          <p:cNvPr id="4" name="Subtitle 3"/>
+          <p:cNvSpPr>
+            <a:spLocks noGrp="1"/>
+          </p:cNvSpPr>
+          <p:nvPr>
+            <p:ph type="subTitle" idx="1"/>
+          </p:nvPr>
+        </p:nvSpPr>
+        <p:spPr/>
+        <p:txBody>
+          <a:bodyPr/>
+          <a:lstStyle/>
+          <a:p>
+            <a:endParaRPr lang="en-US"/>
+          </a:p>
+        </p:txBody>
+      </p:sp>
+    </p:spTree>
+  </p:cSld>
+  <p:clrMapOvr>
+    <a:masterClrMapping/>
+  </p:clrMapOvr>
+  <p:timing>
+    <p:tnLst>
+      <p:par>
+        <p:cTn id="1" dur="indefinite" restart="never" nodeType="tmRoot"/>
+      </p:par>
+    </p:tnLst>
+  </p:timing>
+</p:sld>
+</file>
+
+<file path=ppt/slides/slide13.xml><?xml version="1.0" encoding="utf-8"?>
+<p:sld xmlns:a="http://schemas.openxmlformats.org/drawingml/2006/main" xmlns:r="http://schemas.openxmlformats.org/officeDocument/2006/relationships" xmlns:mc="http://schemas.openxmlformats.org/markup-compatibility/2006" xmlns:mv="urn:schemas-microsoft-com:mac:vml" xmlns:p="http://schemas.openxmlformats.org/presentationml/2006/main" mc:Ignorable="mv" mc:PreserveAttributes="mv:*">
+  <p:cSld>
+    <p:spTree>
+      <p:nvGrpSpPr>
+        <p:cNvPr id="1" name=""/>
+        <p:cNvGrpSpPr/>
+        <p:nvPr/>
+      </p:nvGrpSpPr>
+      <p:grpSpPr>
+        <a:xfrm>
+          <a:off x="0" y="0"/>
+          <a:ext cx="0" cy="0"/>
+          <a:chOff x="0" y="0"/>
+          <a:chExt cx="0" cy="0"/>
+        </a:xfrm>
+      </p:grpSpPr>
+      <p:sp>
+        <p:nvSpPr>
+          <p:cNvPr id="2" name="Title 1"/>
+          <p:cNvSpPr>
+            <a:spLocks noGrp="1"/>
+          </p:cNvSpPr>
+          <p:nvPr>
+            <p:ph type="title"/>
+          </p:nvPr>
+        </p:nvSpPr>
+        <p:spPr/>
+        <p:txBody>
+          <a:bodyPr/>
+          <a:lstStyle/>
+          <a:p>
+            <a:r>
+              <a:rPr lang="en-US"/>
+              <a:t>Outline</a:t>
+            </a:r>
+          </a:p>
+        </p:txBody>
+      </p:sp>
+      <p:sp>
+        <p:nvSpPr>
+          <p:cNvPr id="3" name="Content Placeholder 2"/>
+          <p:cNvSpPr>
+            <a:spLocks noGrp="1"/>
+          </p:cNvSpPr>
+          <p:nvPr>
+            <p:ph idx="1"/>
+          </p:nvPr>
+        </p:nvSpPr>
+        <p:spPr/>
+        <p:txBody>
+          <a:bodyPr/>
+          <a:lstStyle/>
+          <a:p>
+            <a:r>
+              <a:rPr lang="en-US"/>
+              <a:t>A typical Zelig program</a:t>
+            </a:r>
+          </a:p>
+          <a:p>
+            <a:r>
+              <a:rPr lang="en-US"/>
+              <a:t>Components of a Zelig model</a:t>
+            </a:r>
+          </a:p>
+          <a:p>
+            <a:r>
+              <a:rPr lang="en-US"/>
+              <a:t>Zelig Demo</a:t>
+            </a:r>
+          </a:p>
+          <a:p>
+            <a:r>
+              <a:rPr lang="en-US"/>
+              <a:t>Overview</a:t>
+            </a:r>
+          </a:p>
+        </p:txBody>
+      </p:sp>
+    </p:spTree>
+  </p:cSld>
+  <p:clrMapOvr>
+    <a:masterClrMapping/>
+  </p:clrMapOvr>
+  <p:timing>
+    <p:tnLst>
+      <p:par>
+        <p:cTn id="1" dur="indefinite" restart="never" nodeType="tmRoot"/>
+      </p:par>
+    </p:tnLst>
+  </p:timing>
+</p:sld>
+</file>
+
+<file path=ppt/slides/slide14.xml><?xml version="1.0" encoding="utf-8"?>
 <p:sld xmlns:a="http://schemas.openxmlformats.org/drawingml/2006/main" xmlns:r="http://schemas.openxmlformats.org/officeDocument/2006/relationships" xmlns:mc="http://schemas.openxmlformats.org/markup-compatibility/2006" xmlns:mv="urn:schemas-microsoft-com:mac:vml" xmlns:p="http://schemas.openxmlformats.org/presentationml/2006/main" mc:Ignorable="mv" mc:PreserveAttributes="mv:*">
   <p:cSld>
     <p:spTree>
@@ -4319,7 +4504,7 @@
 </p:sld>
 </file>
 
-<file path=ppt/slides/slide13.xml><?xml version="1.0" encoding="utf-8"?>
+<file path=ppt/slides/slide15.xml><?xml version="1.0" encoding="utf-8"?>
 <p:sld xmlns:a="http://schemas.openxmlformats.org/drawingml/2006/main" xmlns:r="http://schemas.openxmlformats.org/officeDocument/2006/relationships" xmlns:mc="http://schemas.openxmlformats.org/markup-compatibility/2006" xmlns:mv="urn:schemas-microsoft-com:mac:vml" xmlns:p="http://schemas.openxmlformats.org/presentationml/2006/main" mc:Ignorable="mv" mc:PreserveAttributes="mv:*">
   <p:cSld>
     <p:spTree>
@@ -5396,7 +5581,7 @@
 </p:sld>
 </file>
 
-<file path=ppt/slides/slide14.xml><?xml version="1.0" encoding="utf-8"?>
+<file path=ppt/slides/slide16.xml><?xml version="1.0" encoding="utf-8"?>
 <p:sld xmlns:a="http://schemas.openxmlformats.org/drawingml/2006/main" xmlns:r="http://schemas.openxmlformats.org/officeDocument/2006/relationships" xmlns:mc="http://schemas.openxmlformats.org/markup-compatibility/2006" xmlns:mv="urn:schemas-microsoft-com:mac:vml" xmlns:p="http://schemas.openxmlformats.org/presentationml/2006/main" mc:Ignorable="mv" mc:PreserveAttributes="mv:*">
   <p:cSld>
     <p:spTree>
@@ -5543,7 +5728,7 @@
 </p:sld>
 </file>
 
-<file path=ppt/slides/slide15.xml><?xml version="1.0" encoding="utf-8"?>
+<file path=ppt/slides/slide17.xml><?xml version="1.0" encoding="utf-8"?>
 <p:sld xmlns:a="http://schemas.openxmlformats.org/drawingml/2006/main" xmlns:r="http://schemas.openxmlformats.org/officeDocument/2006/relationships" xmlns:mc="http://schemas.openxmlformats.org/markup-compatibility/2006" xmlns:mv="urn:schemas-microsoft-com:mac:vml" xmlns:p="http://schemas.openxmlformats.org/presentationml/2006/main" mc:Ignorable="mv" mc:PreserveAttributes="mv:*">
   <p:cSld>
     <p:spTree>
@@ -6067,209 +6252,6 @@
 </p:sld>
 </file>
 
-<file path=ppt/slides/slide16.xml><?xml version="1.0" encoding="utf-8"?>
-<p:sld xmlns:a="http://schemas.openxmlformats.org/drawingml/2006/main" xmlns:r="http://schemas.openxmlformats.org/officeDocument/2006/relationships" xmlns:mc="http://schemas.openxmlformats.org/markup-compatibility/2006" xmlns:mv="urn:schemas-microsoft-com:mac:vml" xmlns:p="http://schemas.openxmlformats.org/presentationml/2006/main" mc:Ignorable="mv" mc:PreserveAttributes="mv:*">
-  <p:cSld>
-    <p:spTree>
-      <p:nvGrpSpPr>
-        <p:cNvPr id="1" name=""/>
-        <p:cNvGrpSpPr/>
-        <p:nvPr/>
-      </p:nvGrpSpPr>
-      <p:grpSpPr>
-        <a:xfrm>
-          <a:off x="0" y="0"/>
-          <a:ext cx="0" cy="0"/>
-          <a:chOff x="0" y="0"/>
-          <a:chExt cx="0" cy="0"/>
-        </a:xfrm>
-      </p:grpSpPr>
-      <p:sp>
-        <p:nvSpPr>
-          <p:cNvPr id="2" name="Title 1"/>
-          <p:cNvSpPr>
-            <a:spLocks noGrp="1"/>
-          </p:cNvSpPr>
-          <p:nvPr>
-            <p:ph type="title"/>
-          </p:nvPr>
-        </p:nvSpPr>
-        <p:spPr/>
-        <p:txBody>
-          <a:bodyPr/>
-          <a:lstStyle/>
-          <a:p>
-            <a:r>
-              <a:rPr lang="en-US"/>
-              <a:t>Overview</a:t>
-            </a:r>
-          </a:p>
-        </p:txBody>
-      </p:sp>
-      <p:sp>
-        <p:nvSpPr>
-          <p:cNvPr id="3" name="Content Placeholder 2"/>
-          <p:cNvSpPr>
-            <a:spLocks noGrp="1"/>
-          </p:cNvSpPr>
-          <p:nvPr>
-            <p:ph idx="1"/>
-          </p:nvPr>
-        </p:nvSpPr>
-        <p:spPr/>
-        <p:txBody>
-          <a:bodyPr/>
-          <a:lstStyle/>
-          <a:p>
-            <a:r>
-              <a:rPr lang="en-US"/>
-              <a:t>Writing a zelig model is a three-stage process:</a:t>
-            </a:r>
-          </a:p>
-          <a:p>
-            <a:pPr lvl="1"/>
-            <a:r>
-              <a:rPr lang="en-US"/>
-              <a:t>zelig2 method</a:t>
-            </a:r>
-          </a:p>
-          <a:p>
-            <a:pPr lvl="1"/>
-            <a:r>
-              <a:rPr lang="en-US"/>
-              <a:t>param method</a:t>
-            </a:r>
-          </a:p>
-          <a:p>
-            <a:pPr lvl="1"/>
-            <a:r>
-              <a:rPr lang="en-US"/>
-              <a:t>qi method</a:t>
-            </a:r>
-          </a:p>
-          <a:p>
-            <a:r>
-              <a:rPr lang="en-US"/>
-              <a:t>These correspond to</a:t>
-            </a:r>
-          </a:p>
-          <a:p>
-            <a:pPr lvl="1"/>
-            <a:r>
-              <a:rPr lang="en-US"/>
-              <a:t>Fitting the statistical model (zelig2)</a:t>
-            </a:r>
-          </a:p>
-          <a:p>
-            <a:pPr lvl="1"/>
-            <a:r>
-              <a:rPr lang="en-US"/>
-              <a:t>Parameter simulation (param)</a:t>
-            </a:r>
-          </a:p>
-          <a:p>
-            <a:pPr lvl="1"/>
-            <a:r>
-              <a:rPr lang="en-US"/>
-              <a:t>Quantity of interest simulation (qi)</a:t>
-            </a:r>
-          </a:p>
-        </p:txBody>
-      </p:sp>
-    </p:spTree>
-  </p:cSld>
-  <p:clrMapOvr>
-    <a:masterClrMapping/>
-  </p:clrMapOvr>
-  <p:timing>
-    <p:tnLst>
-      <p:par>
-        <p:cTn id="1" dur="indefinite" restart="never" nodeType="tmRoot"/>
-      </p:par>
-    </p:tnLst>
-  </p:timing>
-</p:sld>
-</file>
-
-<file path=ppt/slides/slide17.xml><?xml version="1.0" encoding="utf-8"?>
-<p:sld xmlns:a="http://schemas.openxmlformats.org/drawingml/2006/main" xmlns:r="http://schemas.openxmlformats.org/officeDocument/2006/relationships" xmlns:mc="http://schemas.openxmlformats.org/markup-compatibility/2006" xmlns:mv="urn:schemas-microsoft-com:mac:vml" xmlns:p="http://schemas.openxmlformats.org/presentationml/2006/main" mc:Ignorable="mv" mc:PreserveAttributes="mv:*">
-  <p:cSld>
-    <p:spTree>
-      <p:nvGrpSpPr>
-        <p:cNvPr id="1" name=""/>
-        <p:cNvGrpSpPr/>
-        <p:nvPr/>
-      </p:nvGrpSpPr>
-      <p:grpSpPr>
-        <a:xfrm>
-          <a:off x="0" y="0"/>
-          <a:ext cx="0" cy="0"/>
-          <a:chOff x="0" y="0"/>
-          <a:chExt cx="0" cy="0"/>
-        </a:xfrm>
-      </p:grpSpPr>
-      <p:sp>
-        <p:nvSpPr>
-          <p:cNvPr id="2" name="Title 1"/>
-          <p:cNvSpPr>
-            <a:spLocks noGrp="1"/>
-          </p:cNvSpPr>
-          <p:nvPr>
-            <p:ph type="ctrTitle"/>
-          </p:nvPr>
-        </p:nvSpPr>
-        <p:spPr/>
-        <p:txBody>
-          <a:bodyPr/>
-          <a:lstStyle/>
-          <a:p>
-            <a:r>
-              <a:rPr lang="en-US" dirty="0" smtClean="0"/>
-              <a:t>Creating a Statistical Package</a:t>
-            </a:r>
-            <a:endParaRPr lang="en-US" dirty="0"/>
-          </a:p>
-        </p:txBody>
-      </p:sp>
-      <p:sp>
-        <p:nvSpPr>
-          <p:cNvPr id="5" name="Subtitle 4"/>
-          <p:cNvSpPr>
-            <a:spLocks noGrp="1"/>
-          </p:cNvSpPr>
-          <p:nvPr>
-            <p:ph type="subTitle" idx="1"/>
-          </p:nvPr>
-        </p:nvSpPr>
-        <p:spPr/>
-        <p:txBody>
-          <a:bodyPr/>
-          <a:lstStyle/>
-          <a:p>
-            <a:endParaRPr lang="en-US"/>
-          </a:p>
-        </p:txBody>
-      </p:sp>
-    </p:spTree>
-    <p:extLst>
-      <p:ext uri="{BB962C8B-B14F-4D97-AF65-F5344CB8AC3E}">
-        <p14:creationId xmlns="" xmlns:a="http://schemas.openxmlformats.org/drawingml/2006/main" xmlns:r="http://schemas.openxmlformats.org/officeDocument/2006/relationships" xmlns:p="http://schemas.openxmlformats.org/presentationml/2006/main" xmlns:p14="http://schemas.microsoft.com/office/powerpoint/2010/main" xmlns:mv="urn:schemas-microsoft-com:mac:vml" xmlns:mc="http://schemas.openxmlformats.org/markup-compatibility/2006" val="3700335886"/>
-      </p:ext>
-    </p:extLst>
-  </p:cSld>
-  <p:clrMapOvr>
-    <a:masterClrMapping/>
-  </p:clrMapOvr>
-  <p:timing>
-    <p:tnLst>
-      <p:par>
-        <p:cTn id="1" dur="indefinite" restart="never" nodeType="tmRoot"/>
-      </p:par>
-    </p:tnLst>
-  </p:timing>
-</p:sld>
-</file>
-
 <file path=ppt/slides/slide18.xml><?xml version="1.0" encoding="utf-8"?>
 <p:sld xmlns:a="http://schemas.openxmlformats.org/drawingml/2006/main" xmlns:r="http://schemas.openxmlformats.org/officeDocument/2006/relationships" xmlns:mc="http://schemas.openxmlformats.org/markup-compatibility/2006" xmlns:mv="urn:schemas-microsoft-com:mac:vml" xmlns:p="http://schemas.openxmlformats.org/presentationml/2006/main" mc:Ignorable="mv" mc:PreserveAttributes="mv:*">
   <p:cSld>
@@ -6304,7 +6286,7 @@
           <a:p>
             <a:r>
               <a:rPr lang="en-US"/>
-              <a:t>Basics</a:t>
+              <a:t>Overview</a:t>
             </a:r>
           </a:p>
         </p:txBody>
@@ -6321,38 +6303,60 @@
         </p:nvSpPr>
         <p:spPr/>
         <p:txBody>
-          <a:bodyPr>
-            <a:normAutofit/>
-          </a:bodyPr>
-          <a:lstStyle/>
-          <a:p>
-            <a:r>
-              <a:rPr lang="en-US" b="1">
-                <a:latin typeface="Courier New"/>
-                <a:cs typeface="Courier New"/>
-              </a:rPr>
-              <a:t>help("package.skeleton")</a:t>
-            </a:r>
-          </a:p>
-          <a:p>
-            <a:r>
-              <a:rPr lang="en-US"/>
-              <a:t>"package.skeleton" creates the outline of a statistical package (creates all necessary files/folders)</a:t>
-            </a:r>
-          </a:p>
-          <a:p>
-            <a:r>
-              <a:rPr lang="en-US" b="1">
-                <a:latin typeface="Courier New"/>
-                <a:cs typeface="Courier New"/>
-              </a:rPr>
-              <a:t>help("zelig.skeleton", "Zelig")</a:t>
-            </a:r>
-          </a:p>
-          <a:p>
-            <a:r>
-              <a:rPr lang="en-US"/>
-              <a:t>"zelig.skeleton" behaves identically except it follows a pattern more useful for Zelig packages</a:t>
+          <a:bodyPr/>
+          <a:lstStyle/>
+          <a:p>
+            <a:r>
+              <a:rPr lang="en-US"/>
+              <a:t>Writing a zelig model is a three-stage process:</a:t>
+            </a:r>
+          </a:p>
+          <a:p>
+            <a:pPr lvl="1"/>
+            <a:r>
+              <a:rPr lang="en-US"/>
+              <a:t>zelig2 method</a:t>
+            </a:r>
+          </a:p>
+          <a:p>
+            <a:pPr lvl="1"/>
+            <a:r>
+              <a:rPr lang="en-US"/>
+              <a:t>param method</a:t>
+            </a:r>
+          </a:p>
+          <a:p>
+            <a:pPr lvl="1"/>
+            <a:r>
+              <a:rPr lang="en-US"/>
+              <a:t>qi method</a:t>
+            </a:r>
+          </a:p>
+          <a:p>
+            <a:r>
+              <a:rPr lang="en-US"/>
+              <a:t>These correspond to</a:t>
+            </a:r>
+          </a:p>
+          <a:p>
+            <a:pPr lvl="1"/>
+            <a:r>
+              <a:rPr lang="en-US"/>
+              <a:t>Fitting the statistical model (zelig2)</a:t>
+            </a:r>
+          </a:p>
+          <a:p>
+            <a:pPr lvl="1"/>
+            <a:r>
+              <a:rPr lang="en-US"/>
+              <a:t>Parameter simulation (param)</a:t>
+            </a:r>
+          </a:p>
+          <a:p>
+            <a:pPr lvl="1"/>
+            <a:r>
+              <a:rPr lang="en-US"/>
+              <a:t>Quantity of interest simulation (qi)</a:t>
             </a:r>
           </a:p>
         </p:txBody>
@@ -6396,31 +6400,30 @@
             <a:spLocks noGrp="1"/>
           </p:cNvSpPr>
           <p:nvPr>
-            <p:ph type="title"/>
+            <p:ph type="ctrTitle"/>
           </p:nvPr>
         </p:nvSpPr>
         <p:spPr/>
         <p:txBody>
-          <a:bodyPr>
-            <a:normAutofit/>
-          </a:bodyPr>
-          <a:lstStyle/>
-          <a:p>
-            <a:r>
-              <a:rPr lang="en-US"/>
-              <a:t>Using "package.skeleton"</a:t>
-            </a:r>
-          </a:p>
-        </p:txBody>
-      </p:sp>
-      <p:sp>
-        <p:nvSpPr>
-          <p:cNvPr id="3" name="Content Placeholder 2"/>
-          <p:cNvSpPr>
-            <a:spLocks noGrp="1"/>
-          </p:cNvSpPr>
-          <p:nvPr>
-            <p:ph idx="1"/>
+          <a:bodyPr/>
+          <a:lstStyle/>
+          <a:p>
+            <a:r>
+              <a:rPr lang="en-US" dirty="0" smtClean="0"/>
+              <a:t>Creating a Statistical Package</a:t>
+            </a:r>
+            <a:endParaRPr lang="en-US" dirty="0"/>
+          </a:p>
+        </p:txBody>
+      </p:sp>
+      <p:sp>
+        <p:nvSpPr>
+          <p:cNvPr id="5" name="Subtitle 4"/>
+          <p:cNvSpPr>
+            <a:spLocks noGrp="1"/>
+          </p:cNvSpPr>
+          <p:nvPr>
+            <p:ph type="subTitle" idx="1"/>
           </p:nvPr>
         </p:nvSpPr>
         <p:spPr/>
@@ -6428,36 +6431,27 @@
           <a:bodyPr/>
           <a:lstStyle/>
           <a:p>
-            <a:r>
-              <a:rPr lang="en-US"/>
-              <a:t>This creates a folder titled "SomePackage"</a:t>
-            </a:r>
-          </a:p>
-          <a:p>
-            <a:r>
-              <a:rPr lang="en-US"/>
-              <a:t>Create an R package with a single function "f"</a:t>
-            </a:r>
-          </a:p>
-          <a:p>
-            <a:r>
-              <a:rPr lang="en-US"/>
-              <a:t>Titles the package "SomePackage"</a:t>
-            </a:r>
-          </a:p>
-          <a:p>
-            <a:r>
-              <a:rPr lang="en-US"/>
-              <a:t>This package will not be "installable" until the author edits the ".Rd" files (found in the "man/" directory)</a:t>
-            </a:r>
+            <a:endParaRPr lang="en-US"/>
           </a:p>
         </p:txBody>
       </p:sp>
     </p:spTree>
+    <p:extLst>
+      <p:ext uri="{BB962C8B-B14F-4D97-AF65-F5344CB8AC3E}">
+        <p14:creationId xmlns="" xmlns:a="http://schemas.openxmlformats.org/drawingml/2006/main" xmlns:r="http://schemas.openxmlformats.org/officeDocument/2006/relationships" xmlns:p="http://schemas.openxmlformats.org/presentationml/2006/main" xmlns:p14="http://schemas.microsoft.com/office/powerpoint/2010/main" xmlns:mv="urn:schemas-microsoft-com:mac:vml" xmlns:mc="http://schemas.openxmlformats.org/markup-compatibility/2006" val="3700335886"/>
+      </p:ext>
+    </p:extLst>
   </p:cSld>
   <p:clrMapOvr>
     <a:masterClrMapping/>
   </p:clrMapOvr>
+  <p:timing>
+    <p:tnLst>
+      <p:par>
+        <p:cTn id="1" dur="indefinite" restart="never" nodeType="tmRoot"/>
+      </p:par>
+    </p:tnLst>
+  </p:timing>
 </p:sld>
 </file>
 
@@ -6693,7 +6687,7 @@
           <a:p>
             <a:r>
               <a:rPr lang="en-US"/>
-              <a:t>Using "package.skeleton"</a:t>
+              <a:t>Basics</a:t>
             </a:r>
           </a:p>
         </p:txBody>
@@ -6711,137 +6705,38 @@
         <p:spPr/>
         <p:txBody>
           <a:bodyPr>
-            <a:noAutofit/>
+            <a:normAutofit/>
           </a:bodyPr>
           <a:lstStyle/>
           <a:p>
-            <a:pPr>
-              <a:buNone/>
-            </a:pPr>
-            <a:r>
-              <a:rPr lang="en-US" sz="1800">
+            <a:r>
+              <a:rPr lang="en-US" b="1">
                 <a:latin typeface="Courier New"/>
                 <a:cs typeface="Courier New"/>
               </a:rPr>
-              <a:t>&gt; f &lt;- function (...) 1</a:t>
-            </a:r>
-          </a:p>
-          <a:p>
-            <a:pPr>
-              <a:buNone/>
-            </a:pPr>
-            <a:r>
-              <a:rPr lang="en-US" sz="1800">
+              <a:t>help("package.skeleton")</a:t>
+            </a:r>
+          </a:p>
+          <a:p>
+            <a:r>
+              <a:rPr lang="en-US"/>
+              <a:t>"package.skeleton" creates the outline of a statistical package (creates all necessary files/folders)</a:t>
+            </a:r>
+          </a:p>
+          <a:p>
+            <a:r>
+              <a:rPr lang="en-US" b="1">
                 <a:latin typeface="Courier New"/>
                 <a:cs typeface="Courier New"/>
               </a:rPr>
-              <a:t>&gt; package.skeleton("SomePackage", "f")</a:t>
-            </a:r>
-          </a:p>
-          <a:p>
-            <a:pPr>
-              <a:buNone/>
-            </a:pPr>
-            <a:r>
-              <a:rPr lang="en-US" sz="1800" b="1">
-                <a:latin typeface="Courier New"/>
-                <a:cs typeface="Courier New"/>
-              </a:rPr>
-              <a:t>Creating directories ...</a:t>
-            </a:r>
-          </a:p>
-          <a:p>
-            <a:pPr>
-              <a:buNone/>
-            </a:pPr>
-            <a:r>
-              <a:rPr lang="en-US" sz="1800" b="1">
-                <a:latin typeface="Courier New"/>
-                <a:cs typeface="Courier New"/>
-              </a:rPr>
-              <a:t>Creating DESCRIPTION ...</a:t>
-            </a:r>
-          </a:p>
-          <a:p>
-            <a:pPr>
-              <a:buNone/>
-            </a:pPr>
-            <a:r>
-              <a:rPr lang="en-US" sz="1800" b="1">
-                <a:latin typeface="Courier New"/>
-                <a:cs typeface="Courier New"/>
-              </a:rPr>
-              <a:t>Creating Read-and-delete-me ...</a:t>
-            </a:r>
-          </a:p>
-          <a:p>
-            <a:pPr>
-              <a:buNone/>
-            </a:pPr>
-            <a:r>
-              <a:rPr lang="en-US" sz="1800" b="1">
-                <a:latin typeface="Courier New"/>
-                <a:cs typeface="Courier New"/>
-              </a:rPr>
-              <a:t>Saving functions and data ...</a:t>
-            </a:r>
-          </a:p>
-          <a:p>
-            <a:pPr>
-              <a:buNone/>
-            </a:pPr>
-            <a:r>
-              <a:rPr lang="en-US" sz="1800" b="1">
-                <a:latin typeface="Courier New"/>
-                <a:cs typeface="Courier New"/>
-              </a:rPr>
-              <a:t>Making help files ...</a:t>
-            </a:r>
-          </a:p>
-          <a:p>
-            <a:pPr>
-              <a:buNone/>
-            </a:pPr>
-            <a:r>
-              <a:rPr lang="en-US" sz="1800" b="1">
-                <a:latin typeface="Courier New"/>
-                <a:cs typeface="Courier New"/>
-              </a:rPr>
-              <a:t>Done.</a:t>
-            </a:r>
-          </a:p>
-          <a:p>
-            <a:pPr>
-              <a:buNone/>
-            </a:pPr>
-            <a:r>
-              <a:rPr lang="en-US" sz="1800" b="1">
-                <a:latin typeface="Courier New"/>
-                <a:cs typeface="Courier New"/>
-              </a:rPr>
-              <a:t>Further steps are described in './SomePackage/Read-and-delete-me'.</a:t>
-            </a:r>
-          </a:p>
-          <a:p>
-            <a:pPr>
-              <a:buNone/>
-            </a:pPr>
-            <a:r>
-              <a:rPr lang="en-US" sz="1800">
-                <a:latin typeface="Courier New"/>
-                <a:cs typeface="Courier New"/>
-              </a:rPr>
-              <a:t>&gt; </a:t>
-            </a:r>
-          </a:p>
-          <a:p>
-            <a:pPr>
-              <a:buNone/>
-            </a:pPr>
-            <a:endParaRPr lang="en-US" sz="1800">
-              <a:latin typeface="Courier New"/>
-              <a:cs typeface="Courier New"/>
-            </a:endParaRPr>
+              <a:t>help("zelig.skeleton", "Zelig")</a:t>
+            </a:r>
+          </a:p>
+          <a:p>
+            <a:r>
+              <a:rPr lang="en-US"/>
+              <a:t>"zelig.skeleton" behaves identically except it follows a pattern more useful for Zelig packages</a:t>
+            </a:r>
           </a:p>
         </p:txBody>
       </p:sp>
@@ -6850,6 +6745,13 @@
   <p:clrMapOvr>
     <a:masterClrMapping/>
   </p:clrMapOvr>
+  <p:timing>
+    <p:tnLst>
+      <p:par>
+        <p:cTn id="1" dur="indefinite" restart="never" nodeType="tmRoot"/>
+      </p:par>
+    </p:tnLst>
+  </p:timing>
 </p:sld>
 </file>
 
@@ -6911,41 +6813,25 @@
           <a:p>
             <a:r>
               <a:rPr lang="en-US"/>
-              <a:t>Slightly more cumbersom than "zelig.skeleton"</a:t>
-            </a:r>
-          </a:p>
-          <a:p>
-            <a:r>
-              <a:rPr lang="en-US"/>
-              <a:t>Requires that users have:</a:t>
-            </a:r>
-          </a:p>
-          <a:p>
-            <a:pPr lvl="1"/>
-            <a:r>
-              <a:rPr lang="en-US"/>
-              <a:t>A name for their package</a:t>
-            </a:r>
-          </a:p>
-          <a:p>
-            <a:pPr lvl="1"/>
-            <a:r>
-              <a:rPr lang="en-US"/>
-              <a:t>At least 1 function defined and named</a:t>
-            </a:r>
-          </a:p>
-          <a:p>
-            <a:r>
-              <a:rPr lang="en-US"/>
-              <a:t>Packages made this way </a:t>
-            </a:r>
-            <a:r>
-              <a:rPr lang="en-US" b="1"/>
-              <a:t>cannot</a:t>
-            </a:r>
-            <a:r>
-              <a:rPr lang="en-US"/>
-              <a:t> be immediately installed.</a:t>
+              <a:t>This creates a folder titled "SomePackage"</a:t>
+            </a:r>
+          </a:p>
+          <a:p>
+            <a:r>
+              <a:rPr lang="en-US"/>
+              <a:t>Create an R package with a single function "f"</a:t>
+            </a:r>
+          </a:p>
+          <a:p>
+            <a:r>
+              <a:rPr lang="en-US"/>
+              <a:t>Titles the package "SomePackage"</a:t>
+            </a:r>
+          </a:p>
+          <a:p>
+            <a:r>
+              <a:rPr lang="en-US"/>
+              <a:t>This package will not be "installable" until the author edits the ".Rd" files (found in the "man/" directory)</a:t>
             </a:r>
           </a:p>
         </p:txBody>
@@ -6955,6 +6841,13 @@
   <p:clrMapOvr>
     <a:masterClrMapping/>
   </p:clrMapOvr>
+  <p:timing>
+    <p:tnLst>
+      <p:par>
+        <p:cTn id="1" dur="indefinite" restart="never" nodeType="tmRoot"/>
+      </p:par>
+    </p:tnLst>
+  </p:timing>
 </p:sld>
 </file>
 
@@ -6991,18 +6884,9 @@
           <a:lstStyle/>
           <a:p>
             <a:r>
-              <a:rPr lang="en-US" dirty="0" smtClean="0"/>
-              <a:t>Creating a </a:t>
-            </a:r>
-            <a:r>
-              <a:rPr lang="en-US" dirty="0" err="1" smtClean="0"/>
-              <a:t>Zelig</a:t>
-            </a:r>
-            <a:r>
-              <a:rPr lang="en-US" dirty="0" smtClean="0"/>
-              <a:t> Package</a:t>
-            </a:r>
-            <a:endParaRPr lang="en-US" dirty="0"/>
+              <a:rPr lang="en-US"/>
+              <a:t>Using "package.skeleton"</a:t>
+            </a:r>
           </a:p>
         </p:txBody>
       </p:sp>
@@ -7018,95 +6902,142 @@
         </p:nvSpPr>
         <p:spPr/>
         <p:txBody>
-          <a:bodyPr/>
-          <a:lstStyle/>
-          <a:p>
-            <a:pPr marL="0" indent="0">
+          <a:bodyPr>
+            <a:noAutofit/>
+          </a:bodyPr>
+          <a:lstStyle/>
+          <a:p>
+            <a:pPr>
               <a:buNone/>
             </a:pPr>
             <a:r>
-              <a:rPr lang="en-US" sz="3600" b="1" dirty="0" smtClean="0"/>
-              <a:t>Five things are needed:</a:t>
-            </a:r>
-          </a:p>
-          <a:p>
-            <a:pPr marL="514350" indent="-514350">
-              <a:buFont typeface="+mj-lt"/>
-              <a:buAutoNum type="arabicPeriod"/>
+              <a:rPr lang="en-US" sz="1800">
+                <a:latin typeface="Courier New"/>
+                <a:cs typeface="Courier New"/>
+              </a:rPr>
+              <a:t>&gt; f &lt;- function (...) 1</a:t>
+            </a:r>
+          </a:p>
+          <a:p>
+            <a:pPr>
+              <a:buNone/>
             </a:pPr>
             <a:r>
-              <a:rPr lang="en-US" dirty="0" smtClean="0"/>
-              <a:t>Package </a:t>
-            </a:r>
-            <a:r>
-              <a:rPr lang="en-US" dirty="0"/>
-              <a:t>Name, e.g. "</a:t>
-            </a:r>
-            <a:r>
-              <a:rPr lang="en-US" dirty="0" err="1"/>
-              <a:t>ZeligLeastSquares</a:t>
-            </a:r>
-            <a:r>
-              <a:rPr lang="en-US" dirty="0"/>
-              <a:t>"</a:t>
-            </a:r>
-          </a:p>
-          <a:p>
-            <a:pPr marL="514350" indent="-514350">
-              <a:buFont typeface="+mj-lt"/>
-              <a:buAutoNum type="arabicPeriod"/>
+              <a:rPr lang="en-US" sz="1800">
+                <a:latin typeface="Courier New"/>
+                <a:cs typeface="Courier New"/>
+              </a:rPr>
+              <a:t>&gt; package.skeleton("SomePackage", "f")</a:t>
+            </a:r>
+          </a:p>
+          <a:p>
+            <a:pPr>
+              <a:buNone/>
             </a:pPr>
             <a:r>
-              <a:rPr lang="en-US" dirty="0"/>
-              <a:t>Model Names, e.g. "</a:t>
-            </a:r>
-            <a:r>
-              <a:rPr lang="en-US" dirty="0" err="1"/>
-              <a:t>logit</a:t>
-            </a:r>
-            <a:r>
-              <a:rPr lang="en-US" dirty="0"/>
-              <a:t>" or "gamma"</a:t>
-            </a:r>
-          </a:p>
-          <a:p>
-            <a:pPr marL="514350" indent="-514350">
-              <a:buFont typeface="+mj-lt"/>
-              <a:buAutoNum type="arabicPeriod"/>
+              <a:rPr lang="en-US" sz="1800" b="1">
+                <a:latin typeface="Courier New"/>
+                <a:cs typeface="Courier New"/>
+              </a:rPr>
+              <a:t>Creating directories ...</a:t>
+            </a:r>
+          </a:p>
+          <a:p>
+            <a:pPr>
+              <a:buNone/>
             </a:pPr>
             <a:r>
-              <a:rPr lang="en-US" dirty="0"/>
-              <a:t>R-package dependencies, e.g. "lme4"</a:t>
-            </a:r>
-          </a:p>
-          <a:p>
-            <a:pPr marL="514350" indent="-514350">
-              <a:buFont typeface="+mj-lt"/>
-              <a:buAutoNum type="arabicPeriod"/>
+              <a:rPr lang="en-US" sz="1800" b="1">
+                <a:latin typeface="Courier New"/>
+                <a:cs typeface="Courier New"/>
+              </a:rPr>
+              <a:t>Creating DESCRIPTION ...</a:t>
+            </a:r>
+          </a:p>
+          <a:p>
+            <a:pPr>
+              <a:buNone/>
             </a:pPr>
             <a:r>
-              <a:rPr lang="en-US" dirty="0"/>
-              <a:t>Author Name</a:t>
-            </a:r>
-          </a:p>
-          <a:p>
-            <a:pPr marL="514350" indent="-514350">
-              <a:buFont typeface="+mj-lt"/>
-              <a:buAutoNum type="arabicPeriod"/>
+              <a:rPr lang="en-US" sz="1800" b="1">
+                <a:latin typeface="Courier New"/>
+                <a:cs typeface="Courier New"/>
+              </a:rPr>
+              <a:t>Creating Read-and-delete-me ...</a:t>
+            </a:r>
+          </a:p>
+          <a:p>
+            <a:pPr>
+              <a:buNone/>
             </a:pPr>
             <a:r>
-              <a:rPr lang="en-US" dirty="0"/>
-              <a:t>Author Email (for use with CRAN)</a:t>
-            </a:r>
+              <a:rPr lang="en-US" sz="1800" b="1">
+                <a:latin typeface="Courier New"/>
+                <a:cs typeface="Courier New"/>
+              </a:rPr>
+              <a:t>Saving functions and data ...</a:t>
+            </a:r>
+          </a:p>
+          <a:p>
+            <a:pPr>
+              <a:buNone/>
+            </a:pPr>
+            <a:r>
+              <a:rPr lang="en-US" sz="1800" b="1">
+                <a:latin typeface="Courier New"/>
+                <a:cs typeface="Courier New"/>
+              </a:rPr>
+              <a:t>Making help files ...</a:t>
+            </a:r>
+          </a:p>
+          <a:p>
+            <a:pPr>
+              <a:buNone/>
+            </a:pPr>
+            <a:r>
+              <a:rPr lang="en-US" sz="1800" b="1">
+                <a:latin typeface="Courier New"/>
+                <a:cs typeface="Courier New"/>
+              </a:rPr>
+              <a:t>Done.</a:t>
+            </a:r>
+          </a:p>
+          <a:p>
+            <a:pPr>
+              <a:buNone/>
+            </a:pPr>
+            <a:r>
+              <a:rPr lang="en-US" sz="1800" b="1">
+                <a:latin typeface="Courier New"/>
+                <a:cs typeface="Courier New"/>
+              </a:rPr>
+              <a:t>Further steps are described in './SomePackage/Read-and-delete-me'.</a:t>
+            </a:r>
+          </a:p>
+          <a:p>
+            <a:pPr>
+              <a:buNone/>
+            </a:pPr>
+            <a:r>
+              <a:rPr lang="en-US" sz="1800">
+                <a:latin typeface="Courier New"/>
+                <a:cs typeface="Courier New"/>
+              </a:rPr>
+              <a:t>&gt; </a:t>
+            </a:r>
+          </a:p>
+          <a:p>
+            <a:pPr>
+              <a:buNone/>
+            </a:pPr>
+            <a:endParaRPr lang="en-US" sz="1800">
+              <a:latin typeface="Courier New"/>
+              <a:cs typeface="Courier New"/>
+            </a:endParaRPr>
           </a:p>
         </p:txBody>
       </p:sp>
     </p:spTree>
-    <p:extLst>
-      <p:ext uri="{BB962C8B-B14F-4D97-AF65-F5344CB8AC3E}">
-        <p14:creationId xmlns="" xmlns:a="http://schemas.openxmlformats.org/drawingml/2006/main" xmlns:r="http://schemas.openxmlformats.org/officeDocument/2006/relationships" xmlns:p="http://schemas.openxmlformats.org/presentationml/2006/main" xmlns:p14="http://schemas.microsoft.com/office/powerpoint/2010/main" xmlns:mv="urn:schemas-microsoft-com:mac:vml" xmlns:mc="http://schemas.openxmlformats.org/markup-compatibility/2006" val="973143670"/>
-      </p:ext>
-    </p:extLst>
   </p:cSld>
   <p:clrMapOvr>
     <a:masterClrMapping/>
@@ -7140,6 +7071,261 @@
       </p:grpSpPr>
       <p:sp>
         <p:nvSpPr>
+          <p:cNvPr id="2" name="Title 1"/>
+          <p:cNvSpPr>
+            <a:spLocks noGrp="1"/>
+          </p:cNvSpPr>
+          <p:nvPr>
+            <p:ph type="title"/>
+          </p:nvPr>
+        </p:nvSpPr>
+        <p:spPr/>
+        <p:txBody>
+          <a:bodyPr>
+            <a:normAutofit/>
+          </a:bodyPr>
+          <a:lstStyle/>
+          <a:p>
+            <a:r>
+              <a:rPr lang="en-US"/>
+              <a:t>Using "package.skeleton"</a:t>
+            </a:r>
+          </a:p>
+        </p:txBody>
+      </p:sp>
+      <p:sp>
+        <p:nvSpPr>
+          <p:cNvPr id="3" name="Content Placeholder 2"/>
+          <p:cNvSpPr>
+            <a:spLocks noGrp="1"/>
+          </p:cNvSpPr>
+          <p:nvPr>
+            <p:ph idx="1"/>
+          </p:nvPr>
+        </p:nvSpPr>
+        <p:spPr/>
+        <p:txBody>
+          <a:bodyPr/>
+          <a:lstStyle/>
+          <a:p>
+            <a:r>
+              <a:rPr lang="en-US"/>
+              <a:t>Slightly more cumbersom than "zelig.skeleton"</a:t>
+            </a:r>
+          </a:p>
+          <a:p>
+            <a:r>
+              <a:rPr lang="en-US"/>
+              <a:t>Requires that users have:</a:t>
+            </a:r>
+          </a:p>
+          <a:p>
+            <a:pPr lvl="1"/>
+            <a:r>
+              <a:rPr lang="en-US"/>
+              <a:t>A name for their package</a:t>
+            </a:r>
+          </a:p>
+          <a:p>
+            <a:pPr lvl="1"/>
+            <a:r>
+              <a:rPr lang="en-US"/>
+              <a:t>At least 1 function defined and named</a:t>
+            </a:r>
+          </a:p>
+          <a:p>
+            <a:r>
+              <a:rPr lang="en-US"/>
+              <a:t>Packages made this way </a:t>
+            </a:r>
+            <a:r>
+              <a:rPr lang="en-US" b="1"/>
+              <a:t>cannot</a:t>
+            </a:r>
+            <a:r>
+              <a:rPr lang="en-US"/>
+              <a:t> be immediately installed.</a:t>
+            </a:r>
+          </a:p>
+        </p:txBody>
+      </p:sp>
+    </p:spTree>
+  </p:cSld>
+  <p:clrMapOvr>
+    <a:masterClrMapping/>
+  </p:clrMapOvr>
+  <p:timing>
+    <p:tnLst>
+      <p:par>
+        <p:cTn id="1" dur="indefinite" restart="never" nodeType="tmRoot"/>
+      </p:par>
+    </p:tnLst>
+  </p:timing>
+</p:sld>
+</file>
+
+<file path=ppt/slides/slide24.xml><?xml version="1.0" encoding="utf-8"?>
+<p:sld xmlns:a="http://schemas.openxmlformats.org/drawingml/2006/main" xmlns:r="http://schemas.openxmlformats.org/officeDocument/2006/relationships" xmlns:mc="http://schemas.openxmlformats.org/markup-compatibility/2006" xmlns:mv="urn:schemas-microsoft-com:mac:vml" xmlns:p="http://schemas.openxmlformats.org/presentationml/2006/main" mc:Ignorable="mv" mc:PreserveAttributes="mv:*">
+  <p:cSld>
+    <p:spTree>
+      <p:nvGrpSpPr>
+        <p:cNvPr id="1" name=""/>
+        <p:cNvGrpSpPr/>
+        <p:nvPr/>
+      </p:nvGrpSpPr>
+      <p:grpSpPr>
+        <a:xfrm>
+          <a:off x="0" y="0"/>
+          <a:ext cx="0" cy="0"/>
+          <a:chOff x="0" y="0"/>
+          <a:chExt cx="0" cy="0"/>
+        </a:xfrm>
+      </p:grpSpPr>
+      <p:sp>
+        <p:nvSpPr>
+          <p:cNvPr id="2" name="Title 1"/>
+          <p:cNvSpPr>
+            <a:spLocks noGrp="1"/>
+          </p:cNvSpPr>
+          <p:nvPr>
+            <p:ph type="title"/>
+          </p:nvPr>
+        </p:nvSpPr>
+        <p:spPr/>
+        <p:txBody>
+          <a:bodyPr/>
+          <a:lstStyle/>
+          <a:p>
+            <a:r>
+              <a:rPr lang="en-US" dirty="0" smtClean="0"/>
+              <a:t>Creating a </a:t>
+            </a:r>
+            <a:r>
+              <a:rPr lang="en-US" dirty="0" err="1" smtClean="0"/>
+              <a:t>Zelig</a:t>
+            </a:r>
+            <a:r>
+              <a:rPr lang="en-US" dirty="0" smtClean="0"/>
+              <a:t> Package</a:t>
+            </a:r>
+            <a:endParaRPr lang="en-US" dirty="0"/>
+          </a:p>
+        </p:txBody>
+      </p:sp>
+      <p:sp>
+        <p:nvSpPr>
+          <p:cNvPr id="3" name="Content Placeholder 2"/>
+          <p:cNvSpPr>
+            <a:spLocks noGrp="1"/>
+          </p:cNvSpPr>
+          <p:nvPr>
+            <p:ph idx="1"/>
+          </p:nvPr>
+        </p:nvSpPr>
+        <p:spPr/>
+        <p:txBody>
+          <a:bodyPr/>
+          <a:lstStyle/>
+          <a:p>
+            <a:pPr marL="0" indent="0">
+              <a:buNone/>
+            </a:pPr>
+            <a:r>
+              <a:rPr lang="en-US" sz="3600" b="1" dirty="0" smtClean="0"/>
+              <a:t>Three things are needed:</a:t>
+            </a:r>
+          </a:p>
+          <a:p>
+            <a:pPr marL="514350" indent="-514350">
+              <a:buFont typeface="+mj-lt"/>
+              <a:buAutoNum type="arabicPeriod"/>
+            </a:pPr>
+            <a:r>
+              <a:rPr lang="en-US" dirty="0" smtClean="0"/>
+              <a:t>Package </a:t>
+            </a:r>
+            <a:r>
+              <a:rPr lang="en-US" dirty="0"/>
+              <a:t>Name, e.g. "</a:t>
+            </a:r>
+            <a:r>
+              <a:rPr lang="en-US" dirty="0" err="1"/>
+              <a:t>ZeligLeastSquares</a:t>
+            </a:r>
+            <a:r>
+              <a:rPr lang="en-US" dirty="0"/>
+              <a:t>"</a:t>
+            </a:r>
+          </a:p>
+          <a:p>
+            <a:pPr marL="514350" indent="-514350">
+              <a:buFont typeface="+mj-lt"/>
+              <a:buAutoNum type="arabicPeriod"/>
+            </a:pPr>
+            <a:r>
+              <a:rPr lang="en-US" dirty="0"/>
+              <a:t>Model Names, e.g. "</a:t>
+            </a:r>
+            <a:r>
+              <a:rPr lang="en-US" dirty="0" err="1"/>
+              <a:t>logit</a:t>
+            </a:r>
+            <a:r>
+              <a:rPr lang="en-US" dirty="0"/>
+              <a:t>" or "gamma"</a:t>
+            </a:r>
+          </a:p>
+          <a:p>
+            <a:pPr marL="514350" indent="-514350">
+              <a:buFont typeface="+mj-lt"/>
+              <a:buAutoNum type="arabicPeriod"/>
+            </a:pPr>
+            <a:r>
+              <a:rPr lang="en-US" dirty="0"/>
+              <a:t>R-package dependencies, e.g. "lme4"</a:t>
+            </a:r>
+          </a:p>
+        </p:txBody>
+      </p:sp>
+    </p:spTree>
+    <p:extLst>
+      <p:ext uri="{BB962C8B-B14F-4D97-AF65-F5344CB8AC3E}">
+        <p14:creationId xmlns="" xmlns:a="http://schemas.openxmlformats.org/drawingml/2006/main" xmlns:r="http://schemas.openxmlformats.org/officeDocument/2006/relationships" xmlns:p="http://schemas.openxmlformats.org/presentationml/2006/main" xmlns:p14="http://schemas.microsoft.com/office/powerpoint/2010/main" xmlns:mv="urn:schemas-microsoft-com:mac:vml" xmlns:mc="http://schemas.openxmlformats.org/markup-compatibility/2006" val="973143670"/>
+      </p:ext>
+    </p:extLst>
+  </p:cSld>
+  <p:clrMapOvr>
+    <a:masterClrMapping/>
+  </p:clrMapOvr>
+  <p:timing>
+    <p:tnLst>
+      <p:par>
+        <p:cTn id="1" dur="indefinite" restart="never" nodeType="tmRoot"/>
+      </p:par>
+    </p:tnLst>
+  </p:timing>
+</p:sld>
+</file>
+
+<file path=ppt/slides/slide25.xml><?xml version="1.0" encoding="utf-8"?>
+<p:sld xmlns:a="http://schemas.openxmlformats.org/drawingml/2006/main" xmlns:r="http://schemas.openxmlformats.org/officeDocument/2006/relationships" xmlns:mc="http://schemas.openxmlformats.org/markup-compatibility/2006" xmlns:mv="urn:schemas-microsoft-com:mac:vml" xmlns:p="http://schemas.openxmlformats.org/presentationml/2006/main" mc:Ignorable="mv" mc:PreserveAttributes="mv:*">
+  <p:cSld>
+    <p:spTree>
+      <p:nvGrpSpPr>
+        <p:cNvPr id="1" name=""/>
+        <p:cNvGrpSpPr/>
+        <p:nvPr/>
+      </p:nvGrpSpPr>
+      <p:grpSpPr>
+        <a:xfrm>
+          <a:off x="0" y="0"/>
+          <a:ext cx="0" cy="0"/>
+          <a:chOff x="0" y="0"/>
+          <a:chExt cx="0" cy="0"/>
+        </a:xfrm>
+      </p:grpSpPr>
+      <p:sp>
+        <p:nvSpPr>
           <p:cNvPr id="9" name="Title 8"/>
           <p:cNvSpPr>
             <a:spLocks noGrp="1"/>
@@ -7248,7 +7434,7 @@
 </p:sld>
 </file>
 
-<file path=ppt/slides/slide24.xml><?xml version="1.0" encoding="utf-8"?>
+<file path=ppt/slides/slide26.xml><?xml version="1.0" encoding="utf-8"?>
 <p:sld xmlns:a="http://schemas.openxmlformats.org/drawingml/2006/main" xmlns:r="http://schemas.openxmlformats.org/officeDocument/2006/relationships" xmlns:mc="http://schemas.openxmlformats.org/markup-compatibility/2006" xmlns:mv="urn:schemas-microsoft-com:mac:vml" xmlns:p="http://schemas.openxmlformats.org/presentationml/2006/main" mc:Ignorable="mv" mc:PreserveAttributes="mv:*">
   <p:cSld>
     <p:spTree>
@@ -7752,173 +7938,6 @@
 </p:sld>
 </file>
 
-<file path=ppt/slides/slide25.xml><?xml version="1.0" encoding="utf-8"?>
-<p:sld xmlns:a="http://schemas.openxmlformats.org/drawingml/2006/main" xmlns:r="http://schemas.openxmlformats.org/officeDocument/2006/relationships" xmlns:mc="http://schemas.openxmlformats.org/markup-compatibility/2006" xmlns:mv="urn:schemas-microsoft-com:mac:vml" xmlns:p="http://schemas.openxmlformats.org/presentationml/2006/main" mc:Ignorable="mv" mc:PreserveAttributes="mv:*">
-  <p:cSld>
-    <p:spTree>
-      <p:nvGrpSpPr>
-        <p:cNvPr id="1" name=""/>
-        <p:cNvGrpSpPr/>
-        <p:nvPr/>
-      </p:nvGrpSpPr>
-      <p:grpSpPr>
-        <a:xfrm>
-          <a:off x="0" y="0"/>
-          <a:ext cx="0" cy="0"/>
-          <a:chOff x="0" y="0"/>
-          <a:chExt cx="0" cy="0"/>
-        </a:xfrm>
-      </p:grpSpPr>
-      <p:sp>
-        <p:nvSpPr>
-          <p:cNvPr id="4" name="Title 3"/>
-          <p:cNvSpPr>
-            <a:spLocks noGrp="1"/>
-          </p:cNvSpPr>
-          <p:nvPr>
-            <p:ph type="ctrTitle"/>
-          </p:nvPr>
-        </p:nvSpPr>
-        <p:spPr/>
-        <p:txBody>
-          <a:bodyPr/>
-          <a:lstStyle/>
-          <a:p>
-            <a:r>
-              <a:rPr lang="en-US" dirty="0" smtClean="0"/>
-              <a:t>Model Fitting Functions</a:t>
-            </a:r>
-            <a:endParaRPr lang="en-US" dirty="0"/>
-          </a:p>
-        </p:txBody>
-      </p:sp>
-      <p:sp>
-        <p:nvSpPr>
-          <p:cNvPr id="5" name="Subtitle 4"/>
-          <p:cNvSpPr>
-            <a:spLocks noGrp="1"/>
-          </p:cNvSpPr>
-          <p:nvPr>
-            <p:ph type="subTitle" idx="1"/>
-          </p:nvPr>
-        </p:nvSpPr>
-        <p:spPr/>
-        <p:txBody>
-          <a:bodyPr/>
-          <a:lstStyle/>
-          <a:p>
-            <a:endParaRPr lang="en-US"/>
-          </a:p>
-        </p:txBody>
-      </p:sp>
-    </p:spTree>
-    <p:extLst>
-      <p:ext uri="{BB962C8B-B14F-4D97-AF65-F5344CB8AC3E}">
-        <p14:creationId xmlns="" xmlns:a="http://schemas.openxmlformats.org/drawingml/2006/main" xmlns:r="http://schemas.openxmlformats.org/officeDocument/2006/relationships" xmlns:p="http://schemas.openxmlformats.org/presentationml/2006/main" xmlns:p14="http://schemas.microsoft.com/office/powerpoint/2010/main" xmlns:mv="urn:schemas-microsoft-com:mac:vml" xmlns:mc="http://schemas.openxmlformats.org/markup-compatibility/2006" val="942656541"/>
-      </p:ext>
-    </p:extLst>
-  </p:cSld>
-  <p:clrMapOvr>
-    <a:masterClrMapping/>
-  </p:clrMapOvr>
-  <p:timing>
-    <p:tnLst>
-      <p:par>
-        <p:cTn id="1" dur="indefinite" restart="never" nodeType="tmRoot"/>
-      </p:par>
-    </p:tnLst>
-  </p:timing>
-</p:sld>
-</file>
-
-<file path=ppt/slides/slide26.xml><?xml version="1.0" encoding="utf-8"?>
-<p:sld xmlns:a="http://schemas.openxmlformats.org/drawingml/2006/main" xmlns:r="http://schemas.openxmlformats.org/officeDocument/2006/relationships" xmlns:mc="http://schemas.openxmlformats.org/markup-compatibility/2006" xmlns:mv="urn:schemas-microsoft-com:mac:vml" xmlns:p="http://schemas.openxmlformats.org/presentationml/2006/main" mc:Ignorable="mv" mc:PreserveAttributes="mv:*">
-  <p:cSld>
-    <p:spTree>
-      <p:nvGrpSpPr>
-        <p:cNvPr id="1" name=""/>
-        <p:cNvGrpSpPr/>
-        <p:nvPr/>
-      </p:nvGrpSpPr>
-      <p:grpSpPr>
-        <a:xfrm>
-          <a:off x="0" y="0"/>
-          <a:ext cx="0" cy="0"/>
-          <a:chOff x="0" y="0"/>
-          <a:chExt cx="0" cy="0"/>
-        </a:xfrm>
-      </p:grpSpPr>
-      <p:sp>
-        <p:nvSpPr>
-          <p:cNvPr id="2" name="Title 1"/>
-          <p:cNvSpPr>
-            <a:spLocks noGrp="1"/>
-          </p:cNvSpPr>
-          <p:nvPr>
-            <p:ph type="title"/>
-          </p:nvPr>
-        </p:nvSpPr>
-        <p:spPr/>
-        <p:txBody>
-          <a:bodyPr/>
-          <a:lstStyle/>
-          <a:p>
-            <a:r>
-              <a:rPr lang="en-US"/>
-              <a:t>Outline for Model Fitting Functions</a:t>
-            </a:r>
-          </a:p>
-        </p:txBody>
-      </p:sp>
-      <p:sp>
-        <p:nvSpPr>
-          <p:cNvPr id="3" name="Content Placeholder 2"/>
-          <p:cNvSpPr>
-            <a:spLocks noGrp="1"/>
-          </p:cNvSpPr>
-          <p:nvPr>
-            <p:ph idx="1"/>
-          </p:nvPr>
-        </p:nvSpPr>
-        <p:spPr/>
-        <p:txBody>
-          <a:bodyPr/>
-          <a:lstStyle/>
-          <a:p>
-            <a:r>
-              <a:rPr lang="en-US"/>
-              <a:t>What is linear regression?</a:t>
-            </a:r>
-          </a:p>
-          <a:p>
-            <a:r>
-              <a:rPr lang="en-US"/>
-              <a:t>Generalized Linear Models (GLM)</a:t>
-            </a:r>
-          </a:p>
-          <a:p>
-            <a:r>
-              <a:rPr lang="en-US"/>
-              <a:t>Example</a:t>
-            </a:r>
-          </a:p>
-        </p:txBody>
-      </p:sp>
-    </p:spTree>
-  </p:cSld>
-  <p:clrMapOvr>
-    <a:masterClrMapping/>
-  </p:clrMapOvr>
-  <p:timing>
-    <p:tnLst>
-      <p:par>
-        <p:cTn id="1" dur="indefinite" restart="never" nodeType="tmRoot"/>
-      </p:par>
-    </p:tnLst>
-  </p:timing>
-</p:sld>
-</file>
-
 <file path=ppt/slides/slide27.xml><?xml version="1.0" encoding="utf-8"?>
 <p:sld xmlns:a="http://schemas.openxmlformats.org/drawingml/2006/main" xmlns:r="http://schemas.openxmlformats.org/officeDocument/2006/relationships" xmlns:mc="http://schemas.openxmlformats.org/markup-compatibility/2006" xmlns:mv="urn:schemas-microsoft-com:mac:vml" xmlns:p="http://schemas.openxmlformats.org/presentationml/2006/main" mc:Ignorable="mv" mc:PreserveAttributes="mv:*">
   <p:cSld>
@@ -7938,12 +7957,12 @@
       </p:grpSpPr>
       <p:sp>
         <p:nvSpPr>
-          <p:cNvPr id="2" name="Title 1"/>
-          <p:cNvSpPr>
-            <a:spLocks noGrp="1"/>
-          </p:cNvSpPr>
-          <p:nvPr>
-            <p:ph type="title"/>
+          <p:cNvPr id="4" name="Title 3"/>
+          <p:cNvSpPr>
+            <a:spLocks noGrp="1"/>
+          </p:cNvSpPr>
+          <p:nvPr>
+            <p:ph type="ctrTitle"/>
           </p:nvPr>
         </p:nvSpPr>
         <p:spPr/>
@@ -7952,94 +7971,36 @@
           <a:lstStyle/>
           <a:p>
             <a:r>
-              <a:rPr lang="en-US"/>
-              <a:t>What is linear regression?</a:t>
-            </a:r>
-          </a:p>
-        </p:txBody>
-      </p:sp>
-      <p:sp>
-        <p:nvSpPr>
-          <p:cNvPr id="3" name="Content Placeholder 2"/>
-          <p:cNvSpPr>
-            <a:spLocks noGrp="1"/>
-          </p:cNvSpPr>
-          <p:nvPr>
-            <p:ph idx="1"/>
+              <a:rPr lang="en-US" dirty="0" smtClean="0"/>
+              <a:t>Model Fitting Functions</a:t>
+            </a:r>
+            <a:endParaRPr lang="en-US" dirty="0"/>
+          </a:p>
+        </p:txBody>
+      </p:sp>
+      <p:sp>
+        <p:nvSpPr>
+          <p:cNvPr id="5" name="Subtitle 4"/>
+          <p:cNvSpPr>
+            <a:spLocks noGrp="1"/>
+          </p:cNvSpPr>
+          <p:nvPr>
+            <p:ph type="subTitle" idx="1"/>
           </p:nvPr>
         </p:nvSpPr>
         <p:spPr/>
         <p:txBody>
-          <a:bodyPr>
-            <a:normAutofit lnSpcReduction="10000"/>
-          </a:bodyPr>
-          <a:lstStyle/>
-          <a:p>
-            <a:r>
-              <a:rPr lang="en-US"/>
-              <a:t>A method for </a:t>
-            </a:r>
-            <a:r>
-              <a:rPr lang="en-US" b="1"/>
-              <a:t>explaining</a:t>
-            </a:r>
-            <a:r>
-              <a:rPr lang="en-US"/>
-              <a:t> and </a:t>
-            </a:r>
-            <a:r>
-              <a:rPr lang="en-US" b="1"/>
-              <a:t>predicting</a:t>
-            </a:r>
-            <a:r>
-              <a:rPr lang="en-US"/>
-              <a:t> observations using data</a:t>
-            </a:r>
-          </a:p>
-          <a:p>
-            <a:r>
-              <a:rPr lang="en-US"/>
-              <a:t>A method for determining </a:t>
-            </a:r>
-            <a:r>
-              <a:rPr lang="en-US" b="1"/>
-              <a:t>unknown parameters</a:t>
-            </a:r>
-            <a:r>
-              <a:rPr lang="en-US"/>
-              <a:t> derived from a data set</a:t>
-            </a:r>
-          </a:p>
-          <a:p>
-            <a:pPr lvl="1"/>
-            <a:r>
-              <a:rPr lang="en-US"/>
-              <a:t>How dependent is my response variable on a particular parameter?</a:t>
-            </a:r>
-          </a:p>
-          <a:p>
-            <a:r>
-              <a:rPr lang="en-US"/>
-              <a:t>Specifically, a method for determining </a:t>
-            </a:r>
-            <a:r>
-              <a:rPr lang="en-US" b="1"/>
-              <a:t>conditional expected values</a:t>
-            </a:r>
-          </a:p>
-          <a:p>
-            <a:pPr lvl="1"/>
-            <a:r>
-              <a:rPr lang="en-US"/>
-              <a:t>"Given x and y, the expected value is…"</a:t>
-            </a:r>
+          <a:bodyPr/>
+          <a:lstStyle/>
+          <a:p>
+            <a:endParaRPr lang="en-US"/>
           </a:p>
         </p:txBody>
       </p:sp>
     </p:spTree>
     <p:extLst>
       <p:ext uri="{BB962C8B-B14F-4D97-AF65-F5344CB8AC3E}">
-        <p14:creationId xmlns="" xmlns:a="http://schemas.openxmlformats.org/drawingml/2006/main" xmlns:r="http://schemas.openxmlformats.org/officeDocument/2006/relationships" xmlns:p="http://schemas.openxmlformats.org/presentationml/2006/main" xmlns:p14="http://schemas.microsoft.com/office/powerpoint/2010/main" xmlns:mv="urn:schemas-microsoft-com:mac:vml" xmlns:mc="http://schemas.openxmlformats.org/markup-compatibility/2006" val="1702243699"/>
+        <p14:creationId xmlns="" xmlns:a="http://schemas.openxmlformats.org/drawingml/2006/main" xmlns:r="http://schemas.openxmlformats.org/officeDocument/2006/relationships" xmlns:p="http://schemas.openxmlformats.org/presentationml/2006/main" xmlns:p14="http://schemas.microsoft.com/office/powerpoint/2010/main" xmlns:mv="urn:schemas-microsoft-com:mac:vml" xmlns:mc="http://schemas.openxmlformats.org/markup-compatibility/2006" val="942656541"/>
       </p:ext>
     </p:extLst>
   </p:cSld>
@@ -8090,102 +8051,46 @@
           <a:p>
             <a:r>
               <a:rPr lang="en-US"/>
+              <a:t>Outline for Model Fitting Functions</a:t>
+            </a:r>
+          </a:p>
+        </p:txBody>
+      </p:sp>
+      <p:sp>
+        <p:nvSpPr>
+          <p:cNvPr id="3" name="Content Placeholder 2"/>
+          <p:cNvSpPr>
+            <a:spLocks noGrp="1"/>
+          </p:cNvSpPr>
+          <p:nvPr>
+            <p:ph idx="1"/>
+          </p:nvPr>
+        </p:nvSpPr>
+        <p:spPr/>
+        <p:txBody>
+          <a:bodyPr/>
+          <a:lstStyle/>
+          <a:p>
+            <a:r>
+              <a:rPr lang="en-US"/>
               <a:t>What is linear regression?</a:t>
             </a:r>
           </a:p>
-        </p:txBody>
-      </p:sp>
-      <p:sp>
-        <p:nvSpPr>
-          <p:cNvPr id="3" name="Content Placeholder 2"/>
-          <p:cNvSpPr>
-            <a:spLocks noGrp="1"/>
-          </p:cNvSpPr>
-          <p:nvPr>
-            <p:ph idx="1"/>
-          </p:nvPr>
-        </p:nvSpPr>
-        <p:spPr/>
-        <p:txBody>
-          <a:bodyPr/>
-          <a:lstStyle/>
-          <a:p>
-            <a:pPr>
-              <a:buNone/>
-            </a:pPr>
-            <a:r>
-              <a:rPr lang="en-US"/>
-              <a:t>There are three necessary components to any generalized linear model:</a:t>
-            </a:r>
-          </a:p>
-          <a:p>
-            <a:r>
-              <a:rPr lang="en-US"/>
-              <a:t>A formula specifying </a:t>
-            </a:r>
-            <a:r>
-              <a:rPr lang="en-US" b="1"/>
-              <a:t>predictor</a:t>
-            </a:r>
-            <a:r>
-              <a:rPr lang="en-US"/>
-              <a:t> and </a:t>
-            </a:r>
-            <a:r>
-              <a:rPr lang="en-US" b="1"/>
-              <a:t>response</a:t>
-            </a:r>
-            <a:r>
-              <a:rPr lang="en-US"/>
-              <a:t> variables: </a:t>
-            </a:r>
-            <a:r>
-              <a:rPr lang="en-US" i="1">
-                <a:latin typeface="Courier New"/>
-                <a:cs typeface="Courier New"/>
-              </a:rPr>
-              <a:t>y ~ x1 + x2 + x3</a:t>
-            </a:r>
-            <a:endParaRPr lang="en-US" b="1" i="1">
-              <a:latin typeface="Courier New"/>
-              <a:cs typeface="Courier New"/>
-            </a:endParaRPr>
-          </a:p>
-          <a:p>
-            <a:r>
-              <a:rPr lang="en-US"/>
-              <a:t>A model – </a:t>
-            </a:r>
-            <a:r>
-              <a:rPr lang="en-US" i="1"/>
-              <a:t>logit, probit, gamma, normal</a:t>
-            </a:r>
-          </a:p>
-          <a:p>
-            <a:r>
-              <a:rPr lang="en-US"/>
-              <a:t>Data – </a:t>
-            </a:r>
-            <a:r>
-              <a:rPr lang="en-US" i="1"/>
-              <a:t>a data-set stored as a </a:t>
-            </a:r>
-            <a:r>
-              <a:rPr lang="en-US" b="1" i="1"/>
-              <a:t>data.frame</a:t>
-            </a:r>
-          </a:p>
-          <a:p>
-            <a:endParaRPr lang="en-US"/>
+          <a:p>
+            <a:r>
+              <a:rPr lang="en-US"/>
+              <a:t>Generalized Linear Models (GLM)</a:t>
+            </a:r>
+          </a:p>
+          <a:p>
+            <a:r>
+              <a:rPr lang="en-US"/>
+              <a:t>Example</a:t>
+            </a:r>
           </a:p>
         </p:txBody>
       </p:sp>
     </p:spTree>
-    <p:extLst>
-      <p:ext uri="{BB962C8B-B14F-4D97-AF65-F5344CB8AC3E}">
-        <p14:creationId xmlns="" xmlns:a="http://schemas.openxmlformats.org/drawingml/2006/main" xmlns:r="http://schemas.openxmlformats.org/officeDocument/2006/relationships" xmlns:p="http://schemas.openxmlformats.org/presentationml/2006/main" xmlns:p14="http://schemas.microsoft.com/office/powerpoint/2010/main" xmlns:mv="urn:schemas-microsoft-com:mac:vml" xmlns:mc="http://schemas.openxmlformats.org/markup-compatibility/2006" val="3143245456"/>
-      </p:ext>
-    </p:extLst>
   </p:cSld>
   <p:clrMapOvr>
     <a:masterClrMapping/>
@@ -8234,7 +8139,7 @@
           <a:p>
             <a:r>
               <a:rPr lang="en-US"/>
-              <a:t>Basics</a:t>
+              <a:t>What is linear regression?</a:t>
             </a:r>
           </a:p>
         </p:txBody>
@@ -8251,69 +8156,68 @@
         </p:nvSpPr>
         <p:spPr/>
         <p:txBody>
-          <a:bodyPr/>
-          <a:lstStyle/>
-          <a:p>
-            <a:r>
-              <a:rPr lang="en-US"/>
-              <a:t>The "lm" model finds the function that best </a:t>
+          <a:bodyPr>
+            <a:normAutofit lnSpcReduction="10000"/>
+          </a:bodyPr>
+          <a:lstStyle/>
+          <a:p>
+            <a:r>
+              <a:rPr lang="en-US"/>
+              <a:t>A method for </a:t>
             </a:r>
             <a:r>
               <a:rPr lang="en-US" b="1"/>
-              <a:t>approximates </a:t>
-            </a:r>
-            <a:r>
-              <a:rPr lang="en-US"/>
-              <a:t>the observed data </a:t>
-            </a:r>
-            <a:r>
-              <a:rPr lang="en-US" b="1" u="sng"/>
-              <a:t>with a line</a:t>
-            </a:r>
-            <a:endParaRPr lang="en-US"/>
-          </a:p>
-          <a:p>
-            <a:r>
-              <a:rPr lang="en-US"/>
-              <a:t>Other regression models approximate observe data with a </a:t>
+              <a:t>explaining</a:t>
+            </a:r>
+            <a:r>
+              <a:rPr lang="en-US"/>
+              <a:t> and </a:t>
             </a:r>
             <a:r>
               <a:rPr lang="en-US" b="1"/>
-              <a:t>nonlinear function</a:t>
-            </a:r>
-            <a:r>
-              <a:rPr lang="en-US"/>
-              <a:t> that takes a line as its parameter</a:t>
+              <a:t>predicting</a:t>
+            </a:r>
+            <a:r>
+              <a:rPr lang="en-US"/>
+              <a:t> observations using data</a:t>
+            </a:r>
+          </a:p>
+          <a:p>
+            <a:r>
+              <a:rPr lang="en-US"/>
+              <a:t>A method for determining </a:t>
+            </a:r>
+            <a:r>
+              <a:rPr lang="en-US" b="1"/>
+              <a:t>unknown parameters</a:t>
+            </a:r>
+            <a:r>
+              <a:rPr lang="en-US"/>
+              <a:t> derived from a data set</a:t>
             </a:r>
           </a:p>
           <a:p>
             <a:pPr lvl="1"/>
             <a:r>
               <a:rPr lang="en-US"/>
-              <a:t>f(y) = X B</a:t>
+              <a:t>How dependent is my response variable on a particular parameter?</a:t>
+            </a:r>
+          </a:p>
+          <a:p>
+            <a:r>
+              <a:rPr lang="en-US"/>
+              <a:t>Specifically, a method for determining </a:t>
+            </a:r>
+            <a:r>
+              <a:rPr lang="en-US" b="1"/>
+              <a:t>conditional expected values</a:t>
             </a:r>
           </a:p>
           <a:p>
             <a:pPr lvl="1"/>
             <a:r>
               <a:rPr lang="en-US"/>
-              <a:t>Where </a:t>
-            </a:r>
-            <a:r>
-              <a:rPr lang="en-US" b="1"/>
-              <a:t>X</a:t>
-            </a:r>
-            <a:r>
-              <a:rPr lang="en-US"/>
-              <a:t> is a matrix and </a:t>
-            </a:r>
-            <a:r>
-              <a:rPr lang="en-US" b="1"/>
-              <a:t>B</a:t>
-            </a:r>
-            <a:r>
-              <a:rPr lang="en-US"/>
-              <a:t> is a vector</a:t>
+              <a:t>"Given x and y, the expected value is…"</a:t>
             </a:r>
           </a:p>
         </p:txBody>
@@ -8321,7 +8225,7 @@
     </p:spTree>
     <p:extLst>
       <p:ext uri="{BB962C8B-B14F-4D97-AF65-F5344CB8AC3E}">
-        <p14:creationId xmlns="" xmlns:a="http://schemas.openxmlformats.org/drawingml/2006/main" xmlns:r="http://schemas.openxmlformats.org/officeDocument/2006/relationships" xmlns:p="http://schemas.openxmlformats.org/presentationml/2006/main" xmlns:p14="http://schemas.microsoft.com/office/powerpoint/2010/main" xmlns:mv="urn:schemas-microsoft-com:mac:vml" xmlns:mc="http://schemas.openxmlformats.org/markup-compatibility/2006" val="1265913865"/>
+        <p14:creationId xmlns="" xmlns:a="http://schemas.openxmlformats.org/drawingml/2006/main" xmlns:r="http://schemas.openxmlformats.org/officeDocument/2006/relationships" xmlns:p="http://schemas.openxmlformats.org/presentationml/2006/main" xmlns:p14="http://schemas.microsoft.com/office/powerpoint/2010/main" xmlns:mv="urn:schemas-microsoft-com:mac:vml" xmlns:mc="http://schemas.openxmlformats.org/markup-compatibility/2006" val="1702243699"/>
       </p:ext>
     </p:extLst>
   </p:cSld>
@@ -8451,7 +8355,7 @@
           <a:p>
             <a:r>
               <a:rPr lang="en-US"/>
-              <a:t>Generalized Linear Models</a:t>
+              <a:t>What is linear regression?</a:t>
             </a:r>
           </a:p>
         </p:txBody>
@@ -8471,23 +8375,80 @@
           <a:bodyPr/>
           <a:lstStyle/>
           <a:p>
-            <a:r>
-              <a:rPr lang="en-US"/>
-              <a:t>The "least squares" method is the foundation of fitting generalized linear models (GLM's)</a:t>
-            </a:r>
-          </a:p>
-          <a:p>
-            <a:r>
-              <a:rPr lang="en-US"/>
-              <a:t>And information on how significantly the response variables varies with the predictor variables</a:t>
-            </a:r>
+            <a:pPr>
+              <a:buNone/>
+            </a:pPr>
+            <a:r>
+              <a:rPr lang="en-US"/>
+              <a:t>There are three necessary components to any generalized linear model:</a:t>
+            </a:r>
+          </a:p>
+          <a:p>
+            <a:r>
+              <a:rPr lang="en-US"/>
+              <a:t>A formula specifying </a:t>
+            </a:r>
+            <a:r>
+              <a:rPr lang="en-US" b="1"/>
+              <a:t>predictor</a:t>
+            </a:r>
+            <a:r>
+              <a:rPr lang="en-US"/>
+              <a:t> and </a:t>
+            </a:r>
+            <a:r>
+              <a:rPr lang="en-US" b="1"/>
+              <a:t>response</a:t>
+            </a:r>
+            <a:r>
+              <a:rPr lang="en-US"/>
+              <a:t> variables: </a:t>
+            </a:r>
+            <a:r>
+              <a:rPr lang="en-US" i="1">
+                <a:latin typeface="Courier New"/>
+                <a:cs typeface="Courier New"/>
+              </a:rPr>
+              <a:t>y ~ x1 + x2 + x3</a:t>
+            </a:r>
+            <a:endParaRPr lang="en-US" b="1" i="1">
+              <a:latin typeface="Courier New"/>
+              <a:cs typeface="Courier New"/>
+            </a:endParaRPr>
+          </a:p>
+          <a:p>
+            <a:r>
+              <a:rPr lang="en-US"/>
+              <a:t>A model – </a:t>
+            </a:r>
+            <a:r>
+              <a:rPr lang="en-US" i="1"/>
+              <a:t>logit, probit, gamma, normal</a:t>
+            </a:r>
+          </a:p>
+          <a:p>
+            <a:r>
+              <a:rPr lang="en-US"/>
+              <a:t>Data – </a:t>
+            </a:r>
+            <a:r>
+              <a:rPr lang="en-US" i="1"/>
+              <a:t>a data-set stored as a </a:t>
+            </a:r>
+            <a:r>
+              <a:rPr lang="en-US" b="1" i="1"/>
+              <a:t>data.frame</a:t>
+            </a:r>
+          </a:p>
+          <a:p>
+            <a:endParaRPr lang="en-US"/>
           </a:p>
         </p:txBody>
       </p:sp>
     </p:spTree>
     <p:extLst>
       <p:ext uri="{BB962C8B-B14F-4D97-AF65-F5344CB8AC3E}">
-        <p14:creationId xmlns="" xmlns:a="http://schemas.openxmlformats.org/drawingml/2006/main" xmlns:r="http://schemas.openxmlformats.org/officeDocument/2006/relationships" xmlns:p="http://schemas.openxmlformats.org/presentationml/2006/main" xmlns:p14="http://schemas.microsoft.com/office/powerpoint/2010/main" xmlns:mv="urn:schemas-microsoft-com:mac:vml" xmlns:mc="http://schemas.openxmlformats.org/markup-compatibility/2006" val="3465388416"/>
+        <p14:creationId xmlns="" xmlns:a="http://schemas.openxmlformats.org/drawingml/2006/main" xmlns:r="http://schemas.openxmlformats.org/officeDocument/2006/relationships" xmlns:p="http://schemas.openxmlformats.org/presentationml/2006/main" xmlns:p14="http://schemas.microsoft.com/office/powerpoint/2010/main" xmlns:mv="urn:schemas-microsoft-com:mac:vml" xmlns:mc="http://schemas.openxmlformats.org/markup-compatibility/2006" val="3143245456"/>
       </p:ext>
     </p:extLst>
   </p:cSld>
@@ -8538,34 +8499,94 @@
           <a:p>
             <a:r>
               <a:rPr lang="en-US"/>
-              <a:t>Example: Data</a:t>
-            </a:r>
-          </a:p>
-        </p:txBody>
-      </p:sp>
-      <p:pic>
-        <p:nvPicPr>
-          <p:cNvPr id="6" name="Content Placeholder 5" descr="Linear_Data.png"/>
-          <p:cNvPicPr>
-            <a:picLocks noGrp="1" noChangeAspect="1"/>
-          </p:cNvPicPr>
+              <a:t>Basics</a:t>
+            </a:r>
+          </a:p>
+        </p:txBody>
+      </p:sp>
+      <p:sp>
+        <p:nvSpPr>
+          <p:cNvPr id="3" name="Content Placeholder 2"/>
+          <p:cNvSpPr>
+            <a:spLocks noGrp="1"/>
+          </p:cNvSpPr>
           <p:nvPr>
             <p:ph idx="1"/>
           </p:nvPr>
-        </p:nvPicPr>
-        <p:blipFill>
-          <a:blip r:embed="rId2"/>
-          <a:srcRect l="-40915" r="-40915"/>
-          <a:stretch>
-            <a:fillRect/>
-          </a:stretch>
-        </p:blipFill>
+        </p:nvSpPr>
         <p:spPr/>
-      </p:pic>
+        <p:txBody>
+          <a:bodyPr/>
+          <a:lstStyle/>
+          <a:p>
+            <a:r>
+              <a:rPr lang="en-US"/>
+              <a:t>The "lm" model finds the function that best </a:t>
+            </a:r>
+            <a:r>
+              <a:rPr lang="en-US" b="1"/>
+              <a:t>approximates </a:t>
+            </a:r>
+            <a:r>
+              <a:rPr lang="en-US"/>
+              <a:t>the observed data </a:t>
+            </a:r>
+            <a:r>
+              <a:rPr lang="en-US" b="1" u="sng"/>
+              <a:t>with a line</a:t>
+            </a:r>
+            <a:endParaRPr lang="en-US"/>
+          </a:p>
+          <a:p>
+            <a:r>
+              <a:rPr lang="en-US"/>
+              <a:t>Other regression models approximate observe data with a </a:t>
+            </a:r>
+            <a:r>
+              <a:rPr lang="en-US" b="1"/>
+              <a:t>nonlinear function</a:t>
+            </a:r>
+            <a:r>
+              <a:rPr lang="en-US"/>
+              <a:t> that takes a line as its parameter</a:t>
+            </a:r>
+          </a:p>
+          <a:p>
+            <a:pPr lvl="1"/>
+            <a:r>
+              <a:rPr lang="en-US"/>
+              <a:t>f(y) = X B</a:t>
+            </a:r>
+          </a:p>
+          <a:p>
+            <a:pPr lvl="1"/>
+            <a:r>
+              <a:rPr lang="en-US"/>
+              <a:t>Where </a:t>
+            </a:r>
+            <a:r>
+              <a:rPr lang="en-US" b="1"/>
+              <a:t>X</a:t>
+            </a:r>
+            <a:r>
+              <a:rPr lang="en-US"/>
+              <a:t> is a matrix and </a:t>
+            </a:r>
+            <a:r>
+              <a:rPr lang="en-US" b="1"/>
+              <a:t>B</a:t>
+            </a:r>
+            <a:r>
+              <a:rPr lang="en-US"/>
+              <a:t> is a vector</a:t>
+            </a:r>
+          </a:p>
+        </p:txBody>
+      </p:sp>
     </p:spTree>
     <p:extLst>
       <p:ext uri="{BB962C8B-B14F-4D97-AF65-F5344CB8AC3E}">
-        <p14:creationId xmlns="" xmlns:a="http://schemas.openxmlformats.org/drawingml/2006/main" xmlns:r="http://schemas.openxmlformats.org/officeDocument/2006/relationships" xmlns:p="http://schemas.openxmlformats.org/presentationml/2006/main" xmlns:p14="http://schemas.microsoft.com/office/powerpoint/2010/main" xmlns:mv="urn:schemas-microsoft-com:mac:vml" xmlns:mc="http://schemas.openxmlformats.org/markup-compatibility/2006" val="2972905603"/>
+        <p14:creationId xmlns="" xmlns:a="http://schemas.openxmlformats.org/drawingml/2006/main" xmlns:r="http://schemas.openxmlformats.org/officeDocument/2006/relationships" xmlns:p="http://schemas.openxmlformats.org/presentationml/2006/main" xmlns:p14="http://schemas.microsoft.com/office/powerpoint/2010/main" xmlns:mv="urn:schemas-microsoft-com:mac:vml" xmlns:mc="http://schemas.openxmlformats.org/markup-compatibility/2006" val="1265913865"/>
       </p:ext>
     </p:extLst>
   </p:cSld>
@@ -8611,48 +8632,48 @@
         </p:nvSpPr>
         <p:spPr/>
         <p:txBody>
-          <a:bodyPr>
-            <a:normAutofit fontScale="90000"/>
-          </a:bodyPr>
-          <a:lstStyle/>
-          <a:p>
-            <a:r>
-              <a:rPr lang="en-US"/>
-              <a:t>Example: Data</a:t>
-            </a:r>
-            <a:br>
-              <a:rPr lang="en-US"/>
-            </a:br>
-            <a:r>
-              <a:rPr lang="en-US"/>
-              <a:t>(and Linear Regression)</a:t>
-            </a:r>
-          </a:p>
-        </p:txBody>
-      </p:sp>
-      <p:pic>
-        <p:nvPicPr>
-          <p:cNvPr id="4" name="Content Placeholder 3" descr="Linear_Regression.png"/>
-          <p:cNvPicPr>
-            <a:picLocks noGrp="1" noChangeAspect="1"/>
-          </p:cNvPicPr>
+          <a:bodyPr/>
+          <a:lstStyle/>
+          <a:p>
+            <a:r>
+              <a:rPr lang="en-US"/>
+              <a:t>Generalized Linear Models</a:t>
+            </a:r>
+          </a:p>
+        </p:txBody>
+      </p:sp>
+      <p:sp>
+        <p:nvSpPr>
+          <p:cNvPr id="3" name="Content Placeholder 2"/>
+          <p:cNvSpPr>
+            <a:spLocks noGrp="1"/>
+          </p:cNvSpPr>
           <p:nvPr>
             <p:ph idx="1"/>
           </p:nvPr>
-        </p:nvPicPr>
-        <p:blipFill>
-          <a:blip r:embed="rId2"/>
-          <a:srcRect l="-40915" r="-40915"/>
-          <a:stretch>
-            <a:fillRect/>
-          </a:stretch>
-        </p:blipFill>
+        </p:nvSpPr>
         <p:spPr/>
-      </p:pic>
+        <p:txBody>
+          <a:bodyPr/>
+          <a:lstStyle/>
+          <a:p>
+            <a:r>
+              <a:rPr lang="en-US"/>
+              <a:t>The "least squares" method is the foundation of fitting generalized linear models (GLM's)</a:t>
+            </a:r>
+          </a:p>
+          <a:p>
+            <a:r>
+              <a:rPr lang="en-US"/>
+              <a:t>And information on how significantly the response variables varies with the predictor variables</a:t>
+            </a:r>
+          </a:p>
+        </p:txBody>
+      </p:sp>
     </p:spTree>
     <p:extLst>
       <p:ext uri="{BB962C8B-B14F-4D97-AF65-F5344CB8AC3E}">
-        <p14:creationId xmlns="" xmlns:a="http://schemas.openxmlformats.org/drawingml/2006/main" xmlns:r="http://schemas.openxmlformats.org/officeDocument/2006/relationships" xmlns:p="http://schemas.openxmlformats.org/presentationml/2006/main" xmlns:p14="http://schemas.microsoft.com/office/powerpoint/2010/main" xmlns:mv="urn:schemas-microsoft-com:mac:vml" xmlns:mc="http://schemas.openxmlformats.org/markup-compatibility/2006" val="2382241759"/>
+        <p14:creationId xmlns="" xmlns:a="http://schemas.openxmlformats.org/drawingml/2006/main" xmlns:r="http://schemas.openxmlformats.org/officeDocument/2006/relationships" xmlns:p="http://schemas.openxmlformats.org/presentationml/2006/main" xmlns:p14="http://schemas.microsoft.com/office/powerpoint/2010/main" xmlns:mv="urn:schemas-microsoft-com:mac:vml" xmlns:mc="http://schemas.openxmlformats.org/markup-compatibility/2006" val="3465388416"/>
       </p:ext>
     </p:extLst>
   </p:cSld>
@@ -8688,12 +8709,12 @@
       </p:grpSpPr>
       <p:sp>
         <p:nvSpPr>
-          <p:cNvPr id="3" name="Title 2"/>
-          <p:cNvSpPr>
-            <a:spLocks noGrp="1"/>
-          </p:cNvSpPr>
-          <p:nvPr>
-            <p:ph type="ctrTitle"/>
+          <p:cNvPr id="2" name="Title 1"/>
+          <p:cNvSpPr>
+            <a:spLocks noGrp="1"/>
+          </p:cNvSpPr>
+          <p:nvPr>
+            <p:ph type="title"/>
           </p:nvPr>
         </p:nvSpPr>
         <p:spPr/>
@@ -8702,36 +8723,35 @@
           <a:lstStyle/>
           <a:p>
             <a:r>
-              <a:rPr lang="en-US" dirty="0" smtClean="0"/>
-              <a:t>The zelig2 Method</a:t>
-            </a:r>
-            <a:endParaRPr lang="en-US" dirty="0"/>
-          </a:p>
-        </p:txBody>
-      </p:sp>
-      <p:sp>
-        <p:nvSpPr>
-          <p:cNvPr id="4" name="Subtitle 3"/>
-          <p:cNvSpPr>
-            <a:spLocks noGrp="1"/>
-          </p:cNvSpPr>
-          <p:nvPr>
-            <p:ph type="subTitle" idx="1"/>
-          </p:nvPr>
-        </p:nvSpPr>
+              <a:rPr lang="en-US"/>
+              <a:t>Example: Data</a:t>
+            </a:r>
+          </a:p>
+        </p:txBody>
+      </p:sp>
+      <p:pic>
+        <p:nvPicPr>
+          <p:cNvPr id="6" name="Content Placeholder 5" descr="Linear_Data.png"/>
+          <p:cNvPicPr>
+            <a:picLocks noGrp="1" noChangeAspect="1"/>
+          </p:cNvPicPr>
+          <p:nvPr>
+            <p:ph idx="1"/>
+          </p:nvPr>
+        </p:nvPicPr>
+        <p:blipFill>
+          <a:blip r:embed="rId2"/>
+          <a:srcRect l="-40915" r="-40915"/>
+          <a:stretch>
+            <a:fillRect/>
+          </a:stretch>
+        </p:blipFill>
         <p:spPr/>
-        <p:txBody>
-          <a:bodyPr/>
-          <a:lstStyle/>
-          <a:p>
-            <a:endParaRPr lang="en-US"/>
-          </a:p>
-        </p:txBody>
-      </p:sp>
+      </p:pic>
     </p:spTree>
     <p:extLst>
       <p:ext uri="{BB962C8B-B14F-4D97-AF65-F5344CB8AC3E}">
-        <p14:creationId xmlns="" xmlns:a="http://schemas.openxmlformats.org/drawingml/2006/main" xmlns:r="http://schemas.openxmlformats.org/officeDocument/2006/relationships" xmlns:p="http://schemas.openxmlformats.org/presentationml/2006/main" xmlns:p14="http://schemas.microsoft.com/office/powerpoint/2010/main" xmlns:mv="urn:schemas-microsoft-com:mac:vml" xmlns:mc="http://schemas.openxmlformats.org/markup-compatibility/2006" val="2601398369"/>
+        <p14:creationId xmlns="" xmlns:a="http://schemas.openxmlformats.org/drawingml/2006/main" xmlns:r="http://schemas.openxmlformats.org/officeDocument/2006/relationships" xmlns:p="http://schemas.openxmlformats.org/presentationml/2006/main" xmlns:p14="http://schemas.microsoft.com/office/powerpoint/2010/main" xmlns:mv="urn:schemas-microsoft-com:mac:vml" xmlns:mc="http://schemas.openxmlformats.org/markup-compatibility/2006" val="2972905603"/>
       </p:ext>
     </p:extLst>
   </p:cSld>
@@ -8777,64 +8797,48 @@
         </p:nvSpPr>
         <p:spPr/>
         <p:txBody>
-          <a:bodyPr/>
-          <a:lstStyle/>
-          <a:p>
-            <a:r>
-              <a:rPr lang="en-US" dirty="0" smtClean="0"/>
-              <a:t>Outline</a:t>
-            </a:r>
-            <a:endParaRPr lang="en-US" dirty="0"/>
-          </a:p>
-        </p:txBody>
-      </p:sp>
-      <p:sp>
-        <p:nvSpPr>
-          <p:cNvPr id="3" name="Content Placeholder 2"/>
-          <p:cNvSpPr>
-            <a:spLocks noGrp="1"/>
-          </p:cNvSpPr>
+          <a:bodyPr>
+            <a:normAutofit fontScale="90000"/>
+          </a:bodyPr>
+          <a:lstStyle/>
+          <a:p>
+            <a:r>
+              <a:rPr lang="en-US"/>
+              <a:t>Example: Data</a:t>
+            </a:r>
+            <a:br>
+              <a:rPr lang="en-US"/>
+            </a:br>
+            <a:r>
+              <a:rPr lang="en-US"/>
+              <a:t>(and Linear Regression)</a:t>
+            </a:r>
+          </a:p>
+        </p:txBody>
+      </p:sp>
+      <p:pic>
+        <p:nvPicPr>
+          <p:cNvPr id="4" name="Content Placeholder 3" descr="Linear_Regression.png"/>
+          <p:cNvPicPr>
+            <a:picLocks noGrp="1" noChangeAspect="1"/>
+          </p:cNvPicPr>
           <p:nvPr>
             <p:ph idx="1"/>
           </p:nvPr>
-        </p:nvSpPr>
+        </p:nvPicPr>
+        <p:blipFill>
+          <a:blip r:embed="rId2"/>
+          <a:srcRect l="-40915" r="-40915"/>
+          <a:stretch>
+            <a:fillRect/>
+          </a:stretch>
+        </p:blipFill>
         <p:spPr/>
-        <p:txBody>
-          <a:bodyPr/>
-          <a:lstStyle/>
-          <a:p>
-            <a:r>
-              <a:rPr lang="en-US" dirty="0" smtClean="0"/>
-              <a:t>Overview</a:t>
-            </a:r>
-          </a:p>
-          <a:p>
-            <a:r>
-              <a:rPr lang="en-US" dirty="0" smtClean="0"/>
-              <a:t>What is a "zelig2" method?</a:t>
-            </a:r>
-          </a:p>
-          <a:p>
-            <a:r>
-              <a:rPr lang="en-US" dirty="0" smtClean="0"/>
-              <a:t>Format of a zelig2 method</a:t>
-            </a:r>
-          </a:p>
-          <a:p>
-            <a:r>
-              <a:rPr lang="en-US" dirty="0" smtClean="0"/>
-              <a:t>Writing the zelig2 method</a:t>
-            </a:r>
-          </a:p>
-          <a:p>
-            <a:endParaRPr lang="en-US" dirty="0"/>
-          </a:p>
-        </p:txBody>
-      </p:sp>
+      </p:pic>
     </p:spTree>
     <p:extLst>
       <p:ext uri="{BB962C8B-B14F-4D97-AF65-F5344CB8AC3E}">
-        <p14:creationId xmlns="" xmlns:a="http://schemas.openxmlformats.org/drawingml/2006/main" xmlns:r="http://schemas.openxmlformats.org/officeDocument/2006/relationships" xmlns:p="http://schemas.openxmlformats.org/presentationml/2006/main" xmlns:p14="http://schemas.microsoft.com/office/powerpoint/2010/main" xmlns:mv="urn:schemas-microsoft-com:mac:vml" xmlns:mc="http://schemas.openxmlformats.org/markup-compatibility/2006" val="520387571"/>
+        <p14:creationId xmlns="" xmlns:a="http://schemas.openxmlformats.org/drawingml/2006/main" xmlns:r="http://schemas.openxmlformats.org/officeDocument/2006/relationships" xmlns:p="http://schemas.openxmlformats.org/presentationml/2006/main" xmlns:p14="http://schemas.microsoft.com/office/powerpoint/2010/main" xmlns:mv="urn:schemas-microsoft-com:mac:vml" xmlns:mc="http://schemas.openxmlformats.org/markup-compatibility/2006" val="2382241759"/>
       </p:ext>
     </p:extLst>
   </p:cSld>
@@ -8870,12 +8874,12 @@
       </p:grpSpPr>
       <p:sp>
         <p:nvSpPr>
-          <p:cNvPr id="2" name="Title 1"/>
-          <p:cNvSpPr>
-            <a:spLocks noGrp="1"/>
-          </p:cNvSpPr>
-          <p:nvPr>
-            <p:ph type="title"/>
+          <p:cNvPr id="3" name="Title 2"/>
+          <p:cNvSpPr>
+            <a:spLocks noGrp="1"/>
+          </p:cNvSpPr>
+          <p:nvPr>
+            <p:ph type="ctrTitle"/>
           </p:nvPr>
         </p:nvSpPr>
         <p:spPr/>
@@ -8884,20 +8888,21 @@
           <a:lstStyle/>
           <a:p>
             <a:r>
-              <a:rPr lang="en-US"/>
-              <a:t>Overview</a:t>
-            </a:r>
-          </a:p>
-        </p:txBody>
-      </p:sp>
-      <p:sp>
-        <p:nvSpPr>
-          <p:cNvPr id="3" name="Content Placeholder 2"/>
-          <p:cNvSpPr>
-            <a:spLocks noGrp="1"/>
-          </p:cNvSpPr>
-          <p:nvPr>
-            <p:ph idx="1"/>
+              <a:rPr lang="en-US" dirty="0" smtClean="0"/>
+              <a:t>The zelig2 Method</a:t>
+            </a:r>
+            <a:endParaRPr lang="en-US" dirty="0"/>
+          </a:p>
+        </p:txBody>
+      </p:sp>
+      <p:sp>
+        <p:nvSpPr>
+          <p:cNvPr id="4" name="Subtitle 3"/>
+          <p:cNvSpPr>
+            <a:spLocks noGrp="1"/>
+          </p:cNvSpPr>
+          <p:nvPr>
+            <p:ph type="subTitle" idx="1"/>
           </p:nvPr>
         </p:nvSpPr>
         <p:spPr/>
@@ -8905,26 +8910,16 @@
           <a:bodyPr/>
           <a:lstStyle/>
           <a:p>
-            <a:r>
-              <a:rPr lang="en-US"/>
-              <a:t>Today we are focusing on fitting the statistical model</a:t>
-            </a:r>
-          </a:p>
-          <a:p>
-            <a:r>
-              <a:rPr lang="en-US"/>
-              <a:t>Zelig requires (typically) that the model is fitted externally</a:t>
-            </a:r>
-          </a:p>
-          <a:p>
-            <a:r>
-              <a:rPr lang="en-US"/>
-              <a:t>Most models are based on "lm" or "glm" because of their general nature</a:t>
-            </a:r>
+            <a:endParaRPr lang="en-US"/>
           </a:p>
         </p:txBody>
       </p:sp>
     </p:spTree>
+    <p:extLst>
+      <p:ext uri="{BB962C8B-B14F-4D97-AF65-F5344CB8AC3E}">
+        <p14:creationId xmlns="" xmlns:a="http://schemas.openxmlformats.org/drawingml/2006/main" xmlns:r="http://schemas.openxmlformats.org/officeDocument/2006/relationships" xmlns:p="http://schemas.openxmlformats.org/presentationml/2006/main" xmlns:p14="http://schemas.microsoft.com/office/powerpoint/2010/main" xmlns:mv="urn:schemas-microsoft-com:mac:vml" xmlns:mc="http://schemas.openxmlformats.org/markup-compatibility/2006" val="2601398369"/>
+      </p:ext>
+    </p:extLst>
   </p:cSld>
   <p:clrMapOvr>
     <a:masterClrMapping/>
@@ -8973,6 +8968,197 @@
           <a:p>
             <a:r>
               <a:rPr lang="en-US" dirty="0" smtClean="0"/>
+              <a:t>Outline</a:t>
+            </a:r>
+            <a:endParaRPr lang="en-US" dirty="0"/>
+          </a:p>
+        </p:txBody>
+      </p:sp>
+      <p:sp>
+        <p:nvSpPr>
+          <p:cNvPr id="3" name="Content Placeholder 2"/>
+          <p:cNvSpPr>
+            <a:spLocks noGrp="1"/>
+          </p:cNvSpPr>
+          <p:nvPr>
+            <p:ph idx="1"/>
+          </p:nvPr>
+        </p:nvSpPr>
+        <p:spPr/>
+        <p:txBody>
+          <a:bodyPr/>
+          <a:lstStyle/>
+          <a:p>
+            <a:r>
+              <a:rPr lang="en-US" dirty="0" smtClean="0"/>
+              <a:t>Overview</a:t>
+            </a:r>
+          </a:p>
+          <a:p>
+            <a:r>
+              <a:rPr lang="en-US" dirty="0" smtClean="0"/>
+              <a:t>What is a "zelig2" method?</a:t>
+            </a:r>
+          </a:p>
+          <a:p>
+            <a:r>
+              <a:rPr lang="en-US" dirty="0" smtClean="0"/>
+              <a:t>Format of a zelig2 method</a:t>
+            </a:r>
+          </a:p>
+          <a:p>
+            <a:r>
+              <a:rPr lang="en-US" dirty="0" smtClean="0"/>
+              <a:t>Writing the zelig2 method</a:t>
+            </a:r>
+          </a:p>
+          <a:p>
+            <a:endParaRPr lang="en-US" dirty="0"/>
+          </a:p>
+        </p:txBody>
+      </p:sp>
+    </p:spTree>
+    <p:extLst>
+      <p:ext uri="{BB962C8B-B14F-4D97-AF65-F5344CB8AC3E}">
+        <p14:creationId xmlns="" xmlns:a="http://schemas.openxmlformats.org/drawingml/2006/main" xmlns:r="http://schemas.openxmlformats.org/officeDocument/2006/relationships" xmlns:p="http://schemas.openxmlformats.org/presentationml/2006/main" xmlns:p14="http://schemas.microsoft.com/office/powerpoint/2010/main" xmlns:mv="urn:schemas-microsoft-com:mac:vml" xmlns:mc="http://schemas.openxmlformats.org/markup-compatibility/2006" val="520387571"/>
+      </p:ext>
+    </p:extLst>
+  </p:cSld>
+  <p:clrMapOvr>
+    <a:masterClrMapping/>
+  </p:clrMapOvr>
+  <p:timing>
+    <p:tnLst>
+      <p:par>
+        <p:cTn id="1" dur="indefinite" restart="never" nodeType="tmRoot"/>
+      </p:par>
+    </p:tnLst>
+  </p:timing>
+</p:sld>
+</file>
+
+<file path=ppt/slides/slide37.xml><?xml version="1.0" encoding="utf-8"?>
+<p:sld xmlns:a="http://schemas.openxmlformats.org/drawingml/2006/main" xmlns:r="http://schemas.openxmlformats.org/officeDocument/2006/relationships" xmlns:mc="http://schemas.openxmlformats.org/markup-compatibility/2006" xmlns:mv="urn:schemas-microsoft-com:mac:vml" xmlns:p="http://schemas.openxmlformats.org/presentationml/2006/main" mc:Ignorable="mv" mc:PreserveAttributes="mv:*">
+  <p:cSld>
+    <p:spTree>
+      <p:nvGrpSpPr>
+        <p:cNvPr id="1" name=""/>
+        <p:cNvGrpSpPr/>
+        <p:nvPr/>
+      </p:nvGrpSpPr>
+      <p:grpSpPr>
+        <a:xfrm>
+          <a:off x="0" y="0"/>
+          <a:ext cx="0" cy="0"/>
+          <a:chOff x="0" y="0"/>
+          <a:chExt cx="0" cy="0"/>
+        </a:xfrm>
+      </p:grpSpPr>
+      <p:sp>
+        <p:nvSpPr>
+          <p:cNvPr id="2" name="Title 1"/>
+          <p:cNvSpPr>
+            <a:spLocks noGrp="1"/>
+          </p:cNvSpPr>
+          <p:nvPr>
+            <p:ph type="title"/>
+          </p:nvPr>
+        </p:nvSpPr>
+        <p:spPr/>
+        <p:txBody>
+          <a:bodyPr/>
+          <a:lstStyle/>
+          <a:p>
+            <a:r>
+              <a:rPr lang="en-US"/>
+              <a:t>Overview</a:t>
+            </a:r>
+          </a:p>
+        </p:txBody>
+      </p:sp>
+      <p:sp>
+        <p:nvSpPr>
+          <p:cNvPr id="3" name="Content Placeholder 2"/>
+          <p:cNvSpPr>
+            <a:spLocks noGrp="1"/>
+          </p:cNvSpPr>
+          <p:nvPr>
+            <p:ph idx="1"/>
+          </p:nvPr>
+        </p:nvSpPr>
+        <p:spPr/>
+        <p:txBody>
+          <a:bodyPr/>
+          <a:lstStyle/>
+          <a:p>
+            <a:r>
+              <a:rPr lang="en-US"/>
+              <a:t>Today we are focusing on fitting the statistical model</a:t>
+            </a:r>
+          </a:p>
+          <a:p>
+            <a:r>
+              <a:rPr lang="en-US"/>
+              <a:t>Zelig requires (typically) that the model is fitted externally</a:t>
+            </a:r>
+          </a:p>
+          <a:p>
+            <a:r>
+              <a:rPr lang="en-US"/>
+              <a:t>Most models are based on "lm" or "glm" because of their general nature</a:t>
+            </a:r>
+          </a:p>
+        </p:txBody>
+      </p:sp>
+    </p:spTree>
+  </p:cSld>
+  <p:clrMapOvr>
+    <a:masterClrMapping/>
+  </p:clrMapOvr>
+  <p:timing>
+    <p:tnLst>
+      <p:par>
+        <p:cTn id="1" dur="indefinite" restart="never" nodeType="tmRoot"/>
+      </p:par>
+    </p:tnLst>
+  </p:timing>
+</p:sld>
+</file>
+
+<file path=ppt/slides/slide38.xml><?xml version="1.0" encoding="utf-8"?>
+<p:sld xmlns:a="http://schemas.openxmlformats.org/drawingml/2006/main" xmlns:r="http://schemas.openxmlformats.org/officeDocument/2006/relationships" xmlns:mc="http://schemas.openxmlformats.org/markup-compatibility/2006" xmlns:mv="urn:schemas-microsoft-com:mac:vml" xmlns:p="http://schemas.openxmlformats.org/presentationml/2006/main" mc:Ignorable="mv" mc:PreserveAttributes="mv:*">
+  <p:cSld>
+    <p:spTree>
+      <p:nvGrpSpPr>
+        <p:cNvPr id="1" name=""/>
+        <p:cNvGrpSpPr/>
+        <p:nvPr/>
+      </p:nvGrpSpPr>
+      <p:grpSpPr>
+        <a:xfrm>
+          <a:off x="0" y="0"/>
+          <a:ext cx="0" cy="0"/>
+          <a:chOff x="0" y="0"/>
+          <a:chExt cx="0" cy="0"/>
+        </a:xfrm>
+      </p:grpSpPr>
+      <p:sp>
+        <p:nvSpPr>
+          <p:cNvPr id="2" name="Title 1"/>
+          <p:cNvSpPr>
+            <a:spLocks noGrp="1"/>
+          </p:cNvSpPr>
+          <p:nvPr>
+            <p:ph type="title"/>
+          </p:nvPr>
+        </p:nvSpPr>
+        <p:spPr/>
+        <p:txBody>
+          <a:bodyPr/>
+          <a:lstStyle/>
+          <a:p>
+            <a:r>
+              <a:rPr lang="en-US" dirty="0" smtClean="0"/>
               <a:t>Goals</a:t>
             </a:r>
             <a:endParaRPr lang="en-US" dirty="0"/>
@@ -9072,7 +9258,7 @@
 </p:sld>
 </file>
 
-<file path=ppt/slides/slide37.xml><?xml version="1.0" encoding="utf-8"?>
+<file path=ppt/slides/slide39.xml><?xml version="1.0" encoding="utf-8"?>
 <p:sld xmlns:a="http://schemas.openxmlformats.org/drawingml/2006/main" xmlns:r="http://schemas.openxmlformats.org/officeDocument/2006/relationships" xmlns:mc="http://schemas.openxmlformats.org/markup-compatibility/2006" xmlns:mv="urn:schemas-microsoft-com:mac:vml" xmlns:p="http://schemas.openxmlformats.org/presentationml/2006/main" mc:Ignorable="mv" mc:PreserveAttributes="mv:*">
   <p:cSld>
     <p:spTree>
@@ -10606,213 +10792,6 @@
 </p:sld>
 </file>
 
-<file path=ppt/slides/slide38.xml><?xml version="1.0" encoding="utf-8"?>
-<p:sld xmlns:a="http://schemas.openxmlformats.org/drawingml/2006/main" xmlns:r="http://schemas.openxmlformats.org/officeDocument/2006/relationships" xmlns:mc="http://schemas.openxmlformats.org/markup-compatibility/2006" xmlns:mv="urn:schemas-microsoft-com:mac:vml" xmlns:p="http://schemas.openxmlformats.org/presentationml/2006/main" mc:Ignorable="mv" mc:PreserveAttributes="mv:*">
-  <p:cSld>
-    <p:spTree>
-      <p:nvGrpSpPr>
-        <p:cNvPr id="1" name=""/>
-        <p:cNvGrpSpPr/>
-        <p:nvPr/>
-      </p:nvGrpSpPr>
-      <p:grpSpPr>
-        <a:xfrm>
-          <a:off x="0" y="0"/>
-          <a:ext cx="0" cy="0"/>
-          <a:chOff x="0" y="0"/>
-          <a:chExt cx="0" cy="0"/>
-        </a:xfrm>
-      </p:grpSpPr>
-      <p:sp>
-        <p:nvSpPr>
-          <p:cNvPr id="2" name="Title 1"/>
-          <p:cNvSpPr>
-            <a:spLocks noGrp="1"/>
-          </p:cNvSpPr>
-          <p:nvPr>
-            <p:ph type="title"/>
-          </p:nvPr>
-        </p:nvSpPr>
-        <p:spPr/>
-        <p:txBody>
-          <a:bodyPr>
-            <a:normAutofit/>
-          </a:bodyPr>
-          <a:lstStyle/>
-          <a:p>
-            <a:r>
-              <a:rPr lang="en-US"/>
-              <a:t>Writing the "zelig2" Method</a:t>
-            </a:r>
-          </a:p>
-        </p:txBody>
-      </p:sp>
-      <p:sp>
-        <p:nvSpPr>
-          <p:cNvPr id="3" name="Content Placeholder 2"/>
-          <p:cNvSpPr>
-            <a:spLocks noGrp="1"/>
-          </p:cNvSpPr>
-          <p:nvPr>
-            <p:ph idx="1"/>
-          </p:nvPr>
-        </p:nvSpPr>
-        <p:spPr/>
-        <p:txBody>
-          <a:bodyPr/>
-          <a:lstStyle/>
-          <a:p>
-            <a:r>
-              <a:rPr lang="en-US"/>
-              <a:t>Has three parts</a:t>
-            </a:r>
-          </a:p>
-          <a:p>
-            <a:pPr lvl="1"/>
-            <a:r>
-              <a:rPr lang="en-US"/>
-              <a:t>Function signature</a:t>
-            </a:r>
-          </a:p>
-          <a:p>
-            <a:pPr lvl="1"/>
-            <a:r>
-              <a:rPr lang="en-US"/>
-              <a:t>Function Body</a:t>
-            </a:r>
-          </a:p>
-          <a:p>
-            <a:pPr lvl="1"/>
-            <a:r>
-              <a:rPr lang="en-US"/>
-              <a:t>Return Value</a:t>
-            </a:r>
-          </a:p>
-        </p:txBody>
-      </p:sp>
-    </p:spTree>
-  </p:cSld>
-  <p:clrMapOvr>
-    <a:masterClrMapping/>
-  </p:clrMapOvr>
-  <p:timing>
-    <p:tnLst>
-      <p:par>
-        <p:cTn id="1" dur="indefinite" restart="never" nodeType="tmRoot"/>
-      </p:par>
-    </p:tnLst>
-  </p:timing>
-</p:sld>
-</file>
-
-<file path=ppt/slides/slide39.xml><?xml version="1.0" encoding="utf-8"?>
-<p:sld xmlns:a="http://schemas.openxmlformats.org/drawingml/2006/main" xmlns:r="http://schemas.openxmlformats.org/officeDocument/2006/relationships" xmlns:mc="http://schemas.openxmlformats.org/markup-compatibility/2006" xmlns:mv="urn:schemas-microsoft-com:mac:vml" xmlns:p="http://schemas.openxmlformats.org/presentationml/2006/main" mc:Ignorable="mv" mc:PreserveAttributes="mv:*">
-  <p:cSld>
-    <p:spTree>
-      <p:nvGrpSpPr>
-        <p:cNvPr id="1" name=""/>
-        <p:cNvGrpSpPr/>
-        <p:nvPr/>
-      </p:nvGrpSpPr>
-      <p:grpSpPr>
-        <a:xfrm>
-          <a:off x="0" y="0"/>
-          <a:ext cx="0" cy="0"/>
-          <a:chOff x="0" y="0"/>
-          <a:chExt cx="0" cy="0"/>
-        </a:xfrm>
-      </p:grpSpPr>
-      <p:sp>
-        <p:nvSpPr>
-          <p:cNvPr id="2" name="Title 1"/>
-          <p:cNvSpPr>
-            <a:spLocks noGrp="1"/>
-          </p:cNvSpPr>
-          <p:nvPr>
-            <p:ph type="title"/>
-          </p:nvPr>
-        </p:nvSpPr>
-        <p:spPr/>
-        <p:txBody>
-          <a:bodyPr/>
-          <a:lstStyle/>
-          <a:p>
-            <a:r>
-              <a:rPr lang="en-US"/>
-              <a:t>zelig2: Function Signature</a:t>
-            </a:r>
-          </a:p>
-        </p:txBody>
-      </p:sp>
-      <p:sp>
-        <p:nvSpPr>
-          <p:cNvPr id="3" name="Content Placeholder 2"/>
-          <p:cNvSpPr>
-            <a:spLocks noGrp="1"/>
-          </p:cNvSpPr>
-          <p:nvPr>
-            <p:ph idx="1"/>
-          </p:nvPr>
-        </p:nvSpPr>
-        <p:spPr/>
-        <p:txBody>
-          <a:bodyPr/>
-          <a:lstStyle/>
-          <a:p>
-            <a:r>
-              <a:rPr lang="en-US"/>
-              <a:t>"formula" specifies the model formula</a:t>
-            </a:r>
-          </a:p>
-          <a:p>
-            <a:r>
-              <a:rPr lang="en-US"/>
-              <a:t>"data" specifies the data.frame</a:t>
-            </a:r>
-          </a:p>
-          <a:p>
-            <a:r>
-              <a:rPr lang="en-US"/>
-              <a:t>All other parameters are </a:t>
-            </a:r>
-            <a:r>
-              <a:rPr lang="en-US" b="1"/>
-              <a:t>optional</a:t>
-            </a:r>
-          </a:p>
-          <a:p>
-            <a:r>
-              <a:rPr lang="en-US"/>
-              <a:t>Other parameters are determined by the model fitting function's requirements</a:t>
-            </a:r>
-          </a:p>
-          <a:p>
-            <a:pPr lvl="1"/>
-            <a:r>
-              <a:rPr lang="en-US"/>
-              <a:t>Use "args" to determine what parameters are available for the model-fitting function</a:t>
-            </a:r>
-          </a:p>
-          <a:p>
-            <a:endParaRPr lang="en-US"/>
-          </a:p>
-        </p:txBody>
-      </p:sp>
-    </p:spTree>
-  </p:cSld>
-  <p:clrMapOvr>
-    <a:masterClrMapping/>
-  </p:clrMapOvr>
-  <p:timing>
-    <p:tnLst>
-      <p:par>
-        <p:cTn id="1" dur="indefinite" restart="never" nodeType="tmRoot"/>
-      </p:par>
-    </p:tnLst>
-  </p:timing>
-</p:sld>
-</file>
-
 <file path=ppt/slides/slide4.xml><?xml version="1.0" encoding="utf-8"?>
 <p:sld xmlns:a="http://schemas.openxmlformats.org/drawingml/2006/main" xmlns:r="http://schemas.openxmlformats.org/officeDocument/2006/relationships" xmlns:mc="http://schemas.openxmlformats.org/markup-compatibility/2006" xmlns:mv="urn:schemas-microsoft-com:mac:vml" xmlns:p="http://schemas.openxmlformats.org/presentationml/2006/main" mc:Ignorable="mv" mc:PreserveAttributes="mv:*">
   <p:cSld>
@@ -10995,58 +10974,58 @@
         </p:nvSpPr>
         <p:spPr/>
         <p:txBody>
+          <a:bodyPr>
+            <a:normAutofit/>
+          </a:bodyPr>
+          <a:lstStyle/>
+          <a:p>
+            <a:r>
+              <a:rPr lang="en-US"/>
+              <a:t>Writing the "zelig2" Method</a:t>
+            </a:r>
+          </a:p>
+        </p:txBody>
+      </p:sp>
+      <p:sp>
+        <p:nvSpPr>
+          <p:cNvPr id="3" name="Content Placeholder 2"/>
+          <p:cNvSpPr>
+            <a:spLocks noGrp="1"/>
+          </p:cNvSpPr>
+          <p:nvPr>
+            <p:ph idx="1"/>
+          </p:nvPr>
+        </p:nvSpPr>
+        <p:spPr/>
+        <p:txBody>
           <a:bodyPr/>
           <a:lstStyle/>
           <a:p>
             <a:r>
               <a:rPr lang="en-US"/>
-              <a:t>zelig2: Function Body</a:t>
-            </a:r>
-          </a:p>
-        </p:txBody>
-      </p:sp>
-      <p:sp>
-        <p:nvSpPr>
-          <p:cNvPr id="3" name="Content Placeholder 2"/>
-          <p:cNvSpPr>
-            <a:spLocks noGrp="1"/>
-          </p:cNvSpPr>
-          <p:nvPr>
-            <p:ph idx="1"/>
-          </p:nvPr>
-        </p:nvSpPr>
-        <p:spPr/>
-        <p:txBody>
-          <a:bodyPr/>
-          <a:lstStyle/>
-          <a:p>
-            <a:r>
-              <a:rPr lang="en-US"/>
-              <a:t>Typically does very little</a:t>
-            </a:r>
-          </a:p>
-          <a:p>
-            <a:r>
-              <a:rPr lang="en-US"/>
-              <a:t>Can be used to</a:t>
+              <a:t>Has three parts</a:t>
             </a:r>
           </a:p>
           <a:p>
             <a:pPr lvl="1"/>
             <a:r>
               <a:rPr lang="en-US"/>
-              <a:t>Print-out error and warning messages</a:t>
+              <a:t>Function signature</a:t>
             </a:r>
           </a:p>
           <a:p>
             <a:pPr lvl="1"/>
             <a:r>
               <a:rPr lang="en-US"/>
-              <a:t>asd</a:t>
-            </a:r>
-          </a:p>
-          <a:p>
-            <a:endParaRPr lang="en-US"/>
+              <a:t>Function Body</a:t>
+            </a:r>
+          </a:p>
+          <a:p>
+            <a:pPr lvl="1"/>
+            <a:r>
+              <a:rPr lang="en-US"/>
+              <a:t>Return Value</a:t>
+            </a:r>
           </a:p>
         </p:txBody>
       </p:sp>
@@ -11099,7 +11078,7 @@
           <a:p>
             <a:r>
               <a:rPr lang="en-US"/>
-              <a:t>zelig2: Return Value</a:t>
+              <a:t>zelig2: Function Signature</a:t>
             </a:r>
           </a:p>
         </p:txBody>
@@ -11118,6 +11097,41 @@
         <p:txBody>
           <a:bodyPr/>
           <a:lstStyle/>
+          <a:p>
+            <a:r>
+              <a:rPr lang="en-US"/>
+              <a:t>"formula" specifies the model formula</a:t>
+            </a:r>
+          </a:p>
+          <a:p>
+            <a:r>
+              <a:rPr lang="en-US"/>
+              <a:t>"data" specifies the data.frame</a:t>
+            </a:r>
+          </a:p>
+          <a:p>
+            <a:r>
+              <a:rPr lang="en-US"/>
+              <a:t>All other parameters are </a:t>
+            </a:r>
+            <a:r>
+              <a:rPr lang="en-US" b="1"/>
+              <a:t>optional</a:t>
+            </a:r>
+          </a:p>
+          <a:p>
+            <a:r>
+              <a:rPr lang="en-US"/>
+              <a:t>Other parameters are determined by the model fitting function's requirements</a:t>
+            </a:r>
+          </a:p>
+          <a:p>
+            <a:pPr lvl="1"/>
+            <a:r>
+              <a:rPr lang="en-US"/>
+              <a:t>Use "args" to determine what parameters are available for the model-fitting function</a:t>
+            </a:r>
+          </a:p>
           <a:p>
             <a:endParaRPr lang="en-US"/>
           </a:p>
@@ -11172,7 +11186,7 @@
           <a:p>
             <a:r>
               <a:rPr lang="en-US"/>
-              <a:t>zelig2</a:t>
+              <a:t>zelig2: Function Body</a:t>
             </a:r>
           </a:p>
         </p:txBody>
@@ -11193,53 +11207,32 @@
           <a:lstStyle/>
           <a:p>
             <a:r>
-              <a:rPr lang="en-US" b="1"/>
-              <a:t>Does not</a:t>
-            </a:r>
-            <a:r>
-              <a:rPr lang="en-US"/>
-              <a:t> fit models itself</a:t>
-            </a:r>
-          </a:p>
-          <a:p>
-            <a:r>
-              <a:rPr lang="en-US"/>
-              <a:t>Uses outside models to fit data</a:t>
+              <a:rPr lang="en-US"/>
+              <a:t>Typically does very little</a:t>
+            </a:r>
+          </a:p>
+          <a:p>
+            <a:r>
+              <a:rPr lang="en-US"/>
+              <a:t>Can be used to</a:t>
             </a:r>
           </a:p>
           <a:p>
             <a:pPr lvl="1"/>
             <a:r>
               <a:rPr lang="en-US"/>
-              <a:t>"lm", "glm", "nlme", etc.</a:t>
-            </a:r>
-          </a:p>
-          <a:p>
-            <a:r>
-              <a:rPr lang="en-US"/>
-              <a:t>Manages how zelig interacts with these models:</a:t>
+              <a:t>Print-out error and warning messages</a:t>
             </a:r>
           </a:p>
           <a:p>
             <a:pPr lvl="1"/>
             <a:r>
               <a:rPr lang="en-US"/>
-              <a:t>Specifies what function will fit the model</a:t>
-            </a:r>
-          </a:p>
-          <a:p>
-            <a:pPr lvl="1"/>
-            <a:r>
-              <a:rPr lang="en-US"/>
-              <a:t>Specifies parameters</a:t>
-            </a:r>
-          </a:p>
-          <a:p>
-            <a:pPr lvl="1"/>
-            <a:r>
-              <a:rPr lang="en-US"/>
-              <a:t>Manipulates objects</a:t>
-            </a:r>
+              <a:t>asd</a:t>
+            </a:r>
+          </a:p>
+          <a:p>
+            <a:endParaRPr lang="en-US"/>
           </a:p>
         </p:txBody>
       </p:sp>
@@ -11292,7 +11285,7 @@
           <a:p>
             <a:r>
               <a:rPr lang="en-US"/>
-              <a:t>Family Objects</a:t>
+              <a:t>zelig2: Return Value</a:t>
             </a:r>
           </a:p>
         </p:txBody>
@@ -11311,44 +11304,6 @@
         <p:txBody>
           <a:bodyPr/>
           <a:lstStyle/>
-          <a:p>
-            <a:r>
-              <a:rPr lang="en-US"/>
-              <a:t>Store information about link functions</a:t>
-            </a:r>
-          </a:p>
-          <a:p>
-            <a:pPr lvl="1"/>
-            <a:r>
-              <a:rPr lang="en-US"/>
-              <a:t>"Link" functions help specify the relationship between the observed value and the underlying linear predictors</a:t>
-            </a:r>
-          </a:p>
-          <a:p>
-            <a:pPr lvl="1"/>
-            <a:r>
-              <a:rPr lang="en-US"/>
-              <a:t>"Inverse Link" simply inverse this process</a:t>
-            </a:r>
-          </a:p>
-          <a:p>
-            <a:r>
-              <a:rPr lang="en-US"/>
-              <a:t>Used by model-fitting functions</a:t>
-            </a:r>
-          </a:p>
-          <a:p>
-            <a:r>
-              <a:rPr lang="en-US"/>
-              <a:t>Inverse link functions are used in qi simulation</a:t>
-            </a:r>
-          </a:p>
-          <a:p>
-            <a:r>
-              <a:rPr lang="en-US"/>
-              <a:t>See help documentation: "?family"</a:t>
-            </a:r>
-          </a:p>
           <a:p>
             <a:endParaRPr lang="en-US"/>
           </a:p>
@@ -11388,12 +11343,12 @@
       </p:grpSpPr>
       <p:sp>
         <p:nvSpPr>
-          <p:cNvPr id="6" name="Title 5"/>
-          <p:cNvSpPr>
-            <a:spLocks noGrp="1"/>
-          </p:cNvSpPr>
-          <p:nvPr>
-            <p:ph type="ctrTitle"/>
+          <p:cNvPr id="2" name="Title 1"/>
+          <p:cNvSpPr>
+            <a:spLocks noGrp="1"/>
+          </p:cNvSpPr>
+          <p:nvPr>
+            <p:ph type="title"/>
           </p:nvPr>
         </p:nvSpPr>
         <p:spPr/>
@@ -11403,19 +11358,19 @@
           <a:p>
             <a:r>
               <a:rPr lang="en-US"/>
-              <a:t>Workflow</a:t>
-            </a:r>
-          </a:p>
-        </p:txBody>
-      </p:sp>
-      <p:sp>
-        <p:nvSpPr>
-          <p:cNvPr id="7" name="Subtitle 6"/>
-          <p:cNvSpPr>
-            <a:spLocks noGrp="1"/>
-          </p:cNvSpPr>
-          <p:nvPr>
-            <p:ph type="subTitle" idx="1"/>
+              <a:t>zelig2</a:t>
+            </a:r>
+          </a:p>
+        </p:txBody>
+      </p:sp>
+      <p:sp>
+        <p:nvSpPr>
+          <p:cNvPr id="3" name="Content Placeholder 2"/>
+          <p:cNvSpPr>
+            <a:spLocks noGrp="1"/>
+          </p:cNvSpPr>
+          <p:nvPr>
+            <p:ph idx="1"/>
           </p:nvPr>
         </p:nvSpPr>
         <p:spPr/>
@@ -11423,7 +11378,54 @@
           <a:bodyPr/>
           <a:lstStyle/>
           <a:p>
-            <a:endParaRPr lang="en-US"/>
+            <a:r>
+              <a:rPr lang="en-US" b="1"/>
+              <a:t>Does not</a:t>
+            </a:r>
+            <a:r>
+              <a:rPr lang="en-US"/>
+              <a:t> fit models itself</a:t>
+            </a:r>
+          </a:p>
+          <a:p>
+            <a:r>
+              <a:rPr lang="en-US"/>
+              <a:t>Uses outside models to fit data</a:t>
+            </a:r>
+          </a:p>
+          <a:p>
+            <a:pPr lvl="1"/>
+            <a:r>
+              <a:rPr lang="en-US"/>
+              <a:t>"lm", "glm", "nlme", etc.</a:t>
+            </a:r>
+          </a:p>
+          <a:p>
+            <a:r>
+              <a:rPr lang="en-US"/>
+              <a:t>Manages how zelig interacts with these models:</a:t>
+            </a:r>
+          </a:p>
+          <a:p>
+            <a:pPr lvl="1"/>
+            <a:r>
+              <a:rPr lang="en-US"/>
+              <a:t>Specifies what function will fit the model</a:t>
+            </a:r>
+          </a:p>
+          <a:p>
+            <a:pPr lvl="1"/>
+            <a:r>
+              <a:rPr lang="en-US"/>
+              <a:t>Specifies parameters</a:t>
+            </a:r>
+          </a:p>
+          <a:p>
+            <a:pPr lvl="1"/>
+            <a:r>
+              <a:rPr lang="en-US"/>
+              <a:t>Manipulates objects</a:t>
+            </a:r>
           </a:p>
         </p:txBody>
       </p:sp>
@@ -11476,7 +11478,7 @@
           <a:p>
             <a:r>
               <a:rPr lang="en-US"/>
-              <a:t>Workflow</a:t>
+              <a:t>Family Objects</a:t>
             </a:r>
           </a:p>
         </p:txBody>
@@ -11497,44 +11499,44 @@
           <a:lstStyle/>
           <a:p>
             <a:r>
-              <a:rPr lang="en-US" dirty="0"/>
-              <a:t>Find existing model</a:t>
-            </a:r>
-          </a:p>
-          <a:p>
-            <a:r>
-              <a:rPr lang="en-US" dirty="0"/>
-              <a:t>Determine what the arguments are</a:t>
-            </a:r>
-          </a:p>
-          <a:p>
-            <a:r>
-              <a:rPr lang="en-US" dirty="0"/>
-              <a:t>Return a list at the bottom of the function</a:t>
-            </a:r>
-          </a:p>
-          <a:p>
-            <a:r>
-              <a:rPr lang="en-US" dirty="0"/>
-              <a:t>Manipulate objects</a:t>
-            </a:r>
-          </a:p>
-          <a:p>
-            <a:r>
-              <a:rPr lang="en-US" dirty="0"/>
-              <a:t>Write </a:t>
-            </a:r>
-            <a:r>
-              <a:rPr lang="en-US" dirty="0" smtClean="0"/>
-              <a:t>warnings</a:t>
-            </a:r>
-            <a:endParaRPr lang="en-US" dirty="0"/>
-          </a:p>
-          <a:p>
-            <a:r>
-              <a:rPr lang="en-US" dirty="0"/>
-              <a:t>Document</a:t>
-            </a:r>
+              <a:rPr lang="en-US"/>
+              <a:t>Store information about link functions</a:t>
+            </a:r>
+          </a:p>
+          <a:p>
+            <a:pPr lvl="1"/>
+            <a:r>
+              <a:rPr lang="en-US"/>
+              <a:t>"Link" functions help specify the relationship between the observed value and the underlying linear predictors</a:t>
+            </a:r>
+          </a:p>
+          <a:p>
+            <a:pPr lvl="1"/>
+            <a:r>
+              <a:rPr lang="en-US"/>
+              <a:t>"Inverse Link" simply inverse this process</a:t>
+            </a:r>
+          </a:p>
+          <a:p>
+            <a:r>
+              <a:rPr lang="en-US"/>
+              <a:t>Used by model-fitting functions</a:t>
+            </a:r>
+          </a:p>
+          <a:p>
+            <a:r>
+              <a:rPr lang="en-US"/>
+              <a:t>Inverse link functions are used in qi simulation</a:t>
+            </a:r>
+          </a:p>
+          <a:p>
+            <a:r>
+              <a:rPr lang="en-US"/>
+              <a:t>See help documentation: "?family"</a:t>
+            </a:r>
+          </a:p>
+          <a:p>
+            <a:endParaRPr lang="en-US"/>
           </a:p>
         </p:txBody>
       </p:sp>
@@ -11572,6 +11574,190 @@
       </p:grpSpPr>
       <p:sp>
         <p:nvSpPr>
+          <p:cNvPr id="6" name="Title 5"/>
+          <p:cNvSpPr>
+            <a:spLocks noGrp="1"/>
+          </p:cNvSpPr>
+          <p:nvPr>
+            <p:ph type="ctrTitle"/>
+          </p:nvPr>
+        </p:nvSpPr>
+        <p:spPr/>
+        <p:txBody>
+          <a:bodyPr/>
+          <a:lstStyle/>
+          <a:p>
+            <a:r>
+              <a:rPr lang="en-US"/>
+              <a:t>Workflow</a:t>
+            </a:r>
+          </a:p>
+        </p:txBody>
+      </p:sp>
+      <p:sp>
+        <p:nvSpPr>
+          <p:cNvPr id="7" name="Subtitle 6"/>
+          <p:cNvSpPr>
+            <a:spLocks noGrp="1"/>
+          </p:cNvSpPr>
+          <p:nvPr>
+            <p:ph type="subTitle" idx="1"/>
+          </p:nvPr>
+        </p:nvSpPr>
+        <p:spPr/>
+        <p:txBody>
+          <a:bodyPr/>
+          <a:lstStyle/>
+          <a:p>
+            <a:endParaRPr lang="en-US"/>
+          </a:p>
+        </p:txBody>
+      </p:sp>
+    </p:spTree>
+  </p:cSld>
+  <p:clrMapOvr>
+    <a:masterClrMapping/>
+  </p:clrMapOvr>
+  <p:timing>
+    <p:tnLst>
+      <p:par>
+        <p:cTn id="1" dur="indefinite" restart="never" nodeType="tmRoot"/>
+      </p:par>
+    </p:tnLst>
+  </p:timing>
+</p:sld>
+</file>
+
+<file path=ppt/slides/slide47.xml><?xml version="1.0" encoding="utf-8"?>
+<p:sld xmlns:a="http://schemas.openxmlformats.org/drawingml/2006/main" xmlns:r="http://schemas.openxmlformats.org/officeDocument/2006/relationships" xmlns:mc="http://schemas.openxmlformats.org/markup-compatibility/2006" xmlns:mv="urn:schemas-microsoft-com:mac:vml" xmlns:p="http://schemas.openxmlformats.org/presentationml/2006/main" mc:Ignorable="mv" mc:PreserveAttributes="mv:*">
+  <p:cSld>
+    <p:spTree>
+      <p:nvGrpSpPr>
+        <p:cNvPr id="1" name=""/>
+        <p:cNvGrpSpPr/>
+        <p:nvPr/>
+      </p:nvGrpSpPr>
+      <p:grpSpPr>
+        <a:xfrm>
+          <a:off x="0" y="0"/>
+          <a:ext cx="0" cy="0"/>
+          <a:chOff x="0" y="0"/>
+          <a:chExt cx="0" cy="0"/>
+        </a:xfrm>
+      </p:grpSpPr>
+      <p:sp>
+        <p:nvSpPr>
+          <p:cNvPr id="2" name="Title 1"/>
+          <p:cNvSpPr>
+            <a:spLocks noGrp="1"/>
+          </p:cNvSpPr>
+          <p:nvPr>
+            <p:ph type="title"/>
+          </p:nvPr>
+        </p:nvSpPr>
+        <p:spPr/>
+        <p:txBody>
+          <a:bodyPr/>
+          <a:lstStyle/>
+          <a:p>
+            <a:r>
+              <a:rPr lang="en-US"/>
+              <a:t>Workflow</a:t>
+            </a:r>
+          </a:p>
+        </p:txBody>
+      </p:sp>
+      <p:sp>
+        <p:nvSpPr>
+          <p:cNvPr id="3" name="Content Placeholder 2"/>
+          <p:cNvSpPr>
+            <a:spLocks noGrp="1"/>
+          </p:cNvSpPr>
+          <p:nvPr>
+            <p:ph idx="1"/>
+          </p:nvPr>
+        </p:nvSpPr>
+        <p:spPr/>
+        <p:txBody>
+          <a:bodyPr/>
+          <a:lstStyle/>
+          <a:p>
+            <a:r>
+              <a:rPr lang="en-US" dirty="0"/>
+              <a:t>Find existing model</a:t>
+            </a:r>
+          </a:p>
+          <a:p>
+            <a:r>
+              <a:rPr lang="en-US" dirty="0"/>
+              <a:t>Determine what the arguments are</a:t>
+            </a:r>
+          </a:p>
+          <a:p>
+            <a:r>
+              <a:rPr lang="en-US" dirty="0"/>
+              <a:t>Return a list at the bottom of the function</a:t>
+            </a:r>
+          </a:p>
+          <a:p>
+            <a:r>
+              <a:rPr lang="en-US" dirty="0"/>
+              <a:t>Manipulate objects</a:t>
+            </a:r>
+          </a:p>
+          <a:p>
+            <a:r>
+              <a:rPr lang="en-US" dirty="0"/>
+              <a:t>Write </a:t>
+            </a:r>
+            <a:r>
+              <a:rPr lang="en-US" dirty="0" smtClean="0"/>
+              <a:t>warnings</a:t>
+            </a:r>
+            <a:endParaRPr lang="en-US" dirty="0"/>
+          </a:p>
+          <a:p>
+            <a:r>
+              <a:rPr lang="en-US" dirty="0"/>
+              <a:t>Document</a:t>
+            </a:r>
+          </a:p>
+        </p:txBody>
+      </p:sp>
+    </p:spTree>
+  </p:cSld>
+  <p:clrMapOvr>
+    <a:masterClrMapping/>
+  </p:clrMapOvr>
+  <p:timing>
+    <p:tnLst>
+      <p:par>
+        <p:cTn id="1" dur="indefinite" restart="never" nodeType="tmRoot"/>
+      </p:par>
+    </p:tnLst>
+  </p:timing>
+</p:sld>
+</file>
+
+<file path=ppt/slides/slide48.xml><?xml version="1.0" encoding="utf-8"?>
+<p:sld xmlns:a="http://schemas.openxmlformats.org/drawingml/2006/main" xmlns:r="http://schemas.openxmlformats.org/officeDocument/2006/relationships" xmlns:mc="http://schemas.openxmlformats.org/markup-compatibility/2006" xmlns:mv="urn:schemas-microsoft-com:mac:vml" xmlns:p="http://schemas.openxmlformats.org/presentationml/2006/main" mc:Ignorable="mv" mc:PreserveAttributes="mv:*">
+  <p:cSld>
+    <p:spTree>
+      <p:nvGrpSpPr>
+        <p:cNvPr id="1" name=""/>
+        <p:cNvGrpSpPr/>
+        <p:nvPr/>
+      </p:nvGrpSpPr>
+      <p:grpSpPr>
+        <a:xfrm>
+          <a:off x="0" y="0"/>
+          <a:ext cx="0" cy="0"/>
+          <a:chOff x="0" y="0"/>
+          <a:chExt cx="0" cy="0"/>
+        </a:xfrm>
+      </p:grpSpPr>
+      <p:sp>
+        <p:nvSpPr>
           <p:cNvPr id="2" name="Title 1"/>
           <p:cNvSpPr>
             <a:spLocks noGrp="1"/>
@@ -11668,7 +11854,7 @@
 </p:sld>
 </file>
 
-<file path=ppt/slides/slide47.xml><?xml version="1.0" encoding="utf-8"?>
+<file path=ppt/slides/slide49.xml><?xml version="1.0" encoding="utf-8"?>
 <p:sld xmlns:a="http://schemas.openxmlformats.org/drawingml/2006/main" xmlns:r="http://schemas.openxmlformats.org/officeDocument/2006/relationships" xmlns:mc="http://schemas.openxmlformats.org/markup-compatibility/2006" xmlns:mv="urn:schemas-microsoft-com:mac:vml" xmlns:p="http://schemas.openxmlformats.org/presentationml/2006/main" mc:Ignorable="mv" mc:PreserveAttributes="mv:*">
   <p:cSld>
     <p:spTree>
@@ -12133,6 +12319,14 @@
             <a:pPr lvl="1"/>
             <a:r>
               <a:rPr lang="en-US"/>
+              <a:t>Package</a:t>
+            </a:r>
+            <a:endParaRPr lang="en-US"/>
+          </a:p>
+          <a:p>
+            <a:pPr lvl="1"/>
+            <a:r>
+              <a:rPr lang="en-US"/>
               <a:t>Depends</a:t>
             </a:r>
           </a:p>
@@ -12141,13 +12335,6 @@
             <a:r>
               <a:rPr lang="en-US"/>
               <a:t>Author</a:t>
-            </a:r>
-          </a:p>
-          <a:p>
-            <a:pPr lvl="1"/>
-            <a:r>
-              <a:rPr lang="en-US"/>
-              <a:t>Version</a:t>
             </a:r>
           </a:p>
           <a:p>

</xml_diff>

<commit_message>
Updating and going downstairs
</commit_message>
<xml_diff>
--- a/January-Class/Zelig_1_regressions.pptx
+++ b/January-Class/Zelig_1_regressions.pptx
@@ -5,7 +5,7 @@
     <p:sldMasterId id="2147483694" r:id="rId1"/>
   </p:sldMasterIdLst>
   <p:notesMasterIdLst>
-    <p:notesMasterId r:id="rId54"/>
+    <p:notesMasterId r:id="rId53"/>
   </p:notesMasterIdLst>
   <p:sldIdLst>
     <p:sldId id="256" r:id="rId2"/>
@@ -46,20 +46,19 @@
     <p:sldId id="328" r:id="rId37"/>
     <p:sldId id="330" r:id="rId38"/>
     <p:sldId id="272" r:id="rId39"/>
-    <p:sldId id="331" r:id="rId40"/>
-    <p:sldId id="363" r:id="rId41"/>
-    <p:sldId id="342" r:id="rId42"/>
-    <p:sldId id="275" r:id="rId43"/>
-    <p:sldId id="343" r:id="rId44"/>
-    <p:sldId id="344" r:id="rId45"/>
-    <p:sldId id="345" r:id="rId46"/>
-    <p:sldId id="273" r:id="rId47"/>
-    <p:sldId id="374" r:id="rId48"/>
-    <p:sldId id="279" r:id="rId49"/>
-    <p:sldId id="337" r:id="rId50"/>
-    <p:sldId id="278" r:id="rId51"/>
-    <p:sldId id="316" r:id="rId52"/>
-    <p:sldId id="338" r:id="rId53"/>
+    <p:sldId id="363" r:id="rId40"/>
+    <p:sldId id="342" r:id="rId41"/>
+    <p:sldId id="275" r:id="rId42"/>
+    <p:sldId id="343" r:id="rId43"/>
+    <p:sldId id="344" r:id="rId44"/>
+    <p:sldId id="345" r:id="rId45"/>
+    <p:sldId id="273" r:id="rId46"/>
+    <p:sldId id="374" r:id="rId47"/>
+    <p:sldId id="279" r:id="rId48"/>
+    <p:sldId id="337" r:id="rId49"/>
+    <p:sldId id="278" r:id="rId50"/>
+    <p:sldId id="316" r:id="rId51"/>
+    <p:sldId id="375" r:id="rId52"/>
   </p:sldIdLst>
   <p:sldSz cx="9144000" cy="6858000" type="screen4x3"/>
   <p:notesSz cx="6858000" cy="9144000"/>
@@ -414,7 +413,7 @@
     </p:spTree>
     <p:extLst>
       <p:ext uri="{BB962C8B-B14F-4D97-AF65-F5344CB8AC3E}">
-        <p14:creationId xmlns="" xmlns:a="http://schemas.openxmlformats.org/drawingml/2006/main" xmlns:r="http://schemas.openxmlformats.org/officeDocument/2006/relationships" xmlns:p="http://schemas.openxmlformats.org/presentationml/2006/main" xmlns:p14="http://schemas.microsoft.com/office/powerpoint/2010/main" xmlns:mv="urn:schemas-microsoft-com:mac:vml" xmlns:mc="http://schemas.openxmlformats.org/markup-compatibility/2006" val="1070545073"/>
+        <p14:creationId xmlns:mc="http://schemas.openxmlformats.org/markup-compatibility/2006" xmlns:mv="urn:schemas-microsoft-com:mac:vml" xmlns:p14="http://schemas.microsoft.com/office/powerpoint/2010/main" xmlns:p="http://schemas.openxmlformats.org/presentationml/2006/main" xmlns:r="http://schemas.openxmlformats.org/officeDocument/2006/relationships" xmlns:a="http://schemas.openxmlformats.org/drawingml/2006/main" xmlns="" val="1070545073"/>
       </p:ext>
     </p:extLst>
   </p:cSld>
@@ -3497,11 +3496,7 @@
           <a:p>
             <a:r>
               <a:rPr lang="en-US"/>
-              <a:t>T</a:t>
-            </a:r>
-            <a:r>
-              <a:rPr lang="en-US"/>
-              <a:t>he "zelig2" Method</a:t>
+              <a:t>The "zelig2" Method</a:t>
             </a:r>
           </a:p>
         </p:txBody>
@@ -4122,7 +4117,7 @@
     </p:spTree>
     <p:extLst>
       <p:ext uri="{BB962C8B-B14F-4D97-AF65-F5344CB8AC3E}">
-        <p14:creationId xmlns="" xmlns:a="http://schemas.openxmlformats.org/drawingml/2006/main" xmlns:r="http://schemas.openxmlformats.org/officeDocument/2006/relationships" xmlns:p="http://schemas.openxmlformats.org/presentationml/2006/main" xmlns:p14="http://schemas.microsoft.com/office/powerpoint/2010/main" xmlns:mv="urn:schemas-microsoft-com:mac:vml" xmlns:mc="http://schemas.openxmlformats.org/markup-compatibility/2006" val="2482753411"/>
+        <p14:creationId xmlns:mc="http://schemas.openxmlformats.org/markup-compatibility/2006" xmlns:mv="urn:schemas-microsoft-com:mac:vml" xmlns:p14="http://schemas.microsoft.com/office/powerpoint/2010/main" xmlns:p="http://schemas.openxmlformats.org/presentationml/2006/main" xmlns:r="http://schemas.openxmlformats.org/officeDocument/2006/relationships" xmlns:a="http://schemas.openxmlformats.org/drawingml/2006/main" xmlns="" val="2482753411"/>
       </p:ext>
     </p:extLst>
   </p:cSld>
@@ -6666,7 +6661,6 @@
               <a:rPr lang="en-US"/>
               <a:t> directly call these methods</a:t>
             </a:r>
-            <a:endParaRPr lang="en-US"/>
           </a:p>
         </p:txBody>
       </p:sp>
@@ -6945,7 +6939,7 @@
     </p:spTree>
     <p:extLst>
       <p:ext uri="{BB962C8B-B14F-4D97-AF65-F5344CB8AC3E}">
-        <p14:creationId xmlns="" xmlns:a="http://schemas.openxmlformats.org/drawingml/2006/main" xmlns:r="http://schemas.openxmlformats.org/officeDocument/2006/relationships" xmlns:p="http://schemas.openxmlformats.org/presentationml/2006/main" xmlns:p14="http://schemas.microsoft.com/office/powerpoint/2010/main" xmlns:mv="urn:schemas-microsoft-com:mac:vml" xmlns:mc="http://schemas.openxmlformats.org/markup-compatibility/2006" val="3700335886"/>
+        <p14:creationId xmlns:mc="http://schemas.openxmlformats.org/markup-compatibility/2006" xmlns:mv="urn:schemas-microsoft-com:mac:vml" xmlns:p14="http://schemas.microsoft.com/office/powerpoint/2010/main" xmlns:p="http://schemas.openxmlformats.org/presentationml/2006/main" xmlns:r="http://schemas.openxmlformats.org/officeDocument/2006/relationships" xmlns:a="http://schemas.openxmlformats.org/drawingml/2006/main" xmlns="" val="3700335886"/>
       </p:ext>
     </p:extLst>
   </p:cSld>
@@ -7664,7 +7658,7 @@
     </p:spTree>
     <p:extLst>
       <p:ext uri="{BB962C8B-B14F-4D97-AF65-F5344CB8AC3E}">
-        <p14:creationId xmlns="" xmlns:a="http://schemas.openxmlformats.org/drawingml/2006/main" xmlns:r="http://schemas.openxmlformats.org/officeDocument/2006/relationships" xmlns:p="http://schemas.openxmlformats.org/presentationml/2006/main" xmlns:p14="http://schemas.microsoft.com/office/powerpoint/2010/main" xmlns:mv="urn:schemas-microsoft-com:mac:vml" xmlns:mc="http://schemas.openxmlformats.org/markup-compatibility/2006" val="2675064339"/>
+        <p14:creationId xmlns:mc="http://schemas.openxmlformats.org/markup-compatibility/2006" xmlns:mv="urn:schemas-microsoft-com:mac:vml" xmlns:p14="http://schemas.microsoft.com/office/powerpoint/2010/main" xmlns:p="http://schemas.openxmlformats.org/presentationml/2006/main" xmlns:r="http://schemas.openxmlformats.org/officeDocument/2006/relationships" xmlns:a="http://schemas.openxmlformats.org/drawingml/2006/main" xmlns="" val="2675064339"/>
       </p:ext>
     </p:extLst>
   </p:cSld>
@@ -8155,7 +8149,7 @@
     </p:spTree>
     <p:extLst>
       <p:ext uri="{BB962C8B-B14F-4D97-AF65-F5344CB8AC3E}">
-        <p14:creationId xmlns="" xmlns:a="http://schemas.openxmlformats.org/drawingml/2006/main" xmlns:r="http://schemas.openxmlformats.org/officeDocument/2006/relationships" xmlns:p="http://schemas.openxmlformats.org/presentationml/2006/main" xmlns:p14="http://schemas.microsoft.com/office/powerpoint/2010/main" xmlns:mv="urn:schemas-microsoft-com:mac:vml" xmlns:mc="http://schemas.openxmlformats.org/markup-compatibility/2006" val="869150859"/>
+        <p14:creationId xmlns:mc="http://schemas.openxmlformats.org/markup-compatibility/2006" xmlns:mv="urn:schemas-microsoft-com:mac:vml" xmlns:p14="http://schemas.microsoft.com/office/powerpoint/2010/main" xmlns:p="http://schemas.openxmlformats.org/presentationml/2006/main" xmlns:r="http://schemas.openxmlformats.org/officeDocument/2006/relationships" xmlns:a="http://schemas.openxmlformats.org/drawingml/2006/main" xmlns="" val="869150859"/>
       </p:ext>
     </p:extLst>
   </p:cSld>
@@ -8302,7 +8296,7 @@
     </p:spTree>
     <p:extLst>
       <p:ext uri="{BB962C8B-B14F-4D97-AF65-F5344CB8AC3E}">
-        <p14:creationId xmlns="" xmlns:a="http://schemas.openxmlformats.org/drawingml/2006/main" xmlns:r="http://schemas.openxmlformats.org/officeDocument/2006/relationships" xmlns:p="http://schemas.openxmlformats.org/presentationml/2006/main" xmlns:p14="http://schemas.microsoft.com/office/powerpoint/2010/main" xmlns:mv="urn:schemas-microsoft-com:mac:vml" xmlns:mc="http://schemas.openxmlformats.org/markup-compatibility/2006" val="942656541"/>
+        <p14:creationId xmlns:mc="http://schemas.openxmlformats.org/markup-compatibility/2006" xmlns:mv="urn:schemas-microsoft-com:mac:vml" xmlns:p14="http://schemas.microsoft.com/office/powerpoint/2010/main" xmlns:p="http://schemas.openxmlformats.org/presentationml/2006/main" xmlns:r="http://schemas.openxmlformats.org/officeDocument/2006/relationships" xmlns:a="http://schemas.openxmlformats.org/drawingml/2006/main" xmlns="" val="942656541"/>
       </p:ext>
     </p:extLst>
   </p:cSld>
@@ -8469,7 +8463,7 @@
     </p:spTree>
     <p:extLst>
       <p:ext uri="{BB962C8B-B14F-4D97-AF65-F5344CB8AC3E}">
-        <p14:creationId xmlns="" xmlns:a="http://schemas.openxmlformats.org/drawingml/2006/main" xmlns:r="http://schemas.openxmlformats.org/officeDocument/2006/relationships" xmlns:p="http://schemas.openxmlformats.org/presentationml/2006/main" xmlns:p14="http://schemas.microsoft.com/office/powerpoint/2010/main" xmlns:mv="urn:schemas-microsoft-com:mac:vml" xmlns:mc="http://schemas.openxmlformats.org/markup-compatibility/2006" val="2238547365"/>
+        <p14:creationId xmlns:mc="http://schemas.openxmlformats.org/markup-compatibility/2006" xmlns:mv="urn:schemas-microsoft-com:mac:vml" xmlns:p14="http://schemas.microsoft.com/office/powerpoint/2010/main" xmlns:p="http://schemas.openxmlformats.org/presentationml/2006/main" xmlns:r="http://schemas.openxmlformats.org/officeDocument/2006/relationships" xmlns:a="http://schemas.openxmlformats.org/drawingml/2006/main" xmlns="" val="2238547365"/>
       </p:ext>
     </p:extLst>
   </p:cSld>
@@ -8606,7 +8600,7 @@
     </p:spTree>
     <p:extLst>
       <p:ext uri="{BB962C8B-B14F-4D97-AF65-F5344CB8AC3E}">
-        <p14:creationId xmlns="" xmlns:a="http://schemas.openxmlformats.org/drawingml/2006/main" xmlns:r="http://schemas.openxmlformats.org/officeDocument/2006/relationships" xmlns:p="http://schemas.openxmlformats.org/presentationml/2006/main" xmlns:p14="http://schemas.microsoft.com/office/powerpoint/2010/main" xmlns:mv="urn:schemas-microsoft-com:mac:vml" xmlns:mc="http://schemas.openxmlformats.org/markup-compatibility/2006" val="1702243699"/>
+        <p14:creationId xmlns:mc="http://schemas.openxmlformats.org/markup-compatibility/2006" xmlns:mv="urn:schemas-microsoft-com:mac:vml" xmlns:p14="http://schemas.microsoft.com/office/powerpoint/2010/main" xmlns:p="http://schemas.openxmlformats.org/presentationml/2006/main" xmlns:r="http://schemas.openxmlformats.org/officeDocument/2006/relationships" xmlns:a="http://schemas.openxmlformats.org/drawingml/2006/main" xmlns="" val="1702243699"/>
       </p:ext>
     </p:extLst>
   </p:cSld>
@@ -8750,7 +8744,7 @@
     </p:spTree>
     <p:extLst>
       <p:ext uri="{BB962C8B-B14F-4D97-AF65-F5344CB8AC3E}">
-        <p14:creationId xmlns="" xmlns:a="http://schemas.openxmlformats.org/drawingml/2006/main" xmlns:r="http://schemas.openxmlformats.org/officeDocument/2006/relationships" xmlns:p="http://schemas.openxmlformats.org/presentationml/2006/main" xmlns:p14="http://schemas.microsoft.com/office/powerpoint/2010/main" xmlns:mv="urn:schemas-microsoft-com:mac:vml" xmlns:mc="http://schemas.openxmlformats.org/markup-compatibility/2006" val="3143245456"/>
+        <p14:creationId xmlns:mc="http://schemas.openxmlformats.org/markup-compatibility/2006" xmlns:mv="urn:schemas-microsoft-com:mac:vml" xmlns:p14="http://schemas.microsoft.com/office/powerpoint/2010/main" xmlns:p="http://schemas.openxmlformats.org/presentationml/2006/main" xmlns:r="http://schemas.openxmlformats.org/officeDocument/2006/relationships" xmlns:a="http://schemas.openxmlformats.org/drawingml/2006/main" xmlns="" val="3143245456"/>
       </p:ext>
     </p:extLst>
   </p:cSld>
@@ -8888,7 +8882,7 @@
     </p:spTree>
     <p:extLst>
       <p:ext uri="{BB962C8B-B14F-4D97-AF65-F5344CB8AC3E}">
-        <p14:creationId xmlns="" xmlns:a="http://schemas.openxmlformats.org/drawingml/2006/main" xmlns:r="http://schemas.openxmlformats.org/officeDocument/2006/relationships" xmlns:p="http://schemas.openxmlformats.org/presentationml/2006/main" xmlns:p14="http://schemas.microsoft.com/office/powerpoint/2010/main" xmlns:mv="urn:schemas-microsoft-com:mac:vml" xmlns:mc="http://schemas.openxmlformats.org/markup-compatibility/2006" val="1265913865"/>
+        <p14:creationId xmlns:mc="http://schemas.openxmlformats.org/markup-compatibility/2006" xmlns:mv="urn:schemas-microsoft-com:mac:vml" xmlns:p14="http://schemas.microsoft.com/office/powerpoint/2010/main" xmlns:p="http://schemas.openxmlformats.org/presentationml/2006/main" xmlns:r="http://schemas.openxmlformats.org/officeDocument/2006/relationships" xmlns:a="http://schemas.openxmlformats.org/drawingml/2006/main" xmlns="" val="1265913865"/>
       </p:ext>
     </p:extLst>
   </p:cSld>
@@ -8975,7 +8969,7 @@
     </p:spTree>
     <p:extLst>
       <p:ext uri="{BB962C8B-B14F-4D97-AF65-F5344CB8AC3E}">
-        <p14:creationId xmlns="" xmlns:a="http://schemas.openxmlformats.org/drawingml/2006/main" xmlns:r="http://schemas.openxmlformats.org/officeDocument/2006/relationships" xmlns:p="http://schemas.openxmlformats.org/presentationml/2006/main" xmlns:p14="http://schemas.microsoft.com/office/powerpoint/2010/main" xmlns:mv="urn:schemas-microsoft-com:mac:vml" xmlns:mc="http://schemas.openxmlformats.org/markup-compatibility/2006" val="3465388416"/>
+        <p14:creationId xmlns:mc="http://schemas.openxmlformats.org/markup-compatibility/2006" xmlns:mv="urn:schemas-microsoft-com:mac:vml" xmlns:p14="http://schemas.microsoft.com/office/powerpoint/2010/main" xmlns:p="http://schemas.openxmlformats.org/presentationml/2006/main" xmlns:r="http://schemas.openxmlformats.org/officeDocument/2006/relationships" xmlns:a="http://schemas.openxmlformats.org/drawingml/2006/main" xmlns="" val="3465388416"/>
       </p:ext>
     </p:extLst>
   </p:cSld>
@@ -9053,7 +9047,7 @@
     </p:spTree>
     <p:extLst>
       <p:ext uri="{BB962C8B-B14F-4D97-AF65-F5344CB8AC3E}">
-        <p14:creationId xmlns="" xmlns:a="http://schemas.openxmlformats.org/drawingml/2006/main" xmlns:r="http://schemas.openxmlformats.org/officeDocument/2006/relationships" xmlns:p="http://schemas.openxmlformats.org/presentationml/2006/main" xmlns:p14="http://schemas.microsoft.com/office/powerpoint/2010/main" xmlns:mv="urn:schemas-microsoft-com:mac:vml" xmlns:mc="http://schemas.openxmlformats.org/markup-compatibility/2006" val="2972905603"/>
+        <p14:creationId xmlns:mc="http://schemas.openxmlformats.org/markup-compatibility/2006" xmlns:mv="urn:schemas-microsoft-com:mac:vml" xmlns:p14="http://schemas.microsoft.com/office/powerpoint/2010/main" xmlns:p="http://schemas.openxmlformats.org/presentationml/2006/main" xmlns:r="http://schemas.openxmlformats.org/officeDocument/2006/relationships" xmlns:a="http://schemas.openxmlformats.org/drawingml/2006/main" xmlns="" val="2972905603"/>
       </p:ext>
     </p:extLst>
   </p:cSld>
@@ -9140,7 +9134,7 @@
     </p:spTree>
     <p:extLst>
       <p:ext uri="{BB962C8B-B14F-4D97-AF65-F5344CB8AC3E}">
-        <p14:creationId xmlns="" xmlns:a="http://schemas.openxmlformats.org/drawingml/2006/main" xmlns:r="http://schemas.openxmlformats.org/officeDocument/2006/relationships" xmlns:p="http://schemas.openxmlformats.org/presentationml/2006/main" xmlns:p14="http://schemas.microsoft.com/office/powerpoint/2010/main" xmlns:mv="urn:schemas-microsoft-com:mac:vml" xmlns:mc="http://schemas.openxmlformats.org/markup-compatibility/2006" val="2382241759"/>
+        <p14:creationId xmlns:mc="http://schemas.openxmlformats.org/markup-compatibility/2006" xmlns:mv="urn:schemas-microsoft-com:mac:vml" xmlns:p14="http://schemas.microsoft.com/office/powerpoint/2010/main" xmlns:p="http://schemas.openxmlformats.org/presentationml/2006/main" xmlns:r="http://schemas.openxmlformats.org/officeDocument/2006/relationships" xmlns:a="http://schemas.openxmlformats.org/drawingml/2006/main" xmlns="" val="2382241759"/>
       </p:ext>
     </p:extLst>
   </p:cSld>
@@ -9219,7 +9213,7 @@
     </p:spTree>
     <p:extLst>
       <p:ext uri="{BB962C8B-B14F-4D97-AF65-F5344CB8AC3E}">
-        <p14:creationId xmlns="" xmlns:a="http://schemas.openxmlformats.org/drawingml/2006/main" xmlns:r="http://schemas.openxmlformats.org/officeDocument/2006/relationships" xmlns:p="http://schemas.openxmlformats.org/presentationml/2006/main" xmlns:p14="http://schemas.microsoft.com/office/powerpoint/2010/main" xmlns:mv="urn:schemas-microsoft-com:mac:vml" xmlns:mc="http://schemas.openxmlformats.org/markup-compatibility/2006" val="2601398369"/>
+        <p14:creationId xmlns:mc="http://schemas.openxmlformats.org/markup-compatibility/2006" xmlns:mv="urn:schemas-microsoft-com:mac:vml" xmlns:p14="http://schemas.microsoft.com/office/powerpoint/2010/main" xmlns:p="http://schemas.openxmlformats.org/presentationml/2006/main" xmlns:r="http://schemas.openxmlformats.org/officeDocument/2006/relationships" xmlns:a="http://schemas.openxmlformats.org/drawingml/2006/main" xmlns="" val="2601398369"/>
       </p:ext>
     </p:extLst>
   </p:cSld>
@@ -9322,7 +9316,7 @@
     </p:spTree>
     <p:extLst>
       <p:ext uri="{BB962C8B-B14F-4D97-AF65-F5344CB8AC3E}">
-        <p14:creationId xmlns="" xmlns:a="http://schemas.openxmlformats.org/drawingml/2006/main" xmlns:r="http://schemas.openxmlformats.org/officeDocument/2006/relationships" xmlns:p="http://schemas.openxmlformats.org/presentationml/2006/main" xmlns:p14="http://schemas.microsoft.com/office/powerpoint/2010/main" xmlns:mv="urn:schemas-microsoft-com:mac:vml" xmlns:mc="http://schemas.openxmlformats.org/markup-compatibility/2006" val="520387571"/>
+        <p14:creationId xmlns:mc="http://schemas.openxmlformats.org/markup-compatibility/2006" xmlns:mv="urn:schemas-microsoft-com:mac:vml" xmlns:p14="http://schemas.microsoft.com/office/powerpoint/2010/main" xmlns:p="http://schemas.openxmlformats.org/presentationml/2006/main" xmlns:r="http://schemas.openxmlformats.org/officeDocument/2006/relationships" xmlns:a="http://schemas.openxmlformats.org/drawingml/2006/main" xmlns="" val="520387571"/>
       </p:ext>
     </p:extLst>
   </p:cSld>
@@ -9428,292 +9422,6 @@
 </file>
 
 <file path=ppt/slides/slide39.xml><?xml version="1.0" encoding="utf-8"?>
-<p:sld xmlns:a="http://schemas.openxmlformats.org/drawingml/2006/main" xmlns:r="http://schemas.openxmlformats.org/officeDocument/2006/relationships" xmlns:mc="http://schemas.openxmlformats.org/markup-compatibility/2006" xmlns:mv="urn:schemas-microsoft-com:mac:vml" xmlns:p="http://schemas.openxmlformats.org/presentationml/2006/main" mc:Ignorable="mv" mc:PreserveAttributes="mv:*">
-  <p:cSld>
-    <p:spTree>
-      <p:nvGrpSpPr>
-        <p:cNvPr id="1" name=""/>
-        <p:cNvGrpSpPr/>
-        <p:nvPr/>
-      </p:nvGrpSpPr>
-      <p:grpSpPr>
-        <a:xfrm>
-          <a:off x="0" y="0"/>
-          <a:ext cx="0" cy="0"/>
-          <a:chOff x="0" y="0"/>
-          <a:chExt cx="0" cy="0"/>
-        </a:xfrm>
-      </p:grpSpPr>
-      <p:sp>
-        <p:nvSpPr>
-          <p:cNvPr id="2" name="Title 1"/>
-          <p:cNvSpPr>
-            <a:spLocks noGrp="1"/>
-          </p:cNvSpPr>
-          <p:nvPr>
-            <p:ph type="title"/>
-          </p:nvPr>
-        </p:nvSpPr>
-        <p:spPr/>
-        <p:txBody>
-          <a:bodyPr/>
-          <a:lstStyle/>
-          <a:p>
-            <a:r>
-              <a:rPr lang="en-US" dirty="0" smtClean="0"/>
-              <a:t>Goals</a:t>
-            </a:r>
-            <a:endParaRPr lang="en-US" dirty="0"/>
-          </a:p>
-        </p:txBody>
-      </p:sp>
-      <p:sp>
-        <p:nvSpPr>
-          <p:cNvPr id="3" name="Content Placeholder 2"/>
-          <p:cNvSpPr>
-            <a:spLocks noGrp="1"/>
-          </p:cNvSpPr>
-          <p:nvPr>
-            <p:ph idx="1"/>
-          </p:nvPr>
-        </p:nvSpPr>
-        <p:spPr/>
-        <p:txBody>
-          <a:bodyPr>
-            <a:normAutofit lnSpcReduction="10000"/>
-          </a:bodyPr>
-          <a:lstStyle/>
-          <a:p>
-            <a:r>
-              <a:rPr lang="en-US" dirty="0" smtClean="0"/>
-              <a:t>We are going to focus on simulating individual statistical models</a:t>
-            </a:r>
-          </a:p>
-          <a:p>
-            <a:r>
-              <a:rPr lang="en-US" dirty="0" smtClean="0"/>
-              <a:t>Each student will create an R package</a:t>
-            </a:r>
-          </a:p>
-          <a:p>
-            <a:r>
-              <a:rPr lang="en-US" dirty="0" smtClean="0"/>
-              <a:t>Each student will implement a single statistical model</a:t>
-            </a:r>
-          </a:p>
-          <a:p>
-            <a:r>
-              <a:rPr lang="en-US" dirty="0" smtClean="0"/>
-              <a:t>This model will be made up of 3 methods:</a:t>
-            </a:r>
-          </a:p>
-          <a:p>
-            <a:pPr lvl="1"/>
-            <a:r>
-              <a:rPr lang="en-US" dirty="0" smtClean="0"/>
-              <a:t>zelig2&lt;model-name&gt;</a:t>
-            </a:r>
-          </a:p>
-          <a:p>
-            <a:pPr lvl="1"/>
-            <a:r>
-              <a:rPr lang="en-US" dirty="0" err="1" smtClean="0"/>
-              <a:t>param</a:t>
-            </a:r>
-            <a:r>
-              <a:rPr lang="en-US" dirty="0" smtClean="0"/>
-              <a:t>.&lt;model-name&gt;</a:t>
-            </a:r>
-          </a:p>
-          <a:p>
-            <a:pPr lvl="1"/>
-            <a:r>
-              <a:rPr lang="en-US" dirty="0" smtClean="0"/>
-              <a:t>qi.&lt;model-name&gt;</a:t>
-            </a:r>
-          </a:p>
-          <a:p>
-            <a:endParaRPr lang="en-US" dirty="0" smtClean="0"/>
-          </a:p>
-          <a:p>
-            <a:endParaRPr lang="en-US" dirty="0"/>
-          </a:p>
-        </p:txBody>
-      </p:sp>
-    </p:spTree>
-    <p:extLst>
-      <p:ext uri="{BB962C8B-B14F-4D97-AF65-F5344CB8AC3E}">
-        <p14:creationId xmlns="" xmlns:a="http://schemas.openxmlformats.org/drawingml/2006/main" xmlns:r="http://schemas.openxmlformats.org/officeDocument/2006/relationships" xmlns:p="http://schemas.openxmlformats.org/presentationml/2006/main" xmlns:p14="http://schemas.microsoft.com/office/powerpoint/2010/main" xmlns:mv="urn:schemas-microsoft-com:mac:vml" xmlns:mc="http://schemas.openxmlformats.org/markup-compatibility/2006" val="1712515247"/>
-      </p:ext>
-    </p:extLst>
-  </p:cSld>
-  <p:clrMapOvr>
-    <a:masterClrMapping/>
-  </p:clrMapOvr>
-  <p:timing>
-    <p:tnLst>
-      <p:par>
-        <p:cTn id="1" dur="indefinite" restart="never" nodeType="tmRoot"/>
-      </p:par>
-    </p:tnLst>
-  </p:timing>
-</p:sld>
-</file>
-
-<file path=ppt/slides/slide4.xml><?xml version="1.0" encoding="utf-8"?>
-<p:sld xmlns:a="http://schemas.openxmlformats.org/drawingml/2006/main" xmlns:r="http://schemas.openxmlformats.org/officeDocument/2006/relationships" xmlns:mc="http://schemas.openxmlformats.org/markup-compatibility/2006" xmlns:mv="urn:schemas-microsoft-com:mac:vml" xmlns:p="http://schemas.openxmlformats.org/presentationml/2006/main" mc:Ignorable="mv" mc:PreserveAttributes="mv:*">
-  <p:cSld>
-    <p:spTree>
-      <p:nvGrpSpPr>
-        <p:cNvPr id="1" name=""/>
-        <p:cNvGrpSpPr/>
-        <p:nvPr/>
-      </p:nvGrpSpPr>
-      <p:grpSpPr>
-        <a:xfrm>
-          <a:off x="0" y="0"/>
-          <a:ext cx="0" cy="0"/>
-          <a:chOff x="0" y="0"/>
-          <a:chExt cx="0" cy="0"/>
-        </a:xfrm>
-      </p:grpSpPr>
-      <p:sp>
-        <p:nvSpPr>
-          <p:cNvPr id="2" name="Title 1"/>
-          <p:cNvSpPr>
-            <a:spLocks noGrp="1"/>
-          </p:cNvSpPr>
-          <p:nvPr>
-            <p:ph type="title"/>
-          </p:nvPr>
-        </p:nvSpPr>
-        <p:spPr/>
-        <p:txBody>
-          <a:bodyPr/>
-          <a:lstStyle/>
-          <a:p>
-            <a:r>
-              <a:rPr lang="en-US"/>
-              <a:t>Structure of a Package</a:t>
-            </a:r>
-          </a:p>
-        </p:txBody>
-      </p:sp>
-      <p:sp>
-        <p:nvSpPr>
-          <p:cNvPr id="4" name="Content Placeholder 3"/>
-          <p:cNvSpPr>
-            <a:spLocks noGrp="1"/>
-          </p:cNvSpPr>
-          <p:nvPr>
-            <p:ph idx="1"/>
-          </p:nvPr>
-        </p:nvSpPr>
-        <p:spPr>
-          <a:xfrm>
-            <a:off x="457200" y="1600200"/>
-            <a:ext cx="8229600" cy="4525963"/>
-          </a:xfrm>
-        </p:spPr>
-        <p:txBody>
-          <a:bodyPr>
-            <a:normAutofit lnSpcReduction="10000"/>
-          </a:bodyPr>
-          <a:lstStyle/>
-          <a:p>
-            <a:r>
-              <a:rPr lang="en-US" dirty="0" smtClean="0"/>
-              <a:t>Simply a directory </a:t>
-            </a:r>
-          </a:p>
-          <a:p>
-            <a:r>
-              <a:rPr lang="en-US" dirty="0" smtClean="0"/>
-              <a:t>Has two important folders:</a:t>
-            </a:r>
-            <a:endParaRPr lang="en-US" dirty="0"/>
-          </a:p>
-          <a:p>
-            <a:pPr marL="457200" lvl="1" indent="0">
-              <a:buNone/>
-            </a:pPr>
-            <a:r>
-              <a:rPr lang="en-US" sz="4000" b="1" dirty="0" smtClean="0"/>
-              <a:t>R/</a:t>
-            </a:r>
-            <a:endParaRPr lang="en-US" sz="4000" b="1" dirty="0"/>
-          </a:p>
-          <a:p>
-            <a:pPr marL="457200" lvl="1" indent="0">
-              <a:buNone/>
-            </a:pPr>
-            <a:r>
-              <a:rPr lang="en-US" sz="4000" b="1" dirty="0" smtClean="0"/>
-              <a:t>man/</a:t>
-            </a:r>
-            <a:endParaRPr lang="en-US" sz="4000" b="1" dirty="0"/>
-          </a:p>
-          <a:p>
-            <a:r>
-              <a:rPr lang="en-US" dirty="0"/>
-              <a:t>And </a:t>
-            </a:r>
-            <a:r>
-              <a:rPr lang="en-US" dirty="0" smtClean="0"/>
-              <a:t>two important </a:t>
-            </a:r>
-            <a:r>
-              <a:rPr lang="en-US" dirty="0"/>
-              <a:t>files:</a:t>
-            </a:r>
-          </a:p>
-          <a:p>
-            <a:pPr marL="457200" lvl="1" indent="0">
-              <a:buNone/>
-            </a:pPr>
-            <a:r>
-              <a:rPr lang="en-US" sz="4000" b="1" dirty="0"/>
-              <a:t>DESCRIPTION</a:t>
-            </a:r>
-          </a:p>
-          <a:p>
-            <a:pPr marL="457200" lvl="1" indent="0">
-              <a:buNone/>
-            </a:pPr>
-            <a:r>
-              <a:rPr lang="en-US" sz="4000" b="1" dirty="0"/>
-              <a:t>NAMESPACE</a:t>
-            </a:r>
-          </a:p>
-          <a:p>
-            <a:pPr>
-              <a:buNone/>
-            </a:pPr>
-            <a:endParaRPr lang="en-US" dirty="0"/>
-          </a:p>
-        </p:txBody>
-      </p:sp>
-    </p:spTree>
-    <p:extLst>
-      <p:ext uri="{BB962C8B-B14F-4D97-AF65-F5344CB8AC3E}">
-        <p14:creationId xmlns="" xmlns:a="http://schemas.openxmlformats.org/drawingml/2006/main" xmlns:r="http://schemas.openxmlformats.org/officeDocument/2006/relationships" xmlns:p="http://schemas.openxmlformats.org/presentationml/2006/main" xmlns:p14="http://schemas.microsoft.com/office/powerpoint/2010/main" xmlns:mv="urn:schemas-microsoft-com:mac:vml" xmlns:mc="http://schemas.openxmlformats.org/markup-compatibility/2006" val="1501347142"/>
-      </p:ext>
-    </p:extLst>
-  </p:cSld>
-  <p:clrMapOvr>
-    <a:masterClrMapping/>
-  </p:clrMapOvr>
-  <p:timing>
-    <p:tnLst>
-      <p:par>
-        <p:cTn id="1" dur="indefinite" restart="never" nodeType="tmRoot"/>
-      </p:par>
-    </p:tnLst>
-  </p:timing>
-</p:sld>
-</file>
-
-<file path=ppt/slides/slide40.xml><?xml version="1.0" encoding="utf-8"?>
 <p:sld xmlns:a="http://schemas.openxmlformats.org/drawingml/2006/main" xmlns:r="http://schemas.openxmlformats.org/officeDocument/2006/relationships" xmlns:mc="http://schemas.openxmlformats.org/markup-compatibility/2006" xmlns:mv="urn:schemas-microsoft-com:mac:vml" xmlns:p="http://schemas.openxmlformats.org/presentationml/2006/main" mc:Ignorable="mv" mc:PreserveAttributes="mv:*">
   <p:cSld>
     <p:spTree>
@@ -11401,7 +11109,7 @@
 </p:sld>
 </file>
 
-<file path=ppt/slides/slide41.xml><?xml version="1.0" encoding="utf-8"?>
+<file path=ppt/slides/slide4.xml><?xml version="1.0" encoding="utf-8"?>
 <p:sld xmlns:a="http://schemas.openxmlformats.org/drawingml/2006/main" xmlns:r="http://schemas.openxmlformats.org/officeDocument/2006/relationships" xmlns:mc="http://schemas.openxmlformats.org/markup-compatibility/2006" xmlns:mv="urn:schemas-microsoft-com:mac:vml" xmlns:p="http://schemas.openxmlformats.org/presentationml/2006/main" mc:Ignorable="mv" mc:PreserveAttributes="mv:*">
   <p:cSld>
     <p:spTree>
@@ -11430,6 +11138,159 @@
         </p:nvSpPr>
         <p:spPr/>
         <p:txBody>
+          <a:bodyPr/>
+          <a:lstStyle/>
+          <a:p>
+            <a:r>
+              <a:rPr lang="en-US"/>
+              <a:t>Structure of a Package</a:t>
+            </a:r>
+          </a:p>
+        </p:txBody>
+      </p:sp>
+      <p:sp>
+        <p:nvSpPr>
+          <p:cNvPr id="4" name="Content Placeholder 3"/>
+          <p:cNvSpPr>
+            <a:spLocks noGrp="1"/>
+          </p:cNvSpPr>
+          <p:nvPr>
+            <p:ph idx="1"/>
+          </p:nvPr>
+        </p:nvSpPr>
+        <p:spPr>
+          <a:xfrm>
+            <a:off x="457200" y="1600200"/>
+            <a:ext cx="8229600" cy="4525963"/>
+          </a:xfrm>
+        </p:spPr>
+        <p:txBody>
+          <a:bodyPr>
+            <a:normAutofit lnSpcReduction="10000"/>
+          </a:bodyPr>
+          <a:lstStyle/>
+          <a:p>
+            <a:r>
+              <a:rPr lang="en-US" dirty="0" smtClean="0"/>
+              <a:t>Simply a directory </a:t>
+            </a:r>
+          </a:p>
+          <a:p>
+            <a:r>
+              <a:rPr lang="en-US" dirty="0" smtClean="0"/>
+              <a:t>Has two important folders:</a:t>
+            </a:r>
+            <a:endParaRPr lang="en-US" dirty="0"/>
+          </a:p>
+          <a:p>
+            <a:pPr marL="457200" lvl="1" indent="0">
+              <a:buNone/>
+            </a:pPr>
+            <a:r>
+              <a:rPr lang="en-US" sz="4000" b="1" dirty="0" smtClean="0"/>
+              <a:t>R/</a:t>
+            </a:r>
+            <a:endParaRPr lang="en-US" sz="4000" b="1" dirty="0"/>
+          </a:p>
+          <a:p>
+            <a:pPr marL="457200" lvl="1" indent="0">
+              <a:buNone/>
+            </a:pPr>
+            <a:r>
+              <a:rPr lang="en-US" sz="4000" b="1" dirty="0" smtClean="0"/>
+              <a:t>man/</a:t>
+            </a:r>
+            <a:endParaRPr lang="en-US" sz="4000" b="1" dirty="0"/>
+          </a:p>
+          <a:p>
+            <a:r>
+              <a:rPr lang="en-US" dirty="0"/>
+              <a:t>And </a:t>
+            </a:r>
+            <a:r>
+              <a:rPr lang="en-US" dirty="0" smtClean="0"/>
+              <a:t>two important </a:t>
+            </a:r>
+            <a:r>
+              <a:rPr lang="en-US" dirty="0"/>
+              <a:t>files:</a:t>
+            </a:r>
+          </a:p>
+          <a:p>
+            <a:pPr marL="457200" lvl="1" indent="0">
+              <a:buNone/>
+            </a:pPr>
+            <a:r>
+              <a:rPr lang="en-US" sz="4000" b="1" dirty="0"/>
+              <a:t>DESCRIPTION</a:t>
+            </a:r>
+          </a:p>
+          <a:p>
+            <a:pPr marL="457200" lvl="1" indent="0">
+              <a:buNone/>
+            </a:pPr>
+            <a:r>
+              <a:rPr lang="en-US" sz="4000" b="1" dirty="0"/>
+              <a:t>NAMESPACE</a:t>
+            </a:r>
+          </a:p>
+          <a:p>
+            <a:pPr>
+              <a:buNone/>
+            </a:pPr>
+            <a:endParaRPr lang="en-US" dirty="0"/>
+          </a:p>
+        </p:txBody>
+      </p:sp>
+    </p:spTree>
+    <p:extLst>
+      <p:ext uri="{BB962C8B-B14F-4D97-AF65-F5344CB8AC3E}">
+        <p14:creationId xmlns:mc="http://schemas.openxmlformats.org/markup-compatibility/2006" xmlns:mv="urn:schemas-microsoft-com:mac:vml" xmlns:p14="http://schemas.microsoft.com/office/powerpoint/2010/main" xmlns:p="http://schemas.openxmlformats.org/presentationml/2006/main" xmlns:r="http://schemas.openxmlformats.org/officeDocument/2006/relationships" xmlns:a="http://schemas.openxmlformats.org/drawingml/2006/main" xmlns="" val="1501347142"/>
+      </p:ext>
+    </p:extLst>
+  </p:cSld>
+  <p:clrMapOvr>
+    <a:masterClrMapping/>
+  </p:clrMapOvr>
+  <p:timing>
+    <p:tnLst>
+      <p:par>
+        <p:cTn id="1" dur="indefinite" restart="never" nodeType="tmRoot"/>
+      </p:par>
+    </p:tnLst>
+  </p:timing>
+</p:sld>
+</file>
+
+<file path=ppt/slides/slide40.xml><?xml version="1.0" encoding="utf-8"?>
+<p:sld xmlns:a="http://schemas.openxmlformats.org/drawingml/2006/main" xmlns:r="http://schemas.openxmlformats.org/officeDocument/2006/relationships" xmlns:mc="http://schemas.openxmlformats.org/markup-compatibility/2006" xmlns:mv="urn:schemas-microsoft-com:mac:vml" xmlns:p="http://schemas.openxmlformats.org/presentationml/2006/main" mc:Ignorable="mv" mc:PreserveAttributes="mv:*">
+  <p:cSld>
+    <p:spTree>
+      <p:nvGrpSpPr>
+        <p:cNvPr id="1" name=""/>
+        <p:cNvGrpSpPr/>
+        <p:nvPr/>
+      </p:nvGrpSpPr>
+      <p:grpSpPr>
+        <a:xfrm>
+          <a:off x="0" y="0"/>
+          <a:ext cx="0" cy="0"/>
+          <a:chOff x="0" y="0"/>
+          <a:chExt cx="0" cy="0"/>
+        </a:xfrm>
+      </p:grpSpPr>
+      <p:sp>
+        <p:nvSpPr>
+          <p:cNvPr id="2" name="Title 1"/>
+          <p:cNvSpPr>
+            <a:spLocks noGrp="1"/>
+          </p:cNvSpPr>
+          <p:nvPr>
+            <p:ph type="title"/>
+          </p:nvPr>
+        </p:nvSpPr>
+        <p:spPr/>
+        <p:txBody>
           <a:bodyPr>
             <a:normAutofit/>
           </a:bodyPr>
@@ -11500,7 +11361,7 @@
 </p:sld>
 </file>
 
-<file path=ppt/slides/slide42.xml><?xml version="1.0" encoding="utf-8"?>
+<file path=ppt/slides/slide41.xml><?xml version="1.0" encoding="utf-8"?>
 <p:sld xmlns:a="http://schemas.openxmlformats.org/drawingml/2006/main" xmlns:r="http://schemas.openxmlformats.org/officeDocument/2006/relationships" xmlns:mc="http://schemas.openxmlformats.org/markup-compatibility/2006" xmlns:mv="urn:schemas-microsoft-com:mac:vml" xmlns:p="http://schemas.openxmlformats.org/presentationml/2006/main" mc:Ignorable="mv" mc:PreserveAttributes="mv:*">
   <p:cSld>
     <p:spTree>
@@ -13034,6 +12895,114 @@
 </p:sld>
 </file>
 
+<file path=ppt/slides/slide42.xml><?xml version="1.0" encoding="utf-8"?>
+<p:sld xmlns:a="http://schemas.openxmlformats.org/drawingml/2006/main" xmlns:r="http://schemas.openxmlformats.org/officeDocument/2006/relationships" xmlns:mc="http://schemas.openxmlformats.org/markup-compatibility/2006" xmlns:mv="urn:schemas-microsoft-com:mac:vml" xmlns:p="http://schemas.openxmlformats.org/presentationml/2006/main" mc:Ignorable="mv" mc:PreserveAttributes="mv:*">
+  <p:cSld>
+    <p:spTree>
+      <p:nvGrpSpPr>
+        <p:cNvPr id="1" name=""/>
+        <p:cNvGrpSpPr/>
+        <p:nvPr/>
+      </p:nvGrpSpPr>
+      <p:grpSpPr>
+        <a:xfrm>
+          <a:off x="0" y="0"/>
+          <a:ext cx="0" cy="0"/>
+          <a:chOff x="0" y="0"/>
+          <a:chExt cx="0" cy="0"/>
+        </a:xfrm>
+      </p:grpSpPr>
+      <p:sp>
+        <p:nvSpPr>
+          <p:cNvPr id="2" name="Title 1"/>
+          <p:cNvSpPr>
+            <a:spLocks noGrp="1"/>
+          </p:cNvSpPr>
+          <p:nvPr>
+            <p:ph type="title"/>
+          </p:nvPr>
+        </p:nvSpPr>
+        <p:spPr/>
+        <p:txBody>
+          <a:bodyPr/>
+          <a:lstStyle/>
+          <a:p>
+            <a:r>
+              <a:rPr lang="en-US"/>
+              <a:t>zelig2: Function Signature</a:t>
+            </a:r>
+          </a:p>
+        </p:txBody>
+      </p:sp>
+      <p:sp>
+        <p:nvSpPr>
+          <p:cNvPr id="3" name="Content Placeholder 2"/>
+          <p:cNvSpPr>
+            <a:spLocks noGrp="1"/>
+          </p:cNvSpPr>
+          <p:nvPr>
+            <p:ph idx="1"/>
+          </p:nvPr>
+        </p:nvSpPr>
+        <p:spPr/>
+        <p:txBody>
+          <a:bodyPr/>
+          <a:lstStyle/>
+          <a:p>
+            <a:r>
+              <a:rPr lang="en-US"/>
+              <a:t>"formula" specifies the model formula</a:t>
+            </a:r>
+          </a:p>
+          <a:p>
+            <a:r>
+              <a:rPr lang="en-US"/>
+              <a:t>"data" specifies the data.frame</a:t>
+            </a:r>
+          </a:p>
+          <a:p>
+            <a:r>
+              <a:rPr lang="en-US"/>
+              <a:t>All other parameters are </a:t>
+            </a:r>
+            <a:r>
+              <a:rPr lang="en-US" b="1"/>
+              <a:t>optional</a:t>
+            </a:r>
+          </a:p>
+          <a:p>
+            <a:r>
+              <a:rPr lang="en-US"/>
+              <a:t>Other parameters are determined by the model fitting function's requirements</a:t>
+            </a:r>
+          </a:p>
+          <a:p>
+            <a:pPr lvl="1"/>
+            <a:r>
+              <a:rPr lang="en-US"/>
+              <a:t>Use "args" to determine what parameters are available for the model-fitting function</a:t>
+            </a:r>
+          </a:p>
+          <a:p>
+            <a:endParaRPr lang="en-US"/>
+          </a:p>
+        </p:txBody>
+      </p:sp>
+    </p:spTree>
+  </p:cSld>
+  <p:clrMapOvr>
+    <a:masterClrMapping/>
+  </p:clrMapOvr>
+  <p:timing>
+    <p:tnLst>
+      <p:par>
+        <p:cTn id="1" dur="indefinite" restart="never" nodeType="tmRoot"/>
+      </p:par>
+    </p:tnLst>
+  </p:timing>
+</p:sld>
+</file>
+
 <file path=ppt/slides/slide43.xml><?xml version="1.0" encoding="utf-8"?>
 <p:sld xmlns:a="http://schemas.openxmlformats.org/drawingml/2006/main" xmlns:r="http://schemas.openxmlformats.org/officeDocument/2006/relationships" xmlns:mc="http://schemas.openxmlformats.org/markup-compatibility/2006" xmlns:mv="urn:schemas-microsoft-com:mac:vml" xmlns:p="http://schemas.openxmlformats.org/presentationml/2006/main" mc:Ignorable="mv" mc:PreserveAttributes="mv:*">
   <p:cSld>
@@ -13068,7 +13037,7 @@
           <a:p>
             <a:r>
               <a:rPr lang="en-US"/>
-              <a:t>zelig2: Function Signature</a:t>
+              <a:t>zelig2: Function Body</a:t>
             </a:r>
           </a:p>
         </p:txBody>
@@ -13090,36 +13059,34 @@
           <a:p>
             <a:r>
               <a:rPr lang="en-US"/>
-              <a:t>"formula" specifies the model formula</a:t>
-            </a:r>
-          </a:p>
-          <a:p>
-            <a:r>
-              <a:rPr lang="en-US"/>
-              <a:t>"data" specifies the data.frame</a:t>
-            </a:r>
-          </a:p>
-          <a:p>
-            <a:r>
-              <a:rPr lang="en-US"/>
-              <a:t>All other parameters are </a:t>
-            </a:r>
-            <a:r>
-              <a:rPr lang="en-US" b="1"/>
-              <a:t>optional</a:t>
-            </a:r>
-          </a:p>
-          <a:p>
-            <a:r>
-              <a:rPr lang="en-US"/>
-              <a:t>Other parameters are determined by the model fitting function's requirements</a:t>
+              <a:t>Typically does very little</a:t>
+            </a:r>
+          </a:p>
+          <a:p>
+            <a:r>
+              <a:rPr lang="en-US"/>
+              <a:t>Can be used to</a:t>
             </a:r>
           </a:p>
           <a:p>
             <a:pPr lvl="1"/>
             <a:r>
               <a:rPr lang="en-US"/>
-              <a:t>Use "args" to determine what parameters are available for the model-fitting function</a:t>
+              <a:t>Print-out error and warning messages</a:t>
+            </a:r>
+          </a:p>
+          <a:p>
+            <a:pPr lvl="1"/>
+            <a:r>
+              <a:rPr lang="en-US"/>
+              <a:t>Manipulate model formulae</a:t>
+            </a:r>
+          </a:p>
+          <a:p>
+            <a:pPr lvl="1"/>
+            <a:r>
+              <a:rPr lang="en-US"/>
+              <a:t>Assign default values that do not exist for the model-fitting function</a:t>
             </a:r>
           </a:p>
           <a:p>
@@ -13176,7 +13143,7 @@
           <a:p>
             <a:r>
               <a:rPr lang="en-US"/>
-              <a:t>zelig2: Function Body</a:t>
+              <a:t>zelig2: Return Value</a:t>
             </a:r>
           </a:p>
         </p:txBody>
@@ -13198,39 +13165,22 @@
           <a:p>
             <a:r>
               <a:rPr lang="en-US"/>
-              <a:t>Typically does very little</a:t>
-            </a:r>
-          </a:p>
-          <a:p>
-            <a:r>
-              <a:rPr lang="en-US"/>
-              <a:t>Can be used to</a:t>
-            </a:r>
-          </a:p>
-          <a:p>
-            <a:pPr lvl="1"/>
-            <a:r>
-              <a:rPr lang="en-US"/>
-              <a:t>Print-out error and warning messages</a:t>
-            </a:r>
-          </a:p>
-          <a:p>
-            <a:pPr lvl="1"/>
-            <a:r>
-              <a:rPr lang="en-US"/>
-              <a:t>Manipulate model formulae</a:t>
-            </a:r>
-          </a:p>
-          <a:p>
-            <a:pPr lvl="1"/>
-            <a:r>
-              <a:rPr lang="en-US"/>
-              <a:t>Assign default values that do not exist for the model-fitting function</a:t>
-            </a:r>
-            <a:endParaRPr lang="en-US"/>
-          </a:p>
-          <a:p>
-            <a:endParaRPr lang="en-US"/>
+              <a:t>".function" specifies the name of model-fitting function</a:t>
+            </a:r>
+          </a:p>
+          <a:p>
+            <a:r>
+              <a:rPr lang="en-US"/>
+              <a:t>All other entries specify values to be </a:t>
+            </a:r>
+            <a:r>
+              <a:rPr lang="en-US" b="1"/>
+              <a:t>explicitly</a:t>
+            </a:r>
+            <a:r>
+              <a:rPr lang="en-US"/>
+              <a:t> set for the model-fitting function</a:t>
+            </a:r>
           </a:p>
         </p:txBody>
       </p:sp>
@@ -13283,7 +13233,7 @@
           <a:p>
             <a:r>
               <a:rPr lang="en-US"/>
-              <a:t>zelig2: Return Value</a:t>
+              <a:t>zelig2</a:t>
             </a:r>
           </a:p>
         </p:txBody>
@@ -13304,22 +13254,52 @@
           <a:lstStyle/>
           <a:p>
             <a:r>
-              <a:rPr lang="en-US"/>
-              <a:t>".function" specifies the name of model-fitting function</a:t>
-            </a:r>
-          </a:p>
-          <a:p>
-            <a:r>
-              <a:rPr lang="en-US"/>
-              <a:t>All other entries specify values to be </a:t>
-            </a:r>
-            <a:r>
               <a:rPr lang="en-US" b="1"/>
-              <a:t>explicitly</a:t>
-            </a:r>
-            <a:r>
-              <a:rPr lang="en-US"/>
-              <a:t> set for the model-fitting function</a:t>
+              <a:t>Does not</a:t>
+            </a:r>
+            <a:r>
+              <a:rPr lang="en-US"/>
+              <a:t> fit models itself</a:t>
+            </a:r>
+          </a:p>
+          <a:p>
+            <a:r>
+              <a:rPr lang="en-US"/>
+              <a:t>Uses outside models to fit data</a:t>
+            </a:r>
+          </a:p>
+          <a:p>
+            <a:pPr lvl="1"/>
+            <a:r>
+              <a:rPr lang="en-US"/>
+              <a:t>"lm", "glm", "nlme", etc.</a:t>
+            </a:r>
+          </a:p>
+          <a:p>
+            <a:r>
+              <a:rPr lang="en-US"/>
+              <a:t>Manages how zelig interacts with these models:</a:t>
+            </a:r>
+          </a:p>
+          <a:p>
+            <a:pPr lvl="1"/>
+            <a:r>
+              <a:rPr lang="en-US"/>
+              <a:t>Specifies what function will fit the model</a:t>
+            </a:r>
+          </a:p>
+          <a:p>
+            <a:pPr lvl="1"/>
+            <a:r>
+              <a:rPr lang="en-US"/>
+              <a:t>Specifies parameters</a:t>
+            </a:r>
+          </a:p>
+          <a:p>
+            <a:pPr lvl="1"/>
+            <a:r>
+              <a:rPr lang="en-US"/>
+              <a:t>Manipulates objects</a:t>
             </a:r>
           </a:p>
         </p:txBody>
@@ -13358,12 +13338,12 @@
       </p:grpSpPr>
       <p:sp>
         <p:nvSpPr>
-          <p:cNvPr id="2" name="Title 1"/>
-          <p:cNvSpPr>
-            <a:spLocks noGrp="1"/>
-          </p:cNvSpPr>
-          <p:nvPr>
-            <p:ph type="title"/>
+          <p:cNvPr id="4" name="Title 3"/>
+          <p:cNvSpPr>
+            <a:spLocks noGrp="1"/>
+          </p:cNvSpPr>
+          <p:nvPr>
+            <p:ph type="ctrTitle"/>
           </p:nvPr>
         </p:nvSpPr>
         <p:spPr/>
@@ -13373,19 +13353,19 @@
           <a:p>
             <a:r>
               <a:rPr lang="en-US"/>
-              <a:t>zelig2</a:t>
-            </a:r>
-          </a:p>
-        </p:txBody>
-      </p:sp>
-      <p:sp>
-        <p:nvSpPr>
-          <p:cNvPr id="3" name="Content Placeholder 2"/>
-          <p:cNvSpPr>
-            <a:spLocks noGrp="1"/>
-          </p:cNvSpPr>
-          <p:nvPr>
-            <p:ph idx="1"/>
+              <a:t>Miscellaneous Topics</a:t>
+            </a:r>
+          </a:p>
+        </p:txBody>
+      </p:sp>
+      <p:sp>
+        <p:nvSpPr>
+          <p:cNvPr id="5" name="Subtitle 4"/>
+          <p:cNvSpPr>
+            <a:spLocks noGrp="1"/>
+          </p:cNvSpPr>
+          <p:nvPr>
+            <p:ph type="subTitle" idx="1"/>
           </p:nvPr>
         </p:nvSpPr>
         <p:spPr/>
@@ -13393,54 +13373,7 @@
           <a:bodyPr/>
           <a:lstStyle/>
           <a:p>
-            <a:r>
-              <a:rPr lang="en-US" b="1"/>
-              <a:t>Does not</a:t>
-            </a:r>
-            <a:r>
-              <a:rPr lang="en-US"/>
-              <a:t> fit models itself</a:t>
-            </a:r>
-          </a:p>
-          <a:p>
-            <a:r>
-              <a:rPr lang="en-US"/>
-              <a:t>Uses outside models to fit data</a:t>
-            </a:r>
-          </a:p>
-          <a:p>
-            <a:pPr lvl="1"/>
-            <a:r>
-              <a:rPr lang="en-US"/>
-              <a:t>"lm", "glm", "nlme", etc.</a:t>
-            </a:r>
-          </a:p>
-          <a:p>
-            <a:r>
-              <a:rPr lang="en-US"/>
-              <a:t>Manages how zelig interacts with these models:</a:t>
-            </a:r>
-          </a:p>
-          <a:p>
-            <a:pPr lvl="1"/>
-            <a:r>
-              <a:rPr lang="en-US"/>
-              <a:t>Specifies what function will fit the model</a:t>
-            </a:r>
-          </a:p>
-          <a:p>
-            <a:pPr lvl="1"/>
-            <a:r>
-              <a:rPr lang="en-US"/>
-              <a:t>Specifies parameters</a:t>
-            </a:r>
-          </a:p>
-          <a:p>
-            <a:pPr lvl="1"/>
-            <a:r>
-              <a:rPr lang="en-US"/>
-              <a:t>Manipulates objects</a:t>
-            </a:r>
+            <a:endParaRPr lang="en-US"/>
           </a:p>
         </p:txBody>
       </p:sp>
@@ -13449,13 +13382,6 @@
   <p:clrMapOvr>
     <a:masterClrMapping/>
   </p:clrMapOvr>
-  <p:timing>
-    <p:tnLst>
-      <p:par>
-        <p:cTn id="1" dur="indefinite" restart="never" nodeType="tmRoot"/>
-      </p:par>
-    </p:tnLst>
-  </p:timing>
 </p:sld>
 </file>
 
@@ -13478,12 +13404,12 @@
       </p:grpSpPr>
       <p:sp>
         <p:nvSpPr>
-          <p:cNvPr id="4" name="Title 3"/>
-          <p:cNvSpPr>
-            <a:spLocks noGrp="1"/>
-          </p:cNvSpPr>
-          <p:nvPr>
-            <p:ph type="ctrTitle"/>
+          <p:cNvPr id="2" name="Title 1"/>
+          <p:cNvSpPr>
+            <a:spLocks noGrp="1"/>
+          </p:cNvSpPr>
+          <p:nvPr>
+            <p:ph type="title"/>
           </p:nvPr>
         </p:nvSpPr>
         <p:spPr/>
@@ -13493,25 +13419,63 @@
           <a:p>
             <a:r>
               <a:rPr lang="en-US"/>
-              <a:t>Miscellaneous Topics</a:t>
-            </a:r>
-          </a:p>
-        </p:txBody>
-      </p:sp>
-      <p:sp>
-        <p:nvSpPr>
-          <p:cNvPr id="5" name="Subtitle 4"/>
-          <p:cNvSpPr>
-            <a:spLocks noGrp="1"/>
-          </p:cNvSpPr>
-          <p:nvPr>
-            <p:ph type="subTitle" idx="1"/>
+              <a:t>Family Objects</a:t>
+            </a:r>
+          </a:p>
+        </p:txBody>
+      </p:sp>
+      <p:sp>
+        <p:nvSpPr>
+          <p:cNvPr id="3" name="Content Placeholder 2"/>
+          <p:cNvSpPr>
+            <a:spLocks noGrp="1"/>
+          </p:cNvSpPr>
+          <p:nvPr>
+            <p:ph idx="1"/>
           </p:nvPr>
         </p:nvSpPr>
         <p:spPr/>
         <p:txBody>
           <a:bodyPr/>
           <a:lstStyle/>
+          <a:p>
+            <a:r>
+              <a:rPr lang="en-US"/>
+              <a:t>Store information about link functions</a:t>
+            </a:r>
+          </a:p>
+          <a:p>
+            <a:pPr lvl="1"/>
+            <a:r>
+              <a:rPr lang="en-US"/>
+              <a:t>"Link" functions help specify the relationship between the observed value and the underlying linear predictors</a:t>
+            </a:r>
+          </a:p>
+          <a:p>
+            <a:pPr lvl="1"/>
+            <a:r>
+              <a:rPr lang="en-US"/>
+              <a:t>"Inverse Link" simply inverse this process</a:t>
+            </a:r>
+          </a:p>
+          <a:p>
+            <a:r>
+              <a:rPr lang="en-US"/>
+              <a:t>Used by model-fitting functions</a:t>
+            </a:r>
+          </a:p>
+          <a:p>
+            <a:r>
+              <a:rPr lang="en-US"/>
+              <a:t>Inverse link functions are used in qi simulation</a:t>
+            </a:r>
+          </a:p>
+          <a:p>
+            <a:r>
+              <a:rPr lang="en-US"/>
+              <a:t>See help documentation: "?family"</a:t>
+            </a:r>
+          </a:p>
           <a:p>
             <a:endParaRPr lang="en-US"/>
           </a:p>
@@ -13522,6 +13486,13 @@
   <p:clrMapOvr>
     <a:masterClrMapping/>
   </p:clrMapOvr>
+  <p:timing>
+    <p:tnLst>
+      <p:par>
+        <p:cTn id="1" dur="indefinite" restart="never" nodeType="tmRoot"/>
+      </p:par>
+    </p:tnLst>
+  </p:timing>
 </p:sld>
 </file>
 
@@ -13544,12 +13515,12 @@
       </p:grpSpPr>
       <p:sp>
         <p:nvSpPr>
-          <p:cNvPr id="2" name="Title 1"/>
-          <p:cNvSpPr>
-            <a:spLocks noGrp="1"/>
-          </p:cNvSpPr>
-          <p:nvPr>
-            <p:ph type="title"/>
+          <p:cNvPr id="6" name="Title 5"/>
+          <p:cNvSpPr>
+            <a:spLocks noGrp="1"/>
+          </p:cNvSpPr>
+          <p:nvPr>
+            <p:ph type="ctrTitle"/>
           </p:nvPr>
         </p:nvSpPr>
         <p:spPr/>
@@ -13559,63 +13530,25 @@
           <a:p>
             <a:r>
               <a:rPr lang="en-US"/>
-              <a:t>Family Objects</a:t>
-            </a:r>
-          </a:p>
-        </p:txBody>
-      </p:sp>
-      <p:sp>
-        <p:nvSpPr>
-          <p:cNvPr id="3" name="Content Placeholder 2"/>
-          <p:cNvSpPr>
-            <a:spLocks noGrp="1"/>
-          </p:cNvSpPr>
-          <p:nvPr>
-            <p:ph idx="1"/>
+              <a:t>Workflow</a:t>
+            </a:r>
+          </a:p>
+        </p:txBody>
+      </p:sp>
+      <p:sp>
+        <p:nvSpPr>
+          <p:cNvPr id="7" name="Subtitle 6"/>
+          <p:cNvSpPr>
+            <a:spLocks noGrp="1"/>
+          </p:cNvSpPr>
+          <p:nvPr>
+            <p:ph type="subTitle" idx="1"/>
           </p:nvPr>
         </p:nvSpPr>
         <p:spPr/>
         <p:txBody>
           <a:bodyPr/>
           <a:lstStyle/>
-          <a:p>
-            <a:r>
-              <a:rPr lang="en-US"/>
-              <a:t>Store information about link functions</a:t>
-            </a:r>
-          </a:p>
-          <a:p>
-            <a:pPr lvl="1"/>
-            <a:r>
-              <a:rPr lang="en-US"/>
-              <a:t>"Link" functions help specify the relationship between the observed value and the underlying linear predictors</a:t>
-            </a:r>
-          </a:p>
-          <a:p>
-            <a:pPr lvl="1"/>
-            <a:r>
-              <a:rPr lang="en-US"/>
-              <a:t>"Inverse Link" simply inverse this process</a:t>
-            </a:r>
-          </a:p>
-          <a:p>
-            <a:r>
-              <a:rPr lang="en-US"/>
-              <a:t>Used by model-fitting functions</a:t>
-            </a:r>
-          </a:p>
-          <a:p>
-            <a:r>
-              <a:rPr lang="en-US"/>
-              <a:t>Inverse link functions are used in qi simulation</a:t>
-            </a:r>
-          </a:p>
-          <a:p>
-            <a:r>
-              <a:rPr lang="en-US"/>
-              <a:t>See help documentation: "?family"</a:t>
-            </a:r>
-          </a:p>
           <a:p>
             <a:endParaRPr lang="en-US"/>
           </a:p>
@@ -13655,12 +13588,12 @@
       </p:grpSpPr>
       <p:sp>
         <p:nvSpPr>
-          <p:cNvPr id="6" name="Title 5"/>
-          <p:cNvSpPr>
-            <a:spLocks noGrp="1"/>
-          </p:cNvSpPr>
-          <p:nvPr>
-            <p:ph type="ctrTitle"/>
+          <p:cNvPr id="2" name="Title 1"/>
+          <p:cNvSpPr>
+            <a:spLocks noGrp="1"/>
+          </p:cNvSpPr>
+          <p:nvPr>
+            <p:ph type="title"/>
           </p:nvPr>
         </p:nvSpPr>
         <p:spPr/>
@@ -13677,12 +13610,12 @@
       </p:sp>
       <p:sp>
         <p:nvSpPr>
-          <p:cNvPr id="7" name="Subtitle 6"/>
-          <p:cNvSpPr>
-            <a:spLocks noGrp="1"/>
-          </p:cNvSpPr>
-          <p:nvPr>
-            <p:ph type="subTitle" idx="1"/>
+          <p:cNvPr id="3" name="Content Placeholder 2"/>
+          <p:cNvSpPr>
+            <a:spLocks noGrp="1"/>
+          </p:cNvSpPr>
+          <p:nvPr>
+            <p:ph idx="1"/>
           </p:nvPr>
         </p:nvSpPr>
         <p:spPr/>
@@ -13690,7 +13623,45 @@
           <a:bodyPr/>
           <a:lstStyle/>
           <a:p>
-            <a:endParaRPr lang="en-US"/>
+            <a:r>
+              <a:rPr lang="en-US" dirty="0"/>
+              <a:t>Find existing model</a:t>
+            </a:r>
+          </a:p>
+          <a:p>
+            <a:r>
+              <a:rPr lang="en-US" dirty="0"/>
+              <a:t>Determine what the arguments are</a:t>
+            </a:r>
+          </a:p>
+          <a:p>
+            <a:r>
+              <a:rPr lang="en-US" dirty="0"/>
+              <a:t>Return a list at the bottom of the function</a:t>
+            </a:r>
+          </a:p>
+          <a:p>
+            <a:r>
+              <a:rPr lang="en-US" dirty="0"/>
+              <a:t>Manipulate objects</a:t>
+            </a:r>
+          </a:p>
+          <a:p>
+            <a:r>
+              <a:rPr lang="en-US" dirty="0"/>
+              <a:t>Write </a:t>
+            </a:r>
+            <a:r>
+              <a:rPr lang="en-US" dirty="0" smtClean="0"/>
+              <a:t>warnings</a:t>
+            </a:r>
+            <a:endParaRPr lang="en-US" dirty="0"/>
+          </a:p>
+          <a:p>
+            <a:r>
+              <a:rPr lang="en-US" dirty="0"/>
+              <a:t>Document</a:t>
+            </a:r>
           </a:p>
         </p:txBody>
       </p:sp>
@@ -13833,7 +13804,7 @@
     </p:spTree>
     <p:extLst>
       <p:ext uri="{BB962C8B-B14F-4D97-AF65-F5344CB8AC3E}">
-        <p14:creationId xmlns="" xmlns:a="http://schemas.openxmlformats.org/drawingml/2006/main" xmlns:r="http://schemas.openxmlformats.org/officeDocument/2006/relationships" xmlns:p="http://schemas.openxmlformats.org/presentationml/2006/main" xmlns:p14="http://schemas.microsoft.com/office/powerpoint/2010/main" xmlns:mv="urn:schemas-microsoft-com:mac:vml" xmlns:mc="http://schemas.openxmlformats.org/markup-compatibility/2006" val="3623617875"/>
+        <p14:creationId xmlns:mc="http://schemas.openxmlformats.org/markup-compatibility/2006" xmlns:mv="urn:schemas-microsoft-com:mac:vml" xmlns:p14="http://schemas.microsoft.com/office/powerpoint/2010/main" xmlns:p="http://schemas.openxmlformats.org/presentationml/2006/main" xmlns:r="http://schemas.openxmlformats.org/officeDocument/2006/relationships" xmlns:a="http://schemas.openxmlformats.org/drawingml/2006/main" xmlns="" val="3623617875"/>
       </p:ext>
     </p:extLst>
   </p:cSld>
@@ -13883,9 +13854,10 @@
           <a:lstStyle/>
           <a:p>
             <a:r>
-              <a:rPr lang="en-US"/>
+              <a:rPr lang="en-US" dirty="0" smtClean="0"/>
               <a:t>Workflow</a:t>
             </a:r>
+            <a:endParaRPr lang="en-US" dirty="0"/>
           </a:p>
         </p:txBody>
       </p:sp>
@@ -13905,48 +13877,51 @@
           <a:lstStyle/>
           <a:p>
             <a:r>
-              <a:rPr lang="en-US" dirty="0"/>
-              <a:t>Find existing model</a:t>
-            </a:r>
-          </a:p>
-          <a:p>
-            <a:r>
-              <a:rPr lang="en-US" dirty="0"/>
-              <a:t>Determine what the arguments are</a:t>
-            </a:r>
-          </a:p>
-          <a:p>
-            <a:r>
-              <a:rPr lang="en-US" dirty="0"/>
-              <a:t>Return a list at the bottom of the function</a:t>
-            </a:r>
-          </a:p>
-          <a:p>
-            <a:r>
-              <a:rPr lang="en-US" dirty="0"/>
-              <a:t>Manipulate objects</a:t>
-            </a:r>
-          </a:p>
-          <a:p>
-            <a:r>
-              <a:rPr lang="en-US" dirty="0"/>
-              <a:t>Write </a:t>
-            </a:r>
-            <a:r>
               <a:rPr lang="en-US" dirty="0" smtClean="0"/>
-              <a:t>warnings</a:t>
+              <a:t>Write demo code</a:t>
+            </a:r>
+          </a:p>
+          <a:p>
+            <a:r>
+              <a:rPr lang="en-US" dirty="0" smtClean="0"/>
+              <a:t>Develop code (in the “</a:t>
+            </a:r>
+            <a:r>
+              <a:rPr lang="en-US" b="1" dirty="0" smtClean="0"/>
+              <a:t>R/</a:t>
+            </a:r>
+            <a:r>
+              <a:rPr lang="en-US" dirty="0" smtClean="0"/>
+              <a:t>” directory)</a:t>
+            </a:r>
+          </a:p>
+          <a:p>
+            <a:r>
+              <a:rPr lang="en-US" dirty="0" smtClean="0"/>
+              <a:t>Install (or re-install) package</a:t>
+            </a:r>
+          </a:p>
+          <a:p>
+            <a:r>
+              <a:rPr lang="en-US" dirty="0" smtClean="0"/>
+              <a:t>Test demo code</a:t>
+            </a:r>
+          </a:p>
+          <a:p>
+            <a:r>
+              <a:rPr lang="en-US" dirty="0" smtClean="0"/>
+              <a:t>Go back to step 2</a:t>
             </a:r>
             <a:endParaRPr lang="en-US" dirty="0"/>
           </a:p>
-          <a:p>
-            <a:r>
-              <a:rPr lang="en-US" dirty="0"/>
-              <a:t>Document</a:t>
-            </a:r>
-          </a:p>
         </p:txBody>
       </p:sp>
     </p:spTree>
+    <p:extLst>
+      <p:ext uri="{BB962C8B-B14F-4D97-AF65-F5344CB8AC3E}">
+        <p14:creationId xmlns:mc="http://schemas.openxmlformats.org/markup-compatibility/2006" xmlns:mv="urn:schemas-microsoft-com:mac:vml" xmlns:p14="http://schemas.microsoft.com/office/powerpoint/2010/main" xmlns:p="http://schemas.openxmlformats.org/presentationml/2006/main" xmlns:r="http://schemas.openxmlformats.org/officeDocument/2006/relationships" xmlns:a="http://schemas.openxmlformats.org/drawingml/2006/main" xmlns="" val="3145060271"/>
+      </p:ext>
+    </p:extLst>
   </p:cSld>
   <p:clrMapOvr>
     <a:masterClrMapping/>
@@ -13995,7 +13970,7 @@
           <a:p>
             <a:r>
               <a:rPr lang="en-US" dirty="0" smtClean="0"/>
-              <a:t>Workflow</a:t>
+              <a:t>Workshop Goals</a:t>
             </a:r>
             <a:endParaRPr lang="en-US" dirty="0"/>
           </a:p>
@@ -14013,45 +13988,63 @@
         </p:nvSpPr>
         <p:spPr/>
         <p:txBody>
-          <a:bodyPr/>
+          <a:bodyPr>
+            <a:normAutofit lnSpcReduction="10000"/>
+          </a:bodyPr>
           <a:lstStyle/>
           <a:p>
             <a:r>
               <a:rPr lang="en-US" dirty="0" smtClean="0"/>
-              <a:t>Write demo code</a:t>
+              <a:t>We are going to focus on simulating individual statistical models</a:t>
             </a:r>
           </a:p>
           <a:p>
             <a:r>
               <a:rPr lang="en-US" dirty="0" smtClean="0"/>
-              <a:t>Develop code (in the “</a:t>
-            </a:r>
-            <a:r>
-              <a:rPr lang="en-US" b="1" dirty="0" smtClean="0"/>
-              <a:t>R/</a:t>
-            </a:r>
+              <a:t>Each student will create an R package</a:t>
+            </a:r>
+          </a:p>
+          <a:p>
             <a:r>
               <a:rPr lang="en-US" dirty="0" smtClean="0"/>
-              <a:t>” directory)</a:t>
+              <a:t>Each student will implement a single statistical model</a:t>
             </a:r>
           </a:p>
           <a:p>
             <a:r>
               <a:rPr lang="en-US" dirty="0" smtClean="0"/>
-              <a:t>Install (or re-install) package</a:t>
-            </a:r>
-          </a:p>
-          <a:p>
+              <a:t>This model will be made up of 3 methods:</a:t>
+            </a:r>
+          </a:p>
+          <a:p>
+            <a:pPr lvl="1"/>
             <a:r>
               <a:rPr lang="en-US" dirty="0" smtClean="0"/>
-              <a:t>Test demo code</a:t>
-            </a:r>
-          </a:p>
-          <a:p>
+              <a:t>zelig2&lt;model-name&gt;</a:t>
+            </a:r>
+          </a:p>
+          <a:p>
+            <a:pPr lvl="1"/>
+            <a:r>
+              <a:rPr lang="en-US" dirty="0" err="1" smtClean="0"/>
+              <a:t>param</a:t>
+            </a:r>
             <a:r>
               <a:rPr lang="en-US" dirty="0" smtClean="0"/>
-              <a:t>Go back to step 2</a:t>
-            </a:r>
+              <a:t>.&lt;model-name&gt;</a:t>
+            </a:r>
+          </a:p>
+          <a:p>
+            <a:pPr lvl="1"/>
+            <a:r>
+              <a:rPr lang="en-US" dirty="0" smtClean="0"/>
+              <a:t>qi.&lt;model-name&gt;</a:t>
+            </a:r>
+          </a:p>
+          <a:p>
+            <a:endParaRPr lang="en-US" dirty="0" smtClean="0"/>
+          </a:p>
+          <a:p>
             <a:endParaRPr lang="en-US" dirty="0"/>
           </a:p>
         </p:txBody>
@@ -14059,94 +14052,9 @@
     </p:spTree>
     <p:extLst>
       <p:ext uri="{BB962C8B-B14F-4D97-AF65-F5344CB8AC3E}">
-        <p14:creationId xmlns="" xmlns:a="http://schemas.openxmlformats.org/drawingml/2006/main" xmlns:r="http://schemas.openxmlformats.org/officeDocument/2006/relationships" xmlns:p="http://schemas.openxmlformats.org/presentationml/2006/main" xmlns:p14="http://schemas.microsoft.com/office/powerpoint/2010/main" xmlns:mv="urn:schemas-microsoft-com:mac:vml" xmlns:mc="http://schemas.openxmlformats.org/markup-compatibility/2006" val="3145060271"/>
+        <p14:creationId xmlns:mc="http://schemas.openxmlformats.org/markup-compatibility/2006" xmlns:mv="urn:schemas-microsoft-com:mac:vml" xmlns:p14="http://schemas.microsoft.com/office/powerpoint/2010/main" xmlns:p="http://schemas.openxmlformats.org/presentationml/2006/main" xmlns:r="http://schemas.openxmlformats.org/officeDocument/2006/relationships" xmlns:a="http://schemas.openxmlformats.org/drawingml/2006/main" xmlns="" val="1712515247"/>
       </p:ext>
     </p:extLst>
-  </p:cSld>
-  <p:clrMapOvr>
-    <a:masterClrMapping/>
-  </p:clrMapOvr>
-  <p:timing>
-    <p:tnLst>
-      <p:par>
-        <p:cTn id="1" dur="indefinite" restart="never" nodeType="tmRoot"/>
-      </p:par>
-    </p:tnLst>
-  </p:timing>
-</p:sld>
-</file>
-
-<file path=ppt/slides/slide52.xml><?xml version="1.0" encoding="utf-8"?>
-<p:sld xmlns:a="http://schemas.openxmlformats.org/drawingml/2006/main" xmlns:r="http://schemas.openxmlformats.org/officeDocument/2006/relationships" xmlns:mc="http://schemas.openxmlformats.org/markup-compatibility/2006" xmlns:mv="urn:schemas-microsoft-com:mac:vml" xmlns:p="http://schemas.openxmlformats.org/presentationml/2006/main" mc:Ignorable="mv" mc:PreserveAttributes="mv:*">
-  <p:cSld>
-    <p:spTree>
-      <p:nvGrpSpPr>
-        <p:cNvPr id="1" name=""/>
-        <p:cNvGrpSpPr/>
-        <p:nvPr/>
-      </p:nvGrpSpPr>
-      <p:grpSpPr>
-        <a:xfrm>
-          <a:off x="0" y="0"/>
-          <a:ext cx="0" cy="0"/>
-          <a:chOff x="0" y="0"/>
-          <a:chExt cx="0" cy="0"/>
-        </a:xfrm>
-      </p:grpSpPr>
-      <p:sp>
-        <p:nvSpPr>
-          <p:cNvPr id="2" name="Title 1"/>
-          <p:cNvSpPr>
-            <a:spLocks noGrp="1"/>
-          </p:cNvSpPr>
-          <p:nvPr>
-            <p:ph type="title"/>
-          </p:nvPr>
-        </p:nvSpPr>
-        <p:spPr/>
-        <p:txBody>
-          <a:bodyPr/>
-          <a:lstStyle/>
-          <a:p>
-            <a:r>
-              <a:rPr lang="en-US"/>
-              <a:t>Workshop</a:t>
-            </a:r>
-          </a:p>
-        </p:txBody>
-      </p:sp>
-      <p:sp>
-        <p:nvSpPr>
-          <p:cNvPr id="3" name="Content Placeholder 2"/>
-          <p:cNvSpPr>
-            <a:spLocks noGrp="1"/>
-          </p:cNvSpPr>
-          <p:nvPr>
-            <p:ph idx="1"/>
-          </p:nvPr>
-        </p:nvSpPr>
-        <p:spPr/>
-        <p:txBody>
-          <a:bodyPr/>
-          <a:lstStyle/>
-          <a:p>
-            <a:r>
-              <a:rPr lang="en-US"/>
-              <a:t>Choose a Generalized Linear model</a:t>
-            </a:r>
-          </a:p>
-          <a:p>
-            <a:r>
-              <a:rPr lang="en-US"/>
-              <a:t>Create a statistical package (using zelig.skeleton)</a:t>
-            </a:r>
-          </a:p>
-          <a:p>
-            <a:endParaRPr lang="en-US"/>
-          </a:p>
-        </p:txBody>
-      </p:sp>
-    </p:spTree>
   </p:cSld>
   <p:clrMapOvr>
     <a:masterClrMapping/>
@@ -14296,7 +14204,7 @@
     </p:spTree>
     <p:extLst>
       <p:ext uri="{BB962C8B-B14F-4D97-AF65-F5344CB8AC3E}">
-        <p14:creationId xmlns="" xmlns:a="http://schemas.openxmlformats.org/drawingml/2006/main" xmlns:r="http://schemas.openxmlformats.org/officeDocument/2006/relationships" xmlns:p="http://schemas.openxmlformats.org/presentationml/2006/main" xmlns:p14="http://schemas.microsoft.com/office/powerpoint/2010/main" xmlns:mv="urn:schemas-microsoft-com:mac:vml" xmlns:mc="http://schemas.openxmlformats.org/markup-compatibility/2006" val="70992702"/>
+        <p14:creationId xmlns:mc="http://schemas.openxmlformats.org/markup-compatibility/2006" xmlns:mv="urn:schemas-microsoft-com:mac:vml" xmlns:p14="http://schemas.microsoft.com/office/powerpoint/2010/main" xmlns:p="http://schemas.openxmlformats.org/presentationml/2006/main" xmlns:r="http://schemas.openxmlformats.org/officeDocument/2006/relationships" xmlns:a="http://schemas.openxmlformats.org/drawingml/2006/main" xmlns="" val="70992702"/>
       </p:ext>
     </p:extLst>
   </p:cSld>
@@ -14402,7 +14310,6 @@
               <a:rPr lang="en-US"/>
               <a:t>Package</a:t>
             </a:r>
-            <a:endParaRPr lang="en-US"/>
           </a:p>
           <a:p>
             <a:pPr lvl="1"/>
@@ -14429,7 +14336,7 @@
     </p:spTree>
     <p:extLst>
       <p:ext uri="{BB962C8B-B14F-4D97-AF65-F5344CB8AC3E}">
-        <p14:creationId xmlns="" xmlns:a="http://schemas.openxmlformats.org/drawingml/2006/main" xmlns:r="http://schemas.openxmlformats.org/officeDocument/2006/relationships" xmlns:p="http://schemas.openxmlformats.org/presentationml/2006/main" xmlns:p14="http://schemas.microsoft.com/office/powerpoint/2010/main" xmlns:mv="urn:schemas-microsoft-com:mac:vml" xmlns:mc="http://schemas.openxmlformats.org/markup-compatibility/2006" val="2872122745"/>
+        <p14:creationId xmlns:mc="http://schemas.openxmlformats.org/markup-compatibility/2006" xmlns:mv="urn:schemas-microsoft-com:mac:vml" xmlns:p14="http://schemas.microsoft.com/office/powerpoint/2010/main" xmlns:p="http://schemas.openxmlformats.org/presentationml/2006/main" xmlns:r="http://schemas.openxmlformats.org/officeDocument/2006/relationships" xmlns:a="http://schemas.openxmlformats.org/drawingml/2006/main" xmlns="" val="2872122745"/>
       </p:ext>
     </p:extLst>
   </p:cSld>
@@ -14551,7 +14458,7 @@
     </p:spTree>
     <p:extLst>
       <p:ext uri="{BB962C8B-B14F-4D97-AF65-F5344CB8AC3E}">
-        <p14:creationId xmlns="" xmlns:a="http://schemas.openxmlformats.org/drawingml/2006/main" xmlns:r="http://schemas.openxmlformats.org/officeDocument/2006/relationships" xmlns:p="http://schemas.openxmlformats.org/presentationml/2006/main" xmlns:p14="http://schemas.microsoft.com/office/powerpoint/2010/main" xmlns:mv="urn:schemas-microsoft-com:mac:vml" xmlns:mc="http://schemas.openxmlformats.org/markup-compatibility/2006" val="19752076"/>
+        <p14:creationId xmlns:mc="http://schemas.openxmlformats.org/markup-compatibility/2006" xmlns:mv="urn:schemas-microsoft-com:mac:vml" xmlns:p14="http://schemas.microsoft.com/office/powerpoint/2010/main" xmlns:p="http://schemas.openxmlformats.org/presentationml/2006/main" xmlns:r="http://schemas.openxmlformats.org/officeDocument/2006/relationships" xmlns:a="http://schemas.openxmlformats.org/drawingml/2006/main" xmlns="" val="19752076"/>
       </p:ext>
     </p:extLst>
   </p:cSld>

</xml_diff>